<commit_message>
Adding Animations to the pptx file.
</commit_message>
<xml_diff>
--- a/Mohammadi.pptx
+++ b/Mohammadi.pptx
@@ -7082,6 +7082,308 @@
   <p:clrMapOvr>
     <a:masterClrMapping/>
   </p:clrMapOvr>
+  <p:timing>
+    <p:tnLst>
+      <p:par>
+        <p:cTn id="1" dur="indefinite" restart="never" nodeType="tmRoot">
+          <p:childTnLst>
+            <p:seq concurrent="1" nextAc="seek">
+              <p:cTn id="2" dur="indefinite" nodeType="mainSeq">
+                <p:childTnLst>
+                  <p:par>
+                    <p:cTn id="3" fill="hold">
+                      <p:stCondLst>
+                        <p:cond delay="indefinite"/>
+                      </p:stCondLst>
+                      <p:childTnLst>
+                        <p:par>
+                          <p:cTn id="4" fill="hold">
+                            <p:stCondLst>
+                              <p:cond delay="0"/>
+                            </p:stCondLst>
+                            <p:childTnLst>
+                              <p:par>
+                                <p:cTn id="5" presetID="10" presetClass="entr" presetSubtype="0" fill="hold" grpId="0" nodeType="clickEffect">
+                                  <p:stCondLst>
+                                    <p:cond delay="0"/>
+                                  </p:stCondLst>
+                                  <p:childTnLst>
+                                    <p:set>
+                                      <p:cBhvr>
+                                        <p:cTn id="6" dur="1" fill="hold">
+                                          <p:stCondLst>
+                                            <p:cond delay="0"/>
+                                          </p:stCondLst>
+                                        </p:cTn>
+                                        <p:tgtEl>
+                                          <p:spTgt spid="14"/>
+                                        </p:tgtEl>
+                                        <p:attrNameLst>
+                                          <p:attrName>style.visibility</p:attrName>
+                                        </p:attrNameLst>
+                                      </p:cBhvr>
+                                      <p:to>
+                                        <p:strVal val="visible"/>
+                                      </p:to>
+                                    </p:set>
+                                    <p:animEffect transition="in" filter="fade">
+                                      <p:cBhvr>
+                                        <p:cTn id="7" dur="500"/>
+                                        <p:tgtEl>
+                                          <p:spTgt spid="14"/>
+                                        </p:tgtEl>
+                                      </p:cBhvr>
+                                    </p:animEffect>
+                                  </p:childTnLst>
+                                </p:cTn>
+                              </p:par>
+                              <p:par>
+                                <p:cTn id="8" presetID="10" presetClass="entr" presetSubtype="0" fill="hold" grpId="0" nodeType="withEffect">
+                                  <p:stCondLst>
+                                    <p:cond delay="0"/>
+                                  </p:stCondLst>
+                                  <p:childTnLst>
+                                    <p:set>
+                                      <p:cBhvr>
+                                        <p:cTn id="9" dur="1" fill="hold">
+                                          <p:stCondLst>
+                                            <p:cond delay="0"/>
+                                          </p:stCondLst>
+                                        </p:cTn>
+                                        <p:tgtEl>
+                                          <p:spTgt spid="10"/>
+                                        </p:tgtEl>
+                                        <p:attrNameLst>
+                                          <p:attrName>style.visibility</p:attrName>
+                                        </p:attrNameLst>
+                                      </p:cBhvr>
+                                      <p:to>
+                                        <p:strVal val="visible"/>
+                                      </p:to>
+                                    </p:set>
+                                    <p:animEffect transition="in" filter="fade">
+                                      <p:cBhvr>
+                                        <p:cTn id="10" dur="500"/>
+                                        <p:tgtEl>
+                                          <p:spTgt spid="10"/>
+                                        </p:tgtEl>
+                                      </p:cBhvr>
+                                    </p:animEffect>
+                                  </p:childTnLst>
+                                </p:cTn>
+                              </p:par>
+                            </p:childTnLst>
+                          </p:cTn>
+                        </p:par>
+                      </p:childTnLst>
+                    </p:cTn>
+                  </p:par>
+                  <p:par>
+                    <p:cTn id="11" fill="hold">
+                      <p:stCondLst>
+                        <p:cond delay="indefinite"/>
+                      </p:stCondLst>
+                      <p:childTnLst>
+                        <p:par>
+                          <p:cTn id="12" fill="hold">
+                            <p:stCondLst>
+                              <p:cond delay="0"/>
+                            </p:stCondLst>
+                            <p:childTnLst>
+                              <p:par>
+                                <p:cTn id="13" presetID="10" presetClass="entr" presetSubtype="0" fill="hold" grpId="0" nodeType="clickEffect">
+                                  <p:stCondLst>
+                                    <p:cond delay="0"/>
+                                  </p:stCondLst>
+                                  <p:childTnLst>
+                                    <p:set>
+                                      <p:cBhvr>
+                                        <p:cTn id="14" dur="1" fill="hold">
+                                          <p:stCondLst>
+                                            <p:cond delay="0"/>
+                                          </p:stCondLst>
+                                        </p:cTn>
+                                        <p:tgtEl>
+                                          <p:spTgt spid="11"/>
+                                        </p:tgtEl>
+                                        <p:attrNameLst>
+                                          <p:attrName>style.visibility</p:attrName>
+                                        </p:attrNameLst>
+                                      </p:cBhvr>
+                                      <p:to>
+                                        <p:strVal val="visible"/>
+                                      </p:to>
+                                    </p:set>
+                                    <p:animEffect transition="in" filter="fade">
+                                      <p:cBhvr>
+                                        <p:cTn id="15" dur="500"/>
+                                        <p:tgtEl>
+                                          <p:spTgt spid="11"/>
+                                        </p:tgtEl>
+                                      </p:cBhvr>
+                                    </p:animEffect>
+                                  </p:childTnLst>
+                                </p:cTn>
+                              </p:par>
+                              <p:par>
+                                <p:cTn id="16" presetID="10" presetClass="entr" presetSubtype="0" fill="hold" grpId="0" nodeType="withEffect">
+                                  <p:stCondLst>
+                                    <p:cond delay="0"/>
+                                  </p:stCondLst>
+                                  <p:childTnLst>
+                                    <p:set>
+                                      <p:cBhvr>
+                                        <p:cTn id="17" dur="1" fill="hold">
+                                          <p:stCondLst>
+                                            <p:cond delay="0"/>
+                                          </p:stCondLst>
+                                        </p:cTn>
+                                        <p:tgtEl>
+                                          <p:spTgt spid="2"/>
+                                        </p:tgtEl>
+                                        <p:attrNameLst>
+                                          <p:attrName>style.visibility</p:attrName>
+                                        </p:attrNameLst>
+                                      </p:cBhvr>
+                                      <p:to>
+                                        <p:strVal val="visible"/>
+                                      </p:to>
+                                    </p:set>
+                                    <p:animEffect transition="in" filter="fade">
+                                      <p:cBhvr>
+                                        <p:cTn id="18" dur="500"/>
+                                        <p:tgtEl>
+                                          <p:spTgt spid="2"/>
+                                        </p:tgtEl>
+                                      </p:cBhvr>
+                                    </p:animEffect>
+                                  </p:childTnLst>
+                                </p:cTn>
+                              </p:par>
+                            </p:childTnLst>
+                          </p:cTn>
+                        </p:par>
+                      </p:childTnLst>
+                    </p:cTn>
+                  </p:par>
+                  <p:par>
+                    <p:cTn id="19" fill="hold">
+                      <p:stCondLst>
+                        <p:cond delay="indefinite"/>
+                      </p:stCondLst>
+                      <p:childTnLst>
+                        <p:par>
+                          <p:cTn id="20" fill="hold">
+                            <p:stCondLst>
+                              <p:cond delay="0"/>
+                            </p:stCondLst>
+                            <p:childTnLst>
+                              <p:par>
+                                <p:cTn id="21" presetID="10" presetClass="entr" presetSubtype="0" fill="hold" grpId="0" nodeType="clickEffect">
+                                  <p:stCondLst>
+                                    <p:cond delay="0"/>
+                                  </p:stCondLst>
+                                  <p:childTnLst>
+                                    <p:set>
+                                      <p:cBhvr>
+                                        <p:cTn id="22" dur="1" fill="hold">
+                                          <p:stCondLst>
+                                            <p:cond delay="0"/>
+                                          </p:stCondLst>
+                                        </p:cTn>
+                                        <p:tgtEl>
+                                          <p:spTgt spid="12"/>
+                                        </p:tgtEl>
+                                        <p:attrNameLst>
+                                          <p:attrName>style.visibility</p:attrName>
+                                        </p:attrNameLst>
+                                      </p:cBhvr>
+                                      <p:to>
+                                        <p:strVal val="visible"/>
+                                      </p:to>
+                                    </p:set>
+                                    <p:animEffect transition="in" filter="fade">
+                                      <p:cBhvr>
+                                        <p:cTn id="23" dur="500"/>
+                                        <p:tgtEl>
+                                          <p:spTgt spid="12"/>
+                                        </p:tgtEl>
+                                      </p:cBhvr>
+                                    </p:animEffect>
+                                  </p:childTnLst>
+                                </p:cTn>
+                              </p:par>
+                              <p:par>
+                                <p:cTn id="24" presetID="10" presetClass="entr" presetSubtype="0" fill="hold" grpId="0" nodeType="withEffect">
+                                  <p:stCondLst>
+                                    <p:cond delay="0"/>
+                                  </p:stCondLst>
+                                  <p:childTnLst>
+                                    <p:set>
+                                      <p:cBhvr>
+                                        <p:cTn id="25" dur="1" fill="hold">
+                                          <p:stCondLst>
+                                            <p:cond delay="0"/>
+                                          </p:stCondLst>
+                                        </p:cTn>
+                                        <p:tgtEl>
+                                          <p:spTgt spid="3"/>
+                                        </p:tgtEl>
+                                        <p:attrNameLst>
+                                          <p:attrName>style.visibility</p:attrName>
+                                        </p:attrNameLst>
+                                      </p:cBhvr>
+                                      <p:to>
+                                        <p:strVal val="visible"/>
+                                      </p:to>
+                                    </p:set>
+                                    <p:animEffect transition="in" filter="fade">
+                                      <p:cBhvr>
+                                        <p:cTn id="26" dur="500"/>
+                                        <p:tgtEl>
+                                          <p:spTgt spid="3"/>
+                                        </p:tgtEl>
+                                      </p:cBhvr>
+                                    </p:animEffect>
+                                  </p:childTnLst>
+                                </p:cTn>
+                              </p:par>
+                            </p:childTnLst>
+                          </p:cTn>
+                        </p:par>
+                      </p:childTnLst>
+                    </p:cTn>
+                  </p:par>
+                </p:childTnLst>
+              </p:cTn>
+              <p:prevCondLst>
+                <p:cond evt="onPrev" delay="0">
+                  <p:tgtEl>
+                    <p:sldTgt/>
+                  </p:tgtEl>
+                </p:cond>
+              </p:prevCondLst>
+              <p:nextCondLst>
+                <p:cond evt="onNext" delay="0">
+                  <p:tgtEl>
+                    <p:sldTgt/>
+                  </p:tgtEl>
+                </p:cond>
+              </p:nextCondLst>
+            </p:seq>
+          </p:childTnLst>
+        </p:cTn>
+      </p:par>
+    </p:tnLst>
+    <p:bldLst>
+      <p:bldP spid="10" grpId="0"/>
+      <p:bldP spid="11" grpId="0"/>
+      <p:bldP spid="12" grpId="0"/>
+      <p:bldP spid="14" grpId="0"/>
+      <p:bldP spid="2" grpId="0"/>
+      <p:bldP spid="3" grpId="0"/>
+    </p:bldLst>
+  </p:timing>
 </p:sld>
 </file>
 
@@ -7544,6 +7846,308 @@
   <p:clrMapOvr>
     <a:masterClrMapping/>
   </p:clrMapOvr>
+  <p:timing>
+    <p:tnLst>
+      <p:par>
+        <p:cTn id="1" dur="indefinite" restart="never" nodeType="tmRoot">
+          <p:childTnLst>
+            <p:seq concurrent="1" nextAc="seek">
+              <p:cTn id="2" dur="indefinite" nodeType="mainSeq">
+                <p:childTnLst>
+                  <p:par>
+                    <p:cTn id="3" fill="hold">
+                      <p:stCondLst>
+                        <p:cond delay="indefinite"/>
+                      </p:stCondLst>
+                      <p:childTnLst>
+                        <p:par>
+                          <p:cTn id="4" fill="hold">
+                            <p:stCondLst>
+                              <p:cond delay="0"/>
+                            </p:stCondLst>
+                            <p:childTnLst>
+                              <p:par>
+                                <p:cTn id="5" presetID="10" presetClass="entr" presetSubtype="0" fill="hold" grpId="0" nodeType="clickEffect">
+                                  <p:stCondLst>
+                                    <p:cond delay="0"/>
+                                  </p:stCondLst>
+                                  <p:childTnLst>
+                                    <p:set>
+                                      <p:cBhvr>
+                                        <p:cTn id="6" dur="1" fill="hold">
+                                          <p:stCondLst>
+                                            <p:cond delay="0"/>
+                                          </p:stCondLst>
+                                        </p:cTn>
+                                        <p:tgtEl>
+                                          <p:spTgt spid="10"/>
+                                        </p:tgtEl>
+                                        <p:attrNameLst>
+                                          <p:attrName>style.visibility</p:attrName>
+                                        </p:attrNameLst>
+                                      </p:cBhvr>
+                                      <p:to>
+                                        <p:strVal val="visible"/>
+                                      </p:to>
+                                    </p:set>
+                                    <p:animEffect transition="in" filter="fade">
+                                      <p:cBhvr>
+                                        <p:cTn id="7" dur="500"/>
+                                        <p:tgtEl>
+                                          <p:spTgt spid="10"/>
+                                        </p:tgtEl>
+                                      </p:cBhvr>
+                                    </p:animEffect>
+                                  </p:childTnLst>
+                                </p:cTn>
+                              </p:par>
+                              <p:par>
+                                <p:cTn id="8" presetID="10" presetClass="entr" presetSubtype="0" fill="hold" grpId="0" nodeType="withEffect">
+                                  <p:stCondLst>
+                                    <p:cond delay="0"/>
+                                  </p:stCondLst>
+                                  <p:childTnLst>
+                                    <p:set>
+                                      <p:cBhvr>
+                                        <p:cTn id="9" dur="1" fill="hold">
+                                          <p:stCondLst>
+                                            <p:cond delay="0"/>
+                                          </p:stCondLst>
+                                        </p:cTn>
+                                        <p:tgtEl>
+                                          <p:spTgt spid="14"/>
+                                        </p:tgtEl>
+                                        <p:attrNameLst>
+                                          <p:attrName>style.visibility</p:attrName>
+                                        </p:attrNameLst>
+                                      </p:cBhvr>
+                                      <p:to>
+                                        <p:strVal val="visible"/>
+                                      </p:to>
+                                    </p:set>
+                                    <p:animEffect transition="in" filter="fade">
+                                      <p:cBhvr>
+                                        <p:cTn id="10" dur="500"/>
+                                        <p:tgtEl>
+                                          <p:spTgt spid="14"/>
+                                        </p:tgtEl>
+                                      </p:cBhvr>
+                                    </p:animEffect>
+                                  </p:childTnLst>
+                                </p:cTn>
+                              </p:par>
+                            </p:childTnLst>
+                          </p:cTn>
+                        </p:par>
+                      </p:childTnLst>
+                    </p:cTn>
+                  </p:par>
+                  <p:par>
+                    <p:cTn id="11" fill="hold">
+                      <p:stCondLst>
+                        <p:cond delay="indefinite"/>
+                      </p:stCondLst>
+                      <p:childTnLst>
+                        <p:par>
+                          <p:cTn id="12" fill="hold">
+                            <p:stCondLst>
+                              <p:cond delay="0"/>
+                            </p:stCondLst>
+                            <p:childTnLst>
+                              <p:par>
+                                <p:cTn id="13" presetID="10" presetClass="entr" presetSubtype="0" fill="hold" grpId="0" nodeType="clickEffect">
+                                  <p:stCondLst>
+                                    <p:cond delay="0"/>
+                                  </p:stCondLst>
+                                  <p:childTnLst>
+                                    <p:set>
+                                      <p:cBhvr>
+                                        <p:cTn id="14" dur="1" fill="hold">
+                                          <p:stCondLst>
+                                            <p:cond delay="0"/>
+                                          </p:stCondLst>
+                                        </p:cTn>
+                                        <p:tgtEl>
+                                          <p:spTgt spid="11"/>
+                                        </p:tgtEl>
+                                        <p:attrNameLst>
+                                          <p:attrName>style.visibility</p:attrName>
+                                        </p:attrNameLst>
+                                      </p:cBhvr>
+                                      <p:to>
+                                        <p:strVal val="visible"/>
+                                      </p:to>
+                                    </p:set>
+                                    <p:animEffect transition="in" filter="fade">
+                                      <p:cBhvr>
+                                        <p:cTn id="15" dur="500"/>
+                                        <p:tgtEl>
+                                          <p:spTgt spid="11"/>
+                                        </p:tgtEl>
+                                      </p:cBhvr>
+                                    </p:animEffect>
+                                  </p:childTnLst>
+                                </p:cTn>
+                              </p:par>
+                              <p:par>
+                                <p:cTn id="16" presetID="10" presetClass="entr" presetSubtype="0" fill="hold" grpId="0" nodeType="withEffect">
+                                  <p:stCondLst>
+                                    <p:cond delay="0"/>
+                                  </p:stCondLst>
+                                  <p:childTnLst>
+                                    <p:set>
+                                      <p:cBhvr>
+                                        <p:cTn id="17" dur="1" fill="hold">
+                                          <p:stCondLst>
+                                            <p:cond delay="0"/>
+                                          </p:stCondLst>
+                                        </p:cTn>
+                                        <p:tgtEl>
+                                          <p:spTgt spid="2"/>
+                                        </p:tgtEl>
+                                        <p:attrNameLst>
+                                          <p:attrName>style.visibility</p:attrName>
+                                        </p:attrNameLst>
+                                      </p:cBhvr>
+                                      <p:to>
+                                        <p:strVal val="visible"/>
+                                      </p:to>
+                                    </p:set>
+                                    <p:animEffect transition="in" filter="fade">
+                                      <p:cBhvr>
+                                        <p:cTn id="18" dur="500"/>
+                                        <p:tgtEl>
+                                          <p:spTgt spid="2"/>
+                                        </p:tgtEl>
+                                      </p:cBhvr>
+                                    </p:animEffect>
+                                  </p:childTnLst>
+                                </p:cTn>
+                              </p:par>
+                            </p:childTnLst>
+                          </p:cTn>
+                        </p:par>
+                      </p:childTnLst>
+                    </p:cTn>
+                  </p:par>
+                  <p:par>
+                    <p:cTn id="19" fill="hold">
+                      <p:stCondLst>
+                        <p:cond delay="indefinite"/>
+                      </p:stCondLst>
+                      <p:childTnLst>
+                        <p:par>
+                          <p:cTn id="20" fill="hold">
+                            <p:stCondLst>
+                              <p:cond delay="0"/>
+                            </p:stCondLst>
+                            <p:childTnLst>
+                              <p:par>
+                                <p:cTn id="21" presetID="10" presetClass="entr" presetSubtype="0" fill="hold" grpId="0" nodeType="clickEffect">
+                                  <p:stCondLst>
+                                    <p:cond delay="0"/>
+                                  </p:stCondLst>
+                                  <p:childTnLst>
+                                    <p:set>
+                                      <p:cBhvr>
+                                        <p:cTn id="22" dur="1" fill="hold">
+                                          <p:stCondLst>
+                                            <p:cond delay="0"/>
+                                          </p:stCondLst>
+                                        </p:cTn>
+                                        <p:tgtEl>
+                                          <p:spTgt spid="12"/>
+                                        </p:tgtEl>
+                                        <p:attrNameLst>
+                                          <p:attrName>style.visibility</p:attrName>
+                                        </p:attrNameLst>
+                                      </p:cBhvr>
+                                      <p:to>
+                                        <p:strVal val="visible"/>
+                                      </p:to>
+                                    </p:set>
+                                    <p:animEffect transition="in" filter="fade">
+                                      <p:cBhvr>
+                                        <p:cTn id="23" dur="500"/>
+                                        <p:tgtEl>
+                                          <p:spTgt spid="12"/>
+                                        </p:tgtEl>
+                                      </p:cBhvr>
+                                    </p:animEffect>
+                                  </p:childTnLst>
+                                </p:cTn>
+                              </p:par>
+                              <p:par>
+                                <p:cTn id="24" presetID="10" presetClass="entr" presetSubtype="0" fill="hold" grpId="0" nodeType="withEffect">
+                                  <p:stCondLst>
+                                    <p:cond delay="0"/>
+                                  </p:stCondLst>
+                                  <p:childTnLst>
+                                    <p:set>
+                                      <p:cBhvr>
+                                        <p:cTn id="25" dur="1" fill="hold">
+                                          <p:stCondLst>
+                                            <p:cond delay="0"/>
+                                          </p:stCondLst>
+                                        </p:cTn>
+                                        <p:tgtEl>
+                                          <p:spTgt spid="3"/>
+                                        </p:tgtEl>
+                                        <p:attrNameLst>
+                                          <p:attrName>style.visibility</p:attrName>
+                                        </p:attrNameLst>
+                                      </p:cBhvr>
+                                      <p:to>
+                                        <p:strVal val="visible"/>
+                                      </p:to>
+                                    </p:set>
+                                    <p:animEffect transition="in" filter="fade">
+                                      <p:cBhvr>
+                                        <p:cTn id="26" dur="500"/>
+                                        <p:tgtEl>
+                                          <p:spTgt spid="3"/>
+                                        </p:tgtEl>
+                                      </p:cBhvr>
+                                    </p:animEffect>
+                                  </p:childTnLst>
+                                </p:cTn>
+                              </p:par>
+                            </p:childTnLst>
+                          </p:cTn>
+                        </p:par>
+                      </p:childTnLst>
+                    </p:cTn>
+                  </p:par>
+                </p:childTnLst>
+              </p:cTn>
+              <p:prevCondLst>
+                <p:cond evt="onPrev" delay="0">
+                  <p:tgtEl>
+                    <p:sldTgt/>
+                  </p:tgtEl>
+                </p:cond>
+              </p:prevCondLst>
+              <p:nextCondLst>
+                <p:cond evt="onNext" delay="0">
+                  <p:tgtEl>
+                    <p:sldTgt/>
+                  </p:tgtEl>
+                </p:cond>
+              </p:nextCondLst>
+            </p:seq>
+          </p:childTnLst>
+        </p:cTn>
+      </p:par>
+    </p:tnLst>
+    <p:bldLst>
+      <p:bldP spid="10" grpId="0"/>
+      <p:bldP spid="11" grpId="0"/>
+      <p:bldP spid="12" grpId="0"/>
+      <p:bldP spid="14" grpId="0"/>
+      <p:bldP spid="2" grpId="0"/>
+      <p:bldP spid="3" grpId="0"/>
+    </p:bldLst>
+  </p:timing>
 </p:sld>
 </file>
 
@@ -8253,6 +8857,308 @@
   <p:clrMapOvr>
     <a:masterClrMapping/>
   </p:clrMapOvr>
+  <p:timing>
+    <p:tnLst>
+      <p:par>
+        <p:cTn id="1" dur="indefinite" restart="never" nodeType="tmRoot">
+          <p:childTnLst>
+            <p:seq concurrent="1" nextAc="seek">
+              <p:cTn id="2" dur="indefinite" nodeType="mainSeq">
+                <p:childTnLst>
+                  <p:par>
+                    <p:cTn id="3" fill="hold">
+                      <p:stCondLst>
+                        <p:cond delay="indefinite"/>
+                      </p:stCondLst>
+                      <p:childTnLst>
+                        <p:par>
+                          <p:cTn id="4" fill="hold">
+                            <p:stCondLst>
+                              <p:cond delay="0"/>
+                            </p:stCondLst>
+                            <p:childTnLst>
+                              <p:par>
+                                <p:cTn id="5" presetID="10" presetClass="entr" presetSubtype="0" fill="hold" grpId="0" nodeType="clickEffect">
+                                  <p:stCondLst>
+                                    <p:cond delay="0"/>
+                                  </p:stCondLst>
+                                  <p:childTnLst>
+                                    <p:set>
+                                      <p:cBhvr>
+                                        <p:cTn id="6" dur="1" fill="hold">
+                                          <p:stCondLst>
+                                            <p:cond delay="0"/>
+                                          </p:stCondLst>
+                                        </p:cTn>
+                                        <p:tgtEl>
+                                          <p:spTgt spid="10"/>
+                                        </p:tgtEl>
+                                        <p:attrNameLst>
+                                          <p:attrName>style.visibility</p:attrName>
+                                        </p:attrNameLst>
+                                      </p:cBhvr>
+                                      <p:to>
+                                        <p:strVal val="visible"/>
+                                      </p:to>
+                                    </p:set>
+                                    <p:animEffect transition="in" filter="fade">
+                                      <p:cBhvr>
+                                        <p:cTn id="7" dur="500"/>
+                                        <p:tgtEl>
+                                          <p:spTgt spid="10"/>
+                                        </p:tgtEl>
+                                      </p:cBhvr>
+                                    </p:animEffect>
+                                  </p:childTnLst>
+                                </p:cTn>
+                              </p:par>
+                              <p:par>
+                                <p:cTn id="8" presetID="10" presetClass="entr" presetSubtype="0" fill="hold" grpId="0" nodeType="withEffect">
+                                  <p:stCondLst>
+                                    <p:cond delay="0"/>
+                                  </p:stCondLst>
+                                  <p:childTnLst>
+                                    <p:set>
+                                      <p:cBhvr>
+                                        <p:cTn id="9" dur="1" fill="hold">
+                                          <p:stCondLst>
+                                            <p:cond delay="0"/>
+                                          </p:stCondLst>
+                                        </p:cTn>
+                                        <p:tgtEl>
+                                          <p:spTgt spid="14"/>
+                                        </p:tgtEl>
+                                        <p:attrNameLst>
+                                          <p:attrName>style.visibility</p:attrName>
+                                        </p:attrNameLst>
+                                      </p:cBhvr>
+                                      <p:to>
+                                        <p:strVal val="visible"/>
+                                      </p:to>
+                                    </p:set>
+                                    <p:animEffect transition="in" filter="fade">
+                                      <p:cBhvr>
+                                        <p:cTn id="10" dur="500"/>
+                                        <p:tgtEl>
+                                          <p:spTgt spid="14"/>
+                                        </p:tgtEl>
+                                      </p:cBhvr>
+                                    </p:animEffect>
+                                  </p:childTnLst>
+                                </p:cTn>
+                              </p:par>
+                            </p:childTnLst>
+                          </p:cTn>
+                        </p:par>
+                      </p:childTnLst>
+                    </p:cTn>
+                  </p:par>
+                  <p:par>
+                    <p:cTn id="11" fill="hold">
+                      <p:stCondLst>
+                        <p:cond delay="indefinite"/>
+                      </p:stCondLst>
+                      <p:childTnLst>
+                        <p:par>
+                          <p:cTn id="12" fill="hold">
+                            <p:stCondLst>
+                              <p:cond delay="0"/>
+                            </p:stCondLst>
+                            <p:childTnLst>
+                              <p:par>
+                                <p:cTn id="13" presetID="10" presetClass="entr" presetSubtype="0" fill="hold" grpId="0" nodeType="clickEffect">
+                                  <p:stCondLst>
+                                    <p:cond delay="0"/>
+                                  </p:stCondLst>
+                                  <p:childTnLst>
+                                    <p:set>
+                                      <p:cBhvr>
+                                        <p:cTn id="14" dur="1" fill="hold">
+                                          <p:stCondLst>
+                                            <p:cond delay="0"/>
+                                          </p:stCondLst>
+                                        </p:cTn>
+                                        <p:tgtEl>
+                                          <p:spTgt spid="11"/>
+                                        </p:tgtEl>
+                                        <p:attrNameLst>
+                                          <p:attrName>style.visibility</p:attrName>
+                                        </p:attrNameLst>
+                                      </p:cBhvr>
+                                      <p:to>
+                                        <p:strVal val="visible"/>
+                                      </p:to>
+                                    </p:set>
+                                    <p:animEffect transition="in" filter="fade">
+                                      <p:cBhvr>
+                                        <p:cTn id="15" dur="500"/>
+                                        <p:tgtEl>
+                                          <p:spTgt spid="11"/>
+                                        </p:tgtEl>
+                                      </p:cBhvr>
+                                    </p:animEffect>
+                                  </p:childTnLst>
+                                </p:cTn>
+                              </p:par>
+                              <p:par>
+                                <p:cTn id="16" presetID="10" presetClass="entr" presetSubtype="0" fill="hold" grpId="0" nodeType="withEffect">
+                                  <p:stCondLst>
+                                    <p:cond delay="0"/>
+                                  </p:stCondLst>
+                                  <p:childTnLst>
+                                    <p:set>
+                                      <p:cBhvr>
+                                        <p:cTn id="17" dur="1" fill="hold">
+                                          <p:stCondLst>
+                                            <p:cond delay="0"/>
+                                          </p:stCondLst>
+                                        </p:cTn>
+                                        <p:tgtEl>
+                                          <p:spTgt spid="2"/>
+                                        </p:tgtEl>
+                                        <p:attrNameLst>
+                                          <p:attrName>style.visibility</p:attrName>
+                                        </p:attrNameLst>
+                                      </p:cBhvr>
+                                      <p:to>
+                                        <p:strVal val="visible"/>
+                                      </p:to>
+                                    </p:set>
+                                    <p:animEffect transition="in" filter="fade">
+                                      <p:cBhvr>
+                                        <p:cTn id="18" dur="500"/>
+                                        <p:tgtEl>
+                                          <p:spTgt spid="2"/>
+                                        </p:tgtEl>
+                                      </p:cBhvr>
+                                    </p:animEffect>
+                                  </p:childTnLst>
+                                </p:cTn>
+                              </p:par>
+                            </p:childTnLst>
+                          </p:cTn>
+                        </p:par>
+                      </p:childTnLst>
+                    </p:cTn>
+                  </p:par>
+                  <p:par>
+                    <p:cTn id="19" fill="hold">
+                      <p:stCondLst>
+                        <p:cond delay="indefinite"/>
+                      </p:stCondLst>
+                      <p:childTnLst>
+                        <p:par>
+                          <p:cTn id="20" fill="hold">
+                            <p:stCondLst>
+                              <p:cond delay="0"/>
+                            </p:stCondLst>
+                            <p:childTnLst>
+                              <p:par>
+                                <p:cTn id="21" presetID="10" presetClass="entr" presetSubtype="0" fill="hold" grpId="0" nodeType="clickEffect">
+                                  <p:stCondLst>
+                                    <p:cond delay="0"/>
+                                  </p:stCondLst>
+                                  <p:childTnLst>
+                                    <p:set>
+                                      <p:cBhvr>
+                                        <p:cTn id="22" dur="1" fill="hold">
+                                          <p:stCondLst>
+                                            <p:cond delay="0"/>
+                                          </p:stCondLst>
+                                        </p:cTn>
+                                        <p:tgtEl>
+                                          <p:spTgt spid="12"/>
+                                        </p:tgtEl>
+                                        <p:attrNameLst>
+                                          <p:attrName>style.visibility</p:attrName>
+                                        </p:attrNameLst>
+                                      </p:cBhvr>
+                                      <p:to>
+                                        <p:strVal val="visible"/>
+                                      </p:to>
+                                    </p:set>
+                                    <p:animEffect transition="in" filter="fade">
+                                      <p:cBhvr>
+                                        <p:cTn id="23" dur="500"/>
+                                        <p:tgtEl>
+                                          <p:spTgt spid="12"/>
+                                        </p:tgtEl>
+                                      </p:cBhvr>
+                                    </p:animEffect>
+                                  </p:childTnLst>
+                                </p:cTn>
+                              </p:par>
+                              <p:par>
+                                <p:cTn id="24" presetID="10" presetClass="entr" presetSubtype="0" fill="hold" grpId="0" nodeType="withEffect">
+                                  <p:stCondLst>
+                                    <p:cond delay="0"/>
+                                  </p:stCondLst>
+                                  <p:childTnLst>
+                                    <p:set>
+                                      <p:cBhvr>
+                                        <p:cTn id="25" dur="1" fill="hold">
+                                          <p:stCondLst>
+                                            <p:cond delay="0"/>
+                                          </p:stCondLst>
+                                        </p:cTn>
+                                        <p:tgtEl>
+                                          <p:spTgt spid="3"/>
+                                        </p:tgtEl>
+                                        <p:attrNameLst>
+                                          <p:attrName>style.visibility</p:attrName>
+                                        </p:attrNameLst>
+                                      </p:cBhvr>
+                                      <p:to>
+                                        <p:strVal val="visible"/>
+                                      </p:to>
+                                    </p:set>
+                                    <p:animEffect transition="in" filter="fade">
+                                      <p:cBhvr>
+                                        <p:cTn id="26" dur="500"/>
+                                        <p:tgtEl>
+                                          <p:spTgt spid="3"/>
+                                        </p:tgtEl>
+                                      </p:cBhvr>
+                                    </p:animEffect>
+                                  </p:childTnLst>
+                                </p:cTn>
+                              </p:par>
+                            </p:childTnLst>
+                          </p:cTn>
+                        </p:par>
+                      </p:childTnLst>
+                    </p:cTn>
+                  </p:par>
+                </p:childTnLst>
+              </p:cTn>
+              <p:prevCondLst>
+                <p:cond evt="onPrev" delay="0">
+                  <p:tgtEl>
+                    <p:sldTgt/>
+                  </p:tgtEl>
+                </p:cond>
+              </p:prevCondLst>
+              <p:nextCondLst>
+                <p:cond evt="onNext" delay="0">
+                  <p:tgtEl>
+                    <p:sldTgt/>
+                  </p:tgtEl>
+                </p:cond>
+              </p:nextCondLst>
+            </p:seq>
+          </p:childTnLst>
+        </p:cTn>
+      </p:par>
+    </p:tnLst>
+    <p:bldLst>
+      <p:bldP spid="10" grpId="0"/>
+      <p:bldP spid="11" grpId="0"/>
+      <p:bldP spid="12" grpId="0"/>
+      <p:bldP spid="14" grpId="0"/>
+      <p:bldP spid="2" grpId="0"/>
+      <p:bldP spid="3" grpId="0"/>
+    </p:bldLst>
+  </p:timing>
 </p:sld>
 </file>
 
@@ -9380,6 +10286,308 @@
   <p:clrMapOvr>
     <a:masterClrMapping/>
   </p:clrMapOvr>
+  <p:timing>
+    <p:tnLst>
+      <p:par>
+        <p:cTn id="1" dur="indefinite" restart="never" nodeType="tmRoot">
+          <p:childTnLst>
+            <p:seq concurrent="1" nextAc="seek">
+              <p:cTn id="2" dur="indefinite" nodeType="mainSeq">
+                <p:childTnLst>
+                  <p:par>
+                    <p:cTn id="3" fill="hold">
+                      <p:stCondLst>
+                        <p:cond delay="indefinite"/>
+                      </p:stCondLst>
+                      <p:childTnLst>
+                        <p:par>
+                          <p:cTn id="4" fill="hold">
+                            <p:stCondLst>
+                              <p:cond delay="0"/>
+                            </p:stCondLst>
+                            <p:childTnLst>
+                              <p:par>
+                                <p:cTn id="5" presetID="10" presetClass="entr" presetSubtype="0" fill="hold" grpId="0" nodeType="clickEffect">
+                                  <p:stCondLst>
+                                    <p:cond delay="0"/>
+                                  </p:stCondLst>
+                                  <p:childTnLst>
+                                    <p:set>
+                                      <p:cBhvr>
+                                        <p:cTn id="6" dur="1" fill="hold">
+                                          <p:stCondLst>
+                                            <p:cond delay="0"/>
+                                          </p:stCondLst>
+                                        </p:cTn>
+                                        <p:tgtEl>
+                                          <p:spTgt spid="10"/>
+                                        </p:tgtEl>
+                                        <p:attrNameLst>
+                                          <p:attrName>style.visibility</p:attrName>
+                                        </p:attrNameLst>
+                                      </p:cBhvr>
+                                      <p:to>
+                                        <p:strVal val="visible"/>
+                                      </p:to>
+                                    </p:set>
+                                    <p:animEffect transition="in" filter="fade">
+                                      <p:cBhvr>
+                                        <p:cTn id="7" dur="500"/>
+                                        <p:tgtEl>
+                                          <p:spTgt spid="10"/>
+                                        </p:tgtEl>
+                                      </p:cBhvr>
+                                    </p:animEffect>
+                                  </p:childTnLst>
+                                </p:cTn>
+                              </p:par>
+                              <p:par>
+                                <p:cTn id="8" presetID="10" presetClass="entr" presetSubtype="0" fill="hold" grpId="0" nodeType="withEffect">
+                                  <p:stCondLst>
+                                    <p:cond delay="0"/>
+                                  </p:stCondLst>
+                                  <p:childTnLst>
+                                    <p:set>
+                                      <p:cBhvr>
+                                        <p:cTn id="9" dur="1" fill="hold">
+                                          <p:stCondLst>
+                                            <p:cond delay="0"/>
+                                          </p:stCondLst>
+                                        </p:cTn>
+                                        <p:tgtEl>
+                                          <p:spTgt spid="14"/>
+                                        </p:tgtEl>
+                                        <p:attrNameLst>
+                                          <p:attrName>style.visibility</p:attrName>
+                                        </p:attrNameLst>
+                                      </p:cBhvr>
+                                      <p:to>
+                                        <p:strVal val="visible"/>
+                                      </p:to>
+                                    </p:set>
+                                    <p:animEffect transition="in" filter="fade">
+                                      <p:cBhvr>
+                                        <p:cTn id="10" dur="500"/>
+                                        <p:tgtEl>
+                                          <p:spTgt spid="14"/>
+                                        </p:tgtEl>
+                                      </p:cBhvr>
+                                    </p:animEffect>
+                                  </p:childTnLst>
+                                </p:cTn>
+                              </p:par>
+                            </p:childTnLst>
+                          </p:cTn>
+                        </p:par>
+                      </p:childTnLst>
+                    </p:cTn>
+                  </p:par>
+                  <p:par>
+                    <p:cTn id="11" fill="hold">
+                      <p:stCondLst>
+                        <p:cond delay="indefinite"/>
+                      </p:stCondLst>
+                      <p:childTnLst>
+                        <p:par>
+                          <p:cTn id="12" fill="hold">
+                            <p:stCondLst>
+                              <p:cond delay="0"/>
+                            </p:stCondLst>
+                            <p:childTnLst>
+                              <p:par>
+                                <p:cTn id="13" presetID="10" presetClass="entr" presetSubtype="0" fill="hold" grpId="0" nodeType="clickEffect">
+                                  <p:stCondLst>
+                                    <p:cond delay="0"/>
+                                  </p:stCondLst>
+                                  <p:childTnLst>
+                                    <p:set>
+                                      <p:cBhvr>
+                                        <p:cTn id="14" dur="1" fill="hold">
+                                          <p:stCondLst>
+                                            <p:cond delay="0"/>
+                                          </p:stCondLst>
+                                        </p:cTn>
+                                        <p:tgtEl>
+                                          <p:spTgt spid="11"/>
+                                        </p:tgtEl>
+                                        <p:attrNameLst>
+                                          <p:attrName>style.visibility</p:attrName>
+                                        </p:attrNameLst>
+                                      </p:cBhvr>
+                                      <p:to>
+                                        <p:strVal val="visible"/>
+                                      </p:to>
+                                    </p:set>
+                                    <p:animEffect transition="in" filter="fade">
+                                      <p:cBhvr>
+                                        <p:cTn id="15" dur="500"/>
+                                        <p:tgtEl>
+                                          <p:spTgt spid="11"/>
+                                        </p:tgtEl>
+                                      </p:cBhvr>
+                                    </p:animEffect>
+                                  </p:childTnLst>
+                                </p:cTn>
+                              </p:par>
+                              <p:par>
+                                <p:cTn id="16" presetID="10" presetClass="entr" presetSubtype="0" fill="hold" grpId="0" nodeType="withEffect">
+                                  <p:stCondLst>
+                                    <p:cond delay="0"/>
+                                  </p:stCondLst>
+                                  <p:childTnLst>
+                                    <p:set>
+                                      <p:cBhvr>
+                                        <p:cTn id="17" dur="1" fill="hold">
+                                          <p:stCondLst>
+                                            <p:cond delay="0"/>
+                                          </p:stCondLst>
+                                        </p:cTn>
+                                        <p:tgtEl>
+                                          <p:spTgt spid="2"/>
+                                        </p:tgtEl>
+                                        <p:attrNameLst>
+                                          <p:attrName>style.visibility</p:attrName>
+                                        </p:attrNameLst>
+                                      </p:cBhvr>
+                                      <p:to>
+                                        <p:strVal val="visible"/>
+                                      </p:to>
+                                    </p:set>
+                                    <p:animEffect transition="in" filter="fade">
+                                      <p:cBhvr>
+                                        <p:cTn id="18" dur="500"/>
+                                        <p:tgtEl>
+                                          <p:spTgt spid="2"/>
+                                        </p:tgtEl>
+                                      </p:cBhvr>
+                                    </p:animEffect>
+                                  </p:childTnLst>
+                                </p:cTn>
+                              </p:par>
+                            </p:childTnLst>
+                          </p:cTn>
+                        </p:par>
+                      </p:childTnLst>
+                    </p:cTn>
+                  </p:par>
+                  <p:par>
+                    <p:cTn id="19" fill="hold">
+                      <p:stCondLst>
+                        <p:cond delay="indefinite"/>
+                      </p:stCondLst>
+                      <p:childTnLst>
+                        <p:par>
+                          <p:cTn id="20" fill="hold">
+                            <p:stCondLst>
+                              <p:cond delay="0"/>
+                            </p:stCondLst>
+                            <p:childTnLst>
+                              <p:par>
+                                <p:cTn id="21" presetID="10" presetClass="entr" presetSubtype="0" fill="hold" grpId="0" nodeType="clickEffect">
+                                  <p:stCondLst>
+                                    <p:cond delay="0"/>
+                                  </p:stCondLst>
+                                  <p:childTnLst>
+                                    <p:set>
+                                      <p:cBhvr>
+                                        <p:cTn id="22" dur="1" fill="hold">
+                                          <p:stCondLst>
+                                            <p:cond delay="0"/>
+                                          </p:stCondLst>
+                                        </p:cTn>
+                                        <p:tgtEl>
+                                          <p:spTgt spid="12"/>
+                                        </p:tgtEl>
+                                        <p:attrNameLst>
+                                          <p:attrName>style.visibility</p:attrName>
+                                        </p:attrNameLst>
+                                      </p:cBhvr>
+                                      <p:to>
+                                        <p:strVal val="visible"/>
+                                      </p:to>
+                                    </p:set>
+                                    <p:animEffect transition="in" filter="fade">
+                                      <p:cBhvr>
+                                        <p:cTn id="23" dur="500"/>
+                                        <p:tgtEl>
+                                          <p:spTgt spid="12"/>
+                                        </p:tgtEl>
+                                      </p:cBhvr>
+                                    </p:animEffect>
+                                  </p:childTnLst>
+                                </p:cTn>
+                              </p:par>
+                              <p:par>
+                                <p:cTn id="24" presetID="10" presetClass="entr" presetSubtype="0" fill="hold" grpId="0" nodeType="withEffect">
+                                  <p:stCondLst>
+                                    <p:cond delay="0"/>
+                                  </p:stCondLst>
+                                  <p:childTnLst>
+                                    <p:set>
+                                      <p:cBhvr>
+                                        <p:cTn id="25" dur="1" fill="hold">
+                                          <p:stCondLst>
+                                            <p:cond delay="0"/>
+                                          </p:stCondLst>
+                                        </p:cTn>
+                                        <p:tgtEl>
+                                          <p:spTgt spid="3"/>
+                                        </p:tgtEl>
+                                        <p:attrNameLst>
+                                          <p:attrName>style.visibility</p:attrName>
+                                        </p:attrNameLst>
+                                      </p:cBhvr>
+                                      <p:to>
+                                        <p:strVal val="visible"/>
+                                      </p:to>
+                                    </p:set>
+                                    <p:animEffect transition="in" filter="fade">
+                                      <p:cBhvr>
+                                        <p:cTn id="26" dur="500"/>
+                                        <p:tgtEl>
+                                          <p:spTgt spid="3"/>
+                                        </p:tgtEl>
+                                      </p:cBhvr>
+                                    </p:animEffect>
+                                  </p:childTnLst>
+                                </p:cTn>
+                              </p:par>
+                            </p:childTnLst>
+                          </p:cTn>
+                        </p:par>
+                      </p:childTnLst>
+                    </p:cTn>
+                  </p:par>
+                </p:childTnLst>
+              </p:cTn>
+              <p:prevCondLst>
+                <p:cond evt="onPrev" delay="0">
+                  <p:tgtEl>
+                    <p:sldTgt/>
+                  </p:tgtEl>
+                </p:cond>
+              </p:prevCondLst>
+              <p:nextCondLst>
+                <p:cond evt="onNext" delay="0">
+                  <p:tgtEl>
+                    <p:sldTgt/>
+                  </p:tgtEl>
+                </p:cond>
+              </p:nextCondLst>
+            </p:seq>
+          </p:childTnLst>
+        </p:cTn>
+      </p:par>
+    </p:tnLst>
+    <p:bldLst>
+      <p:bldP spid="10" grpId="0"/>
+      <p:bldP spid="11" grpId="0"/>
+      <p:bldP spid="12" grpId="0"/>
+      <p:bldP spid="14" grpId="0"/>
+      <p:bldP spid="2" grpId="0"/>
+      <p:bldP spid="3" grpId="0"/>
+    </p:bldLst>
+  </p:timing>
 </p:sld>
 </file>
 
@@ -9882,6 +11090,308 @@
   <p:clrMapOvr>
     <a:masterClrMapping/>
   </p:clrMapOvr>
+  <p:timing>
+    <p:tnLst>
+      <p:par>
+        <p:cTn id="1" dur="indefinite" restart="never" nodeType="tmRoot">
+          <p:childTnLst>
+            <p:seq concurrent="1" nextAc="seek">
+              <p:cTn id="2" dur="indefinite" nodeType="mainSeq">
+                <p:childTnLst>
+                  <p:par>
+                    <p:cTn id="3" fill="hold">
+                      <p:stCondLst>
+                        <p:cond delay="indefinite"/>
+                      </p:stCondLst>
+                      <p:childTnLst>
+                        <p:par>
+                          <p:cTn id="4" fill="hold">
+                            <p:stCondLst>
+                              <p:cond delay="0"/>
+                            </p:stCondLst>
+                            <p:childTnLst>
+                              <p:par>
+                                <p:cTn id="5" presetID="10" presetClass="entr" presetSubtype="0" fill="hold" grpId="0" nodeType="clickEffect">
+                                  <p:stCondLst>
+                                    <p:cond delay="0"/>
+                                  </p:stCondLst>
+                                  <p:childTnLst>
+                                    <p:set>
+                                      <p:cBhvr>
+                                        <p:cTn id="6" dur="1" fill="hold">
+                                          <p:stCondLst>
+                                            <p:cond delay="0"/>
+                                          </p:stCondLst>
+                                        </p:cTn>
+                                        <p:tgtEl>
+                                          <p:spTgt spid="10"/>
+                                        </p:tgtEl>
+                                        <p:attrNameLst>
+                                          <p:attrName>style.visibility</p:attrName>
+                                        </p:attrNameLst>
+                                      </p:cBhvr>
+                                      <p:to>
+                                        <p:strVal val="visible"/>
+                                      </p:to>
+                                    </p:set>
+                                    <p:animEffect transition="in" filter="fade">
+                                      <p:cBhvr>
+                                        <p:cTn id="7" dur="500"/>
+                                        <p:tgtEl>
+                                          <p:spTgt spid="10"/>
+                                        </p:tgtEl>
+                                      </p:cBhvr>
+                                    </p:animEffect>
+                                  </p:childTnLst>
+                                </p:cTn>
+                              </p:par>
+                              <p:par>
+                                <p:cTn id="8" presetID="10" presetClass="entr" presetSubtype="0" fill="hold" grpId="0" nodeType="withEffect">
+                                  <p:stCondLst>
+                                    <p:cond delay="0"/>
+                                  </p:stCondLst>
+                                  <p:childTnLst>
+                                    <p:set>
+                                      <p:cBhvr>
+                                        <p:cTn id="9" dur="1" fill="hold">
+                                          <p:stCondLst>
+                                            <p:cond delay="0"/>
+                                          </p:stCondLst>
+                                        </p:cTn>
+                                        <p:tgtEl>
+                                          <p:spTgt spid="14"/>
+                                        </p:tgtEl>
+                                        <p:attrNameLst>
+                                          <p:attrName>style.visibility</p:attrName>
+                                        </p:attrNameLst>
+                                      </p:cBhvr>
+                                      <p:to>
+                                        <p:strVal val="visible"/>
+                                      </p:to>
+                                    </p:set>
+                                    <p:animEffect transition="in" filter="fade">
+                                      <p:cBhvr>
+                                        <p:cTn id="10" dur="500"/>
+                                        <p:tgtEl>
+                                          <p:spTgt spid="14"/>
+                                        </p:tgtEl>
+                                      </p:cBhvr>
+                                    </p:animEffect>
+                                  </p:childTnLst>
+                                </p:cTn>
+                              </p:par>
+                            </p:childTnLst>
+                          </p:cTn>
+                        </p:par>
+                      </p:childTnLst>
+                    </p:cTn>
+                  </p:par>
+                  <p:par>
+                    <p:cTn id="11" fill="hold">
+                      <p:stCondLst>
+                        <p:cond delay="indefinite"/>
+                      </p:stCondLst>
+                      <p:childTnLst>
+                        <p:par>
+                          <p:cTn id="12" fill="hold">
+                            <p:stCondLst>
+                              <p:cond delay="0"/>
+                            </p:stCondLst>
+                            <p:childTnLst>
+                              <p:par>
+                                <p:cTn id="13" presetID="10" presetClass="entr" presetSubtype="0" fill="hold" grpId="0" nodeType="clickEffect">
+                                  <p:stCondLst>
+                                    <p:cond delay="0"/>
+                                  </p:stCondLst>
+                                  <p:childTnLst>
+                                    <p:set>
+                                      <p:cBhvr>
+                                        <p:cTn id="14" dur="1" fill="hold">
+                                          <p:stCondLst>
+                                            <p:cond delay="0"/>
+                                          </p:stCondLst>
+                                        </p:cTn>
+                                        <p:tgtEl>
+                                          <p:spTgt spid="2"/>
+                                        </p:tgtEl>
+                                        <p:attrNameLst>
+                                          <p:attrName>style.visibility</p:attrName>
+                                        </p:attrNameLst>
+                                      </p:cBhvr>
+                                      <p:to>
+                                        <p:strVal val="visible"/>
+                                      </p:to>
+                                    </p:set>
+                                    <p:animEffect transition="in" filter="fade">
+                                      <p:cBhvr>
+                                        <p:cTn id="15" dur="500"/>
+                                        <p:tgtEl>
+                                          <p:spTgt spid="2"/>
+                                        </p:tgtEl>
+                                      </p:cBhvr>
+                                    </p:animEffect>
+                                  </p:childTnLst>
+                                </p:cTn>
+                              </p:par>
+                              <p:par>
+                                <p:cTn id="16" presetID="10" presetClass="entr" presetSubtype="0" fill="hold" grpId="0" nodeType="withEffect">
+                                  <p:stCondLst>
+                                    <p:cond delay="0"/>
+                                  </p:stCondLst>
+                                  <p:childTnLst>
+                                    <p:set>
+                                      <p:cBhvr>
+                                        <p:cTn id="17" dur="1" fill="hold">
+                                          <p:stCondLst>
+                                            <p:cond delay="0"/>
+                                          </p:stCondLst>
+                                        </p:cTn>
+                                        <p:tgtEl>
+                                          <p:spTgt spid="11"/>
+                                        </p:tgtEl>
+                                        <p:attrNameLst>
+                                          <p:attrName>style.visibility</p:attrName>
+                                        </p:attrNameLst>
+                                      </p:cBhvr>
+                                      <p:to>
+                                        <p:strVal val="visible"/>
+                                      </p:to>
+                                    </p:set>
+                                    <p:animEffect transition="in" filter="fade">
+                                      <p:cBhvr>
+                                        <p:cTn id="18" dur="500"/>
+                                        <p:tgtEl>
+                                          <p:spTgt spid="11"/>
+                                        </p:tgtEl>
+                                      </p:cBhvr>
+                                    </p:animEffect>
+                                  </p:childTnLst>
+                                </p:cTn>
+                              </p:par>
+                            </p:childTnLst>
+                          </p:cTn>
+                        </p:par>
+                      </p:childTnLst>
+                    </p:cTn>
+                  </p:par>
+                  <p:par>
+                    <p:cTn id="19" fill="hold">
+                      <p:stCondLst>
+                        <p:cond delay="indefinite"/>
+                      </p:stCondLst>
+                      <p:childTnLst>
+                        <p:par>
+                          <p:cTn id="20" fill="hold">
+                            <p:stCondLst>
+                              <p:cond delay="0"/>
+                            </p:stCondLst>
+                            <p:childTnLst>
+                              <p:par>
+                                <p:cTn id="21" presetID="10" presetClass="entr" presetSubtype="0" fill="hold" grpId="0" nodeType="clickEffect">
+                                  <p:stCondLst>
+                                    <p:cond delay="0"/>
+                                  </p:stCondLst>
+                                  <p:childTnLst>
+                                    <p:set>
+                                      <p:cBhvr>
+                                        <p:cTn id="22" dur="1" fill="hold">
+                                          <p:stCondLst>
+                                            <p:cond delay="0"/>
+                                          </p:stCondLst>
+                                        </p:cTn>
+                                        <p:tgtEl>
+                                          <p:spTgt spid="3"/>
+                                        </p:tgtEl>
+                                        <p:attrNameLst>
+                                          <p:attrName>style.visibility</p:attrName>
+                                        </p:attrNameLst>
+                                      </p:cBhvr>
+                                      <p:to>
+                                        <p:strVal val="visible"/>
+                                      </p:to>
+                                    </p:set>
+                                    <p:animEffect transition="in" filter="fade">
+                                      <p:cBhvr>
+                                        <p:cTn id="23" dur="500"/>
+                                        <p:tgtEl>
+                                          <p:spTgt spid="3"/>
+                                        </p:tgtEl>
+                                      </p:cBhvr>
+                                    </p:animEffect>
+                                  </p:childTnLst>
+                                </p:cTn>
+                              </p:par>
+                              <p:par>
+                                <p:cTn id="24" presetID="10" presetClass="entr" presetSubtype="0" fill="hold" grpId="0" nodeType="withEffect">
+                                  <p:stCondLst>
+                                    <p:cond delay="0"/>
+                                  </p:stCondLst>
+                                  <p:childTnLst>
+                                    <p:set>
+                                      <p:cBhvr>
+                                        <p:cTn id="25" dur="1" fill="hold">
+                                          <p:stCondLst>
+                                            <p:cond delay="0"/>
+                                          </p:stCondLst>
+                                        </p:cTn>
+                                        <p:tgtEl>
+                                          <p:spTgt spid="12"/>
+                                        </p:tgtEl>
+                                        <p:attrNameLst>
+                                          <p:attrName>style.visibility</p:attrName>
+                                        </p:attrNameLst>
+                                      </p:cBhvr>
+                                      <p:to>
+                                        <p:strVal val="visible"/>
+                                      </p:to>
+                                    </p:set>
+                                    <p:animEffect transition="in" filter="fade">
+                                      <p:cBhvr>
+                                        <p:cTn id="26" dur="500"/>
+                                        <p:tgtEl>
+                                          <p:spTgt spid="12"/>
+                                        </p:tgtEl>
+                                      </p:cBhvr>
+                                    </p:animEffect>
+                                  </p:childTnLst>
+                                </p:cTn>
+                              </p:par>
+                            </p:childTnLst>
+                          </p:cTn>
+                        </p:par>
+                      </p:childTnLst>
+                    </p:cTn>
+                  </p:par>
+                </p:childTnLst>
+              </p:cTn>
+              <p:prevCondLst>
+                <p:cond evt="onPrev" delay="0">
+                  <p:tgtEl>
+                    <p:sldTgt/>
+                  </p:tgtEl>
+                </p:cond>
+              </p:prevCondLst>
+              <p:nextCondLst>
+                <p:cond evt="onNext" delay="0">
+                  <p:tgtEl>
+                    <p:sldTgt/>
+                  </p:tgtEl>
+                </p:cond>
+              </p:nextCondLst>
+            </p:seq>
+          </p:childTnLst>
+        </p:cTn>
+      </p:par>
+    </p:tnLst>
+    <p:bldLst>
+      <p:bldP spid="10" grpId="0"/>
+      <p:bldP spid="11" grpId="0"/>
+      <p:bldP spid="12" grpId="0"/>
+      <p:bldP spid="14" grpId="0"/>
+      <p:bldP spid="2" grpId="0"/>
+      <p:bldP spid="3" grpId="0"/>
+    </p:bldLst>
+  </p:timing>
 </p:sld>
 </file>
 
@@ -10561,6 +12071,128 @@
   <p:clrMapOvr>
     <a:masterClrMapping/>
   </p:clrMapOvr>
+  <p:timing>
+    <p:tnLst>
+      <p:par>
+        <p:cTn id="1" dur="indefinite" restart="never" nodeType="tmRoot">
+          <p:childTnLst>
+            <p:seq concurrent="1" nextAc="seek">
+              <p:cTn id="2" dur="indefinite" nodeType="mainSeq">
+                <p:childTnLst>
+                  <p:par>
+                    <p:cTn id="3" fill="hold">
+                      <p:stCondLst>
+                        <p:cond delay="indefinite"/>
+                      </p:stCondLst>
+                      <p:childTnLst>
+                        <p:par>
+                          <p:cTn id="4" fill="hold">
+                            <p:stCondLst>
+                              <p:cond delay="0"/>
+                            </p:stCondLst>
+                            <p:childTnLst>
+                              <p:par>
+                                <p:cTn id="5" presetID="10" presetClass="entr" presetSubtype="0" fill="hold" grpId="0" nodeType="clickEffect">
+                                  <p:stCondLst>
+                                    <p:cond delay="0"/>
+                                  </p:stCondLst>
+                                  <p:childTnLst>
+                                    <p:set>
+                                      <p:cBhvr>
+                                        <p:cTn id="6" dur="1" fill="hold">
+                                          <p:stCondLst>
+                                            <p:cond delay="0"/>
+                                          </p:stCondLst>
+                                        </p:cTn>
+                                        <p:tgtEl>
+                                          <p:spTgt spid="14"/>
+                                        </p:tgtEl>
+                                        <p:attrNameLst>
+                                          <p:attrName>style.visibility</p:attrName>
+                                        </p:attrNameLst>
+                                      </p:cBhvr>
+                                      <p:to>
+                                        <p:strVal val="visible"/>
+                                      </p:to>
+                                    </p:set>
+                                    <p:animEffect transition="in" filter="fade">
+                                      <p:cBhvr>
+                                        <p:cTn id="7" dur="500"/>
+                                        <p:tgtEl>
+                                          <p:spTgt spid="14"/>
+                                        </p:tgtEl>
+                                      </p:cBhvr>
+                                    </p:animEffect>
+                                  </p:childTnLst>
+                                </p:cTn>
+                              </p:par>
+                              <p:par>
+                                <p:cTn id="8" presetID="10" presetClass="entr" presetSubtype="0" fill="hold" grpId="0" nodeType="withEffect">
+                                  <p:stCondLst>
+                                    <p:cond delay="0"/>
+                                  </p:stCondLst>
+                                  <p:childTnLst>
+                                    <p:set>
+                                      <p:cBhvr>
+                                        <p:cTn id="9" dur="1" fill="hold">
+                                          <p:stCondLst>
+                                            <p:cond delay="0"/>
+                                          </p:stCondLst>
+                                        </p:cTn>
+                                        <p:tgtEl>
+                                          <p:spTgt spid="10"/>
+                                        </p:tgtEl>
+                                        <p:attrNameLst>
+                                          <p:attrName>style.visibility</p:attrName>
+                                        </p:attrNameLst>
+                                      </p:cBhvr>
+                                      <p:to>
+                                        <p:strVal val="visible"/>
+                                      </p:to>
+                                    </p:set>
+                                    <p:animEffect transition="in" filter="fade">
+                                      <p:cBhvr>
+                                        <p:cTn id="10" dur="500"/>
+                                        <p:tgtEl>
+                                          <p:spTgt spid="10"/>
+                                        </p:tgtEl>
+                                      </p:cBhvr>
+                                    </p:animEffect>
+                                  </p:childTnLst>
+                                </p:cTn>
+                              </p:par>
+                            </p:childTnLst>
+                          </p:cTn>
+                        </p:par>
+                      </p:childTnLst>
+                    </p:cTn>
+                  </p:par>
+                </p:childTnLst>
+              </p:cTn>
+              <p:prevCondLst>
+                <p:cond evt="onPrev" delay="0">
+                  <p:tgtEl>
+                    <p:sldTgt/>
+                  </p:tgtEl>
+                </p:cond>
+              </p:prevCondLst>
+              <p:nextCondLst>
+                <p:cond evt="onNext" delay="0">
+                  <p:tgtEl>
+                    <p:sldTgt/>
+                  </p:tgtEl>
+                </p:cond>
+              </p:nextCondLst>
+            </p:seq>
+          </p:childTnLst>
+        </p:cTn>
+      </p:par>
+    </p:tnLst>
+    <p:bldLst>
+      <p:bldP spid="10" grpId="0"/>
+      <p:bldP spid="14" grpId="0"/>
+    </p:bldLst>
+  </p:timing>
 </p:sld>
 </file>
 
@@ -10735,8 +12367,8 @@
           </a:prstGeom>
         </p:spPr>
       </p:pic>
-      <mc:AlternateContent xmlns:mc="http://schemas.openxmlformats.org/markup-compatibility/2006">
-        <mc:Choice xmlns:p14="http://schemas.microsoft.com/office/powerpoint/2010/main" Requires="p14">
+      <mc:AlternateContent xmlns:mc="http://schemas.openxmlformats.org/markup-compatibility/2006" xmlns:p14="http://schemas.microsoft.com/office/powerpoint/2010/main">
+        <mc:Choice Requires="p14">
           <p:contentPart p14:bwMode="auto" r:id="rId6">
             <p14:nvContentPartPr>
               <p14:cNvPr id="17" name="Ink 16">
@@ -10755,7 +12387,7 @@
             </p14:xfrm>
           </p:contentPart>
         </mc:Choice>
-        <mc:Fallback>
+        <mc:Fallback xmlns="">
           <p:pic>
             <p:nvPicPr>
               <p:cNvPr id="17" name="Ink 16">
@@ -10786,8 +12418,8 @@
           </p:pic>
         </mc:Fallback>
       </mc:AlternateContent>
-      <mc:AlternateContent xmlns:mc="http://schemas.openxmlformats.org/markup-compatibility/2006">
-        <mc:Choice xmlns:p14="http://schemas.microsoft.com/office/powerpoint/2010/main" Requires="p14">
+      <mc:AlternateContent xmlns:mc="http://schemas.openxmlformats.org/markup-compatibility/2006" xmlns:p14="http://schemas.microsoft.com/office/powerpoint/2010/main">
+        <mc:Choice Requires="p14">
           <p:contentPart p14:bwMode="auto" r:id="rId8">
             <p14:nvContentPartPr>
               <p14:cNvPr id="23" name="Ink 22">
@@ -10806,7 +12438,7 @@
             </p14:xfrm>
           </p:contentPart>
         </mc:Choice>
-        <mc:Fallback>
+        <mc:Fallback xmlns="">
           <p:pic>
             <p:nvPicPr>
               <p:cNvPr id="23" name="Ink 22">
@@ -10837,8 +12469,8 @@
           </p:pic>
         </mc:Fallback>
       </mc:AlternateContent>
-      <mc:AlternateContent xmlns:mc="http://schemas.openxmlformats.org/markup-compatibility/2006">
-        <mc:Choice xmlns:p14="http://schemas.microsoft.com/office/powerpoint/2010/main" Requires="p14">
+      <mc:AlternateContent xmlns:mc="http://schemas.openxmlformats.org/markup-compatibility/2006" xmlns:p14="http://schemas.microsoft.com/office/powerpoint/2010/main">
+        <mc:Choice Requires="p14">
           <p:contentPart p14:bwMode="auto" r:id="rId10">
             <p14:nvContentPartPr>
               <p14:cNvPr id="25" name="Ink 24">
@@ -10857,7 +12489,7 @@
             </p14:xfrm>
           </p:contentPart>
         </mc:Choice>
-        <mc:Fallback>
+        <mc:Fallback xmlns="">
           <p:pic>
             <p:nvPicPr>
               <p:cNvPr id="25" name="Ink 24">
@@ -10888,8 +12520,8 @@
           </p:pic>
         </mc:Fallback>
       </mc:AlternateContent>
-      <mc:AlternateContent xmlns:mc="http://schemas.openxmlformats.org/markup-compatibility/2006">
-        <mc:Choice xmlns:p14="http://schemas.microsoft.com/office/powerpoint/2010/main" Requires="p14">
+      <mc:AlternateContent xmlns:mc="http://schemas.openxmlformats.org/markup-compatibility/2006" xmlns:p14="http://schemas.microsoft.com/office/powerpoint/2010/main">
+        <mc:Choice Requires="p14">
           <p:contentPart p14:bwMode="auto" r:id="rId12">
             <p14:nvContentPartPr>
               <p14:cNvPr id="27" name="Ink 26">
@@ -10908,7 +12540,7 @@
             </p14:xfrm>
           </p:contentPart>
         </mc:Choice>
-        <mc:Fallback>
+        <mc:Fallback xmlns="">
           <p:pic>
             <p:nvPicPr>
               <p:cNvPr id="27" name="Ink 26">
@@ -10939,8 +12571,8 @@
           </p:pic>
         </mc:Fallback>
       </mc:AlternateContent>
-      <mc:AlternateContent xmlns:mc="http://schemas.openxmlformats.org/markup-compatibility/2006">
-        <mc:Choice xmlns:p14="http://schemas.microsoft.com/office/powerpoint/2010/main" Requires="p14">
+      <mc:AlternateContent xmlns:mc="http://schemas.openxmlformats.org/markup-compatibility/2006" xmlns:p14="http://schemas.microsoft.com/office/powerpoint/2010/main">
+        <mc:Choice Requires="p14">
           <p:contentPart p14:bwMode="auto" r:id="rId14">
             <p14:nvContentPartPr>
               <p14:cNvPr id="29" name="Ink 28">
@@ -10959,7 +12591,7 @@
             </p14:xfrm>
           </p:contentPart>
         </mc:Choice>
-        <mc:Fallback>
+        <mc:Fallback xmlns="">
           <p:pic>
             <p:nvPicPr>
               <p:cNvPr id="29" name="Ink 28">
@@ -10990,8 +12622,8 @@
           </p:pic>
         </mc:Fallback>
       </mc:AlternateContent>
-      <mc:AlternateContent xmlns:mc="http://schemas.openxmlformats.org/markup-compatibility/2006">
-        <mc:Choice xmlns:p14="http://schemas.microsoft.com/office/powerpoint/2010/main" Requires="p14">
+      <mc:AlternateContent xmlns:mc="http://schemas.openxmlformats.org/markup-compatibility/2006" xmlns:p14="http://schemas.microsoft.com/office/powerpoint/2010/main">
+        <mc:Choice Requires="p14">
           <p:contentPart p14:bwMode="auto" r:id="rId16">
             <p14:nvContentPartPr>
               <p14:cNvPr id="37" name="Ink 36">
@@ -11010,7 +12642,7 @@
             </p14:xfrm>
           </p:contentPart>
         </mc:Choice>
-        <mc:Fallback>
+        <mc:Fallback xmlns="">
           <p:pic>
             <p:nvPicPr>
               <p:cNvPr id="37" name="Ink 36">
@@ -11041,8 +12673,8 @@
           </p:pic>
         </mc:Fallback>
       </mc:AlternateContent>
-      <mc:AlternateContent xmlns:mc="http://schemas.openxmlformats.org/markup-compatibility/2006">
-        <mc:Choice xmlns:p14="http://schemas.microsoft.com/office/powerpoint/2010/main" Requires="p14">
+      <mc:AlternateContent xmlns:mc="http://schemas.openxmlformats.org/markup-compatibility/2006" xmlns:p14="http://schemas.microsoft.com/office/powerpoint/2010/main">
+        <mc:Choice Requires="p14">
           <p:contentPart p14:bwMode="auto" r:id="rId18">
             <p14:nvContentPartPr>
               <p14:cNvPr id="38" name="Ink 37">
@@ -11061,7 +12693,7 @@
             </p14:xfrm>
           </p:contentPart>
         </mc:Choice>
-        <mc:Fallback>
+        <mc:Fallback xmlns="">
           <p:pic>
             <p:nvPicPr>
               <p:cNvPr id="38" name="Ink 37">
@@ -11112,8 +12744,8 @@
             <a:chExt cx="54000" cy="83880"/>
           </a:xfrm>
         </p:grpSpPr>
-        <mc:AlternateContent xmlns:mc="http://schemas.openxmlformats.org/markup-compatibility/2006">
-          <mc:Choice xmlns:p14="http://schemas.microsoft.com/office/powerpoint/2010/main" Requires="p14">
+        <mc:AlternateContent xmlns:mc="http://schemas.openxmlformats.org/markup-compatibility/2006" xmlns:p14="http://schemas.microsoft.com/office/powerpoint/2010/main">
+          <mc:Choice Requires="p14">
             <p:contentPart p14:bwMode="auto" r:id="rId20">
               <p14:nvContentPartPr>
                 <p14:cNvPr id="42" name="Ink 41">
@@ -11132,7 +12764,7 @@
               </p14:xfrm>
             </p:contentPart>
           </mc:Choice>
-          <mc:Fallback>
+          <mc:Fallback xmlns="">
             <p:pic>
               <p:nvPicPr>
                 <p:cNvPr id="42" name="Ink 41">
@@ -11163,8 +12795,8 @@
             </p:pic>
           </mc:Fallback>
         </mc:AlternateContent>
-        <mc:AlternateContent xmlns:mc="http://schemas.openxmlformats.org/markup-compatibility/2006">
-          <mc:Choice xmlns:p14="http://schemas.microsoft.com/office/powerpoint/2010/main" Requires="p14">
+        <mc:AlternateContent xmlns:mc="http://schemas.openxmlformats.org/markup-compatibility/2006" xmlns:p14="http://schemas.microsoft.com/office/powerpoint/2010/main">
+          <mc:Choice Requires="p14">
             <p:contentPart p14:bwMode="auto" r:id="rId22">
               <p14:nvContentPartPr>
                 <p14:cNvPr id="43" name="Ink 42">
@@ -11183,7 +12815,7 @@
               </p14:xfrm>
             </p:contentPart>
           </mc:Choice>
-          <mc:Fallback>
+          <mc:Fallback xmlns="">
             <p:pic>
               <p:nvPicPr>
                 <p:cNvPr id="43" name="Ink 42">
@@ -11262,8 +12894,8 @@
           </a:extLst>
         </p:spPr>
       </p:pic>
-      <mc:AlternateContent xmlns:mc="http://schemas.openxmlformats.org/markup-compatibility/2006">
-        <mc:Choice xmlns:p14="http://schemas.microsoft.com/office/powerpoint/2010/main" Requires="p14">
+      <mc:AlternateContent xmlns:mc="http://schemas.openxmlformats.org/markup-compatibility/2006" xmlns:p14="http://schemas.microsoft.com/office/powerpoint/2010/main">
+        <mc:Choice Requires="p14">
           <p:contentPart p14:bwMode="auto" r:id="rId25">
             <p14:nvContentPartPr>
               <p14:cNvPr id="48" name="Ink 47">
@@ -11282,7 +12914,7 @@
             </p14:xfrm>
           </p:contentPart>
         </mc:Choice>
-        <mc:Fallback>
+        <mc:Fallback xmlns="">
           <p:pic>
             <p:nvPicPr>
               <p:cNvPr id="48" name="Ink 47">
@@ -11360,8 +12992,8 @@
           </a:extLst>
         </p:spPr>
       </p:pic>
-      <mc:AlternateContent xmlns:mc="http://schemas.openxmlformats.org/markup-compatibility/2006">
-        <mc:Choice xmlns:p14="http://schemas.microsoft.com/office/powerpoint/2010/main" Requires="p14">
+      <mc:AlternateContent xmlns:mc="http://schemas.openxmlformats.org/markup-compatibility/2006" xmlns:p14="http://schemas.microsoft.com/office/powerpoint/2010/main">
+        <mc:Choice Requires="p14">
           <p:contentPart p14:bwMode="auto" r:id="rId28">
             <p14:nvContentPartPr>
               <p14:cNvPr id="49" name="Ink 48">
@@ -11380,7 +13012,7 @@
             </p14:xfrm>
           </p:contentPart>
         </mc:Choice>
-        <mc:Fallback>
+        <mc:Fallback xmlns="">
           <p:pic>
             <p:nvPicPr>
               <p:cNvPr id="49" name="Ink 48">
@@ -11458,8 +13090,8 @@
           </a:extLst>
         </p:spPr>
       </p:pic>
-      <mc:AlternateContent xmlns:mc="http://schemas.openxmlformats.org/markup-compatibility/2006">
-        <mc:Choice xmlns:p14="http://schemas.microsoft.com/office/powerpoint/2010/main" Requires="p14">
+      <mc:AlternateContent xmlns:mc="http://schemas.openxmlformats.org/markup-compatibility/2006" xmlns:p14="http://schemas.microsoft.com/office/powerpoint/2010/main">
+        <mc:Choice Requires="p14">
           <p:contentPart p14:bwMode="auto" r:id="rId30">
             <p14:nvContentPartPr>
               <p14:cNvPr id="51" name="Ink 50">
@@ -11478,7 +13110,7 @@
             </p14:xfrm>
           </p:contentPart>
         </mc:Choice>
-        <mc:Fallback>
+        <mc:Fallback xmlns="">
           <p:pic>
             <p:nvPicPr>
               <p:cNvPr id="51" name="Ink 50">
@@ -11509,8 +13141,8 @@
           </p:pic>
         </mc:Fallback>
       </mc:AlternateContent>
-      <mc:AlternateContent xmlns:mc="http://schemas.openxmlformats.org/markup-compatibility/2006">
-        <mc:Choice xmlns:p14="http://schemas.microsoft.com/office/powerpoint/2010/main" Requires="p14">
+      <mc:AlternateContent xmlns:mc="http://schemas.openxmlformats.org/markup-compatibility/2006" xmlns:p14="http://schemas.microsoft.com/office/powerpoint/2010/main">
+        <mc:Choice Requires="p14">
           <p:contentPart p14:bwMode="auto" r:id="rId32">
             <p14:nvContentPartPr>
               <p14:cNvPr id="53" name="Ink 52">
@@ -11529,7 +13161,7 @@
             </p14:xfrm>
           </p:contentPart>
         </mc:Choice>
-        <mc:Fallback>
+        <mc:Fallback xmlns="">
           <p:pic>
             <p:nvPicPr>
               <p:cNvPr id="53" name="Ink 52">
@@ -11560,8 +13192,8 @@
           </p:pic>
         </mc:Fallback>
       </mc:AlternateContent>
-      <mc:AlternateContent xmlns:mc="http://schemas.openxmlformats.org/markup-compatibility/2006">
-        <mc:Choice xmlns:p14="http://schemas.microsoft.com/office/powerpoint/2010/main" Requires="p14">
+      <mc:AlternateContent xmlns:mc="http://schemas.openxmlformats.org/markup-compatibility/2006" xmlns:p14="http://schemas.microsoft.com/office/powerpoint/2010/main">
+        <mc:Choice Requires="p14">
           <p:contentPart p14:bwMode="auto" r:id="rId34">
             <p14:nvContentPartPr>
               <p14:cNvPr id="55" name="Ink 54">
@@ -11580,7 +13212,7 @@
             </p14:xfrm>
           </p:contentPart>
         </mc:Choice>
-        <mc:Fallback>
+        <mc:Fallback xmlns="">
           <p:pic>
             <p:nvPicPr>
               <p:cNvPr id="55" name="Ink 54">
@@ -11611,8 +13243,8 @@
           </p:pic>
         </mc:Fallback>
       </mc:AlternateContent>
-      <mc:AlternateContent xmlns:mc="http://schemas.openxmlformats.org/markup-compatibility/2006">
-        <mc:Choice xmlns:p14="http://schemas.microsoft.com/office/powerpoint/2010/main" Requires="p14">
+      <mc:AlternateContent xmlns:mc="http://schemas.openxmlformats.org/markup-compatibility/2006" xmlns:p14="http://schemas.microsoft.com/office/powerpoint/2010/main">
+        <mc:Choice Requires="p14">
           <p:contentPart p14:bwMode="auto" r:id="rId36">
             <p14:nvContentPartPr>
               <p14:cNvPr id="57" name="Ink 56">
@@ -11631,7 +13263,7 @@
             </p14:xfrm>
           </p:contentPart>
         </mc:Choice>
-        <mc:Fallback>
+        <mc:Fallback xmlns="">
           <p:pic>
             <p:nvPicPr>
               <p:cNvPr id="57" name="Ink 56">
@@ -11837,8 +13469,8 @@
           </a:p>
         </p:txBody>
       </p:sp>
-      <mc:AlternateContent xmlns:mc="http://schemas.openxmlformats.org/markup-compatibility/2006">
-        <mc:Choice xmlns:p14="http://schemas.microsoft.com/office/powerpoint/2010/main" Requires="p14">
+      <mc:AlternateContent xmlns:mc="http://schemas.openxmlformats.org/markup-compatibility/2006" xmlns:p14="http://schemas.microsoft.com/office/powerpoint/2010/main">
+        <mc:Choice Requires="p14">
           <p:contentPart p14:bwMode="auto" r:id="rId38">
             <p14:nvContentPartPr>
               <p14:cNvPr id="2066" name="Ink 2065">
@@ -11857,7 +13489,7 @@
             </p14:xfrm>
           </p:contentPart>
         </mc:Choice>
-        <mc:Fallback>
+        <mc:Fallback xmlns="">
           <p:pic>
             <p:nvPicPr>
               <p:cNvPr id="2066" name="Ink 2065">
@@ -11888,8 +13520,8 @@
           </p:pic>
         </mc:Fallback>
       </mc:AlternateContent>
-      <mc:AlternateContent xmlns:mc="http://schemas.openxmlformats.org/markup-compatibility/2006">
-        <mc:Choice xmlns:p14="http://schemas.microsoft.com/office/powerpoint/2010/main" Requires="p14">
+      <mc:AlternateContent xmlns:mc="http://schemas.openxmlformats.org/markup-compatibility/2006" xmlns:p14="http://schemas.microsoft.com/office/powerpoint/2010/main">
+        <mc:Choice Requires="p14">
           <p:contentPart p14:bwMode="auto" r:id="rId40">
             <p14:nvContentPartPr>
               <p14:cNvPr id="2065" name="Ink 2064">
@@ -11908,7 +13540,7 @@
             </p14:xfrm>
           </p:contentPart>
         </mc:Choice>
-        <mc:Fallback>
+        <mc:Fallback xmlns="">
           <p:pic>
             <p:nvPicPr>
               <p:cNvPr id="2065" name="Ink 2064">
@@ -11939,8 +13571,8 @@
           </p:pic>
         </mc:Fallback>
       </mc:AlternateContent>
-      <mc:AlternateContent xmlns:mc="http://schemas.openxmlformats.org/markup-compatibility/2006">
-        <mc:Choice xmlns:p14="http://schemas.microsoft.com/office/powerpoint/2010/main" Requires="p14">
+      <mc:AlternateContent xmlns:mc="http://schemas.openxmlformats.org/markup-compatibility/2006" xmlns:p14="http://schemas.microsoft.com/office/powerpoint/2010/main">
+        <mc:Choice Requires="p14">
           <p:contentPart p14:bwMode="auto" r:id="rId42">
             <p14:nvContentPartPr>
               <p14:cNvPr id="2064" name="Ink 2063">
@@ -11959,7 +13591,7 @@
             </p14:xfrm>
           </p:contentPart>
         </mc:Choice>
-        <mc:Fallback>
+        <mc:Fallback xmlns="">
           <p:pic>
             <p:nvPicPr>
               <p:cNvPr id="2064" name="Ink 2063">
@@ -11990,8 +13622,8 @@
           </p:pic>
         </mc:Fallback>
       </mc:AlternateContent>
-      <mc:AlternateContent xmlns:mc="http://schemas.openxmlformats.org/markup-compatibility/2006">
-        <mc:Choice xmlns:p14="http://schemas.microsoft.com/office/powerpoint/2010/main" Requires="p14">
+      <mc:AlternateContent xmlns:mc="http://schemas.openxmlformats.org/markup-compatibility/2006" xmlns:p14="http://schemas.microsoft.com/office/powerpoint/2010/main">
+        <mc:Choice Requires="p14">
           <p:contentPart p14:bwMode="auto" r:id="rId44">
             <p14:nvContentPartPr>
               <p14:cNvPr id="2067" name="Ink 2066">
@@ -12010,7 +13642,7 @@
             </p14:xfrm>
           </p:contentPart>
         </mc:Choice>
-        <mc:Fallback>
+        <mc:Fallback xmlns="">
           <p:pic>
             <p:nvPicPr>
               <p:cNvPr id="2067" name="Ink 2066">
@@ -12041,8 +13673,8 @@
           </p:pic>
         </mc:Fallback>
       </mc:AlternateContent>
-      <mc:AlternateContent xmlns:mc="http://schemas.openxmlformats.org/markup-compatibility/2006">
-        <mc:Choice xmlns:p14="http://schemas.microsoft.com/office/powerpoint/2010/main" Requires="p14">
+      <mc:AlternateContent xmlns:mc="http://schemas.openxmlformats.org/markup-compatibility/2006" xmlns:p14="http://schemas.microsoft.com/office/powerpoint/2010/main">
+        <mc:Choice Requires="p14">
           <p:contentPart p14:bwMode="auto" r:id="rId46">
             <p14:nvContentPartPr>
               <p14:cNvPr id="2068" name="Ink 2067">
@@ -12061,7 +13693,7 @@
             </p14:xfrm>
           </p:contentPart>
         </mc:Choice>
-        <mc:Fallback>
+        <mc:Fallback xmlns="">
           <p:pic>
             <p:nvPicPr>
               <p:cNvPr id="2068" name="Ink 2067">
@@ -12092,8 +13724,8 @@
           </p:pic>
         </mc:Fallback>
       </mc:AlternateContent>
-      <mc:AlternateContent xmlns:mc="http://schemas.openxmlformats.org/markup-compatibility/2006">
-        <mc:Choice xmlns:p14="http://schemas.microsoft.com/office/powerpoint/2010/main" Requires="p14">
+      <mc:AlternateContent xmlns:mc="http://schemas.openxmlformats.org/markup-compatibility/2006" xmlns:p14="http://schemas.microsoft.com/office/powerpoint/2010/main">
+        <mc:Choice Requires="p14">
           <p:contentPart p14:bwMode="auto" r:id="rId47">
             <p14:nvContentPartPr>
               <p14:cNvPr id="2069" name="Ink 2068">
@@ -12112,7 +13744,7 @@
             </p14:xfrm>
           </p:contentPart>
         </mc:Choice>
-        <mc:Fallback>
+        <mc:Fallback xmlns="">
           <p:pic>
             <p:nvPicPr>
               <p:cNvPr id="2069" name="Ink 2068">
@@ -12143,8 +13775,8 @@
           </p:pic>
         </mc:Fallback>
       </mc:AlternateContent>
-      <mc:AlternateContent xmlns:mc="http://schemas.openxmlformats.org/markup-compatibility/2006">
-        <mc:Choice xmlns:p14="http://schemas.microsoft.com/office/powerpoint/2010/main" Requires="p14">
+      <mc:AlternateContent xmlns:mc="http://schemas.openxmlformats.org/markup-compatibility/2006" xmlns:p14="http://schemas.microsoft.com/office/powerpoint/2010/main">
+        <mc:Choice Requires="p14">
           <p:contentPart p14:bwMode="auto" r:id="rId48">
             <p14:nvContentPartPr>
               <p14:cNvPr id="2070" name="Ink 2069">
@@ -12163,7 +13795,7 @@
             </p14:xfrm>
           </p:contentPart>
         </mc:Choice>
-        <mc:Fallback>
+        <mc:Fallback xmlns="">
           <p:pic>
             <p:nvPicPr>
               <p:cNvPr id="2070" name="Ink 2069">
@@ -12194,8 +13826,8 @@
           </p:pic>
         </mc:Fallback>
       </mc:AlternateContent>
-      <mc:AlternateContent xmlns:mc="http://schemas.openxmlformats.org/markup-compatibility/2006">
-        <mc:Choice xmlns:p14="http://schemas.microsoft.com/office/powerpoint/2010/main" Requires="p14">
+      <mc:AlternateContent xmlns:mc="http://schemas.openxmlformats.org/markup-compatibility/2006" xmlns:p14="http://schemas.microsoft.com/office/powerpoint/2010/main">
+        <mc:Choice Requires="p14">
           <p:contentPart p14:bwMode="auto" r:id="rId49">
             <p14:nvContentPartPr>
               <p14:cNvPr id="2071" name="Ink 2070">
@@ -12214,7 +13846,7 @@
             </p14:xfrm>
           </p:contentPart>
         </mc:Choice>
-        <mc:Fallback>
+        <mc:Fallback xmlns="">
           <p:pic>
             <p:nvPicPr>
               <p:cNvPr id="2071" name="Ink 2070">
@@ -12245,8 +13877,8 @@
           </p:pic>
         </mc:Fallback>
       </mc:AlternateContent>
-      <mc:AlternateContent xmlns:mc="http://schemas.openxmlformats.org/markup-compatibility/2006">
-        <mc:Choice xmlns:p14="http://schemas.microsoft.com/office/powerpoint/2010/main" Requires="p14">
+      <mc:AlternateContent xmlns:mc="http://schemas.openxmlformats.org/markup-compatibility/2006" xmlns:p14="http://schemas.microsoft.com/office/powerpoint/2010/main">
+        <mc:Choice Requires="p14">
           <p:contentPart p14:bwMode="auto" r:id="rId50">
             <p14:nvContentPartPr>
               <p14:cNvPr id="2072" name="Ink 2071">
@@ -12265,7 +13897,7 @@
             </p14:xfrm>
           </p:contentPart>
         </mc:Choice>
-        <mc:Fallback>
+        <mc:Fallback xmlns="">
           <p:pic>
             <p:nvPicPr>
               <p:cNvPr id="2072" name="Ink 2071">
@@ -12296,8 +13928,8 @@
           </p:pic>
         </mc:Fallback>
       </mc:AlternateContent>
-      <mc:AlternateContent xmlns:mc="http://schemas.openxmlformats.org/markup-compatibility/2006">
-        <mc:Choice xmlns:p14="http://schemas.microsoft.com/office/powerpoint/2010/main" Requires="p14">
+      <mc:AlternateContent xmlns:mc="http://schemas.openxmlformats.org/markup-compatibility/2006" xmlns:p14="http://schemas.microsoft.com/office/powerpoint/2010/main">
+        <mc:Choice Requires="p14">
           <p:contentPart p14:bwMode="auto" r:id="rId51">
             <p14:nvContentPartPr>
               <p14:cNvPr id="2073" name="Ink 2072">
@@ -12316,7 +13948,7 @@
             </p14:xfrm>
           </p:contentPart>
         </mc:Choice>
-        <mc:Fallback>
+        <mc:Fallback xmlns="">
           <p:pic>
             <p:nvPicPr>
               <p:cNvPr id="2073" name="Ink 2072">
@@ -12347,8 +13979,8 @@
           </p:pic>
         </mc:Fallback>
       </mc:AlternateContent>
-      <mc:AlternateContent xmlns:mc="http://schemas.openxmlformats.org/markup-compatibility/2006">
-        <mc:Choice xmlns:p14="http://schemas.microsoft.com/office/powerpoint/2010/main" Requires="p14">
+      <mc:AlternateContent xmlns:mc="http://schemas.openxmlformats.org/markup-compatibility/2006" xmlns:p14="http://schemas.microsoft.com/office/powerpoint/2010/main">
+        <mc:Choice Requires="p14">
           <p:contentPart p14:bwMode="auto" r:id="rId52">
             <p14:nvContentPartPr>
               <p14:cNvPr id="2074" name="Ink 2073">
@@ -12367,7 +13999,7 @@
             </p14:xfrm>
           </p:contentPart>
         </mc:Choice>
-        <mc:Fallback>
+        <mc:Fallback xmlns="">
           <p:pic>
             <p:nvPicPr>
               <p:cNvPr id="2074" name="Ink 2073">
@@ -12398,8 +14030,8 @@
           </p:pic>
         </mc:Fallback>
       </mc:AlternateContent>
-      <mc:AlternateContent xmlns:mc="http://schemas.openxmlformats.org/markup-compatibility/2006">
-        <mc:Choice xmlns:p14="http://schemas.microsoft.com/office/powerpoint/2010/main" Requires="p14">
+      <mc:AlternateContent xmlns:mc="http://schemas.openxmlformats.org/markup-compatibility/2006" xmlns:p14="http://schemas.microsoft.com/office/powerpoint/2010/main">
+        <mc:Choice Requires="p14">
           <p:contentPart p14:bwMode="auto" r:id="rId53">
             <p14:nvContentPartPr>
               <p14:cNvPr id="2075" name="Ink 2074">
@@ -12418,7 +14050,7 @@
             </p14:xfrm>
           </p:contentPart>
         </mc:Choice>
-        <mc:Fallback>
+        <mc:Fallback xmlns="">
           <p:pic>
             <p:nvPicPr>
               <p:cNvPr id="2075" name="Ink 2074">
@@ -12449,8 +14081,8 @@
           </p:pic>
         </mc:Fallback>
       </mc:AlternateContent>
-      <mc:AlternateContent xmlns:mc="http://schemas.openxmlformats.org/markup-compatibility/2006">
-        <mc:Choice xmlns:p14="http://schemas.microsoft.com/office/powerpoint/2010/main" Requires="p14">
+      <mc:AlternateContent xmlns:mc="http://schemas.openxmlformats.org/markup-compatibility/2006" xmlns:p14="http://schemas.microsoft.com/office/powerpoint/2010/main">
+        <mc:Choice Requires="p14">
           <p:contentPart p14:bwMode="auto" r:id="rId54">
             <p14:nvContentPartPr>
               <p14:cNvPr id="2093" name="Ink 2092">
@@ -12469,7 +14101,7 @@
             </p14:xfrm>
           </p:contentPart>
         </mc:Choice>
-        <mc:Fallback>
+        <mc:Fallback xmlns="">
           <p:pic>
             <p:nvPicPr>
               <p:cNvPr id="2093" name="Ink 2092">
@@ -12500,8 +14132,8 @@
           </p:pic>
         </mc:Fallback>
       </mc:AlternateContent>
-      <mc:AlternateContent xmlns:mc="http://schemas.openxmlformats.org/markup-compatibility/2006">
-        <mc:Choice xmlns:p14="http://schemas.microsoft.com/office/powerpoint/2010/main" Requires="p14">
+      <mc:AlternateContent xmlns:mc="http://schemas.openxmlformats.org/markup-compatibility/2006" xmlns:p14="http://schemas.microsoft.com/office/powerpoint/2010/main">
+        <mc:Choice Requires="p14">
           <p:contentPart p14:bwMode="auto" r:id="rId56">
             <p14:nvContentPartPr>
               <p14:cNvPr id="2085" name="Ink 2084">
@@ -12520,7 +14152,7 @@
             </p14:xfrm>
           </p:contentPart>
         </mc:Choice>
-        <mc:Fallback>
+        <mc:Fallback xmlns="">
           <p:pic>
             <p:nvPicPr>
               <p:cNvPr id="2085" name="Ink 2084">
@@ -12551,8 +14183,8 @@
           </p:pic>
         </mc:Fallback>
       </mc:AlternateContent>
-      <mc:AlternateContent xmlns:mc="http://schemas.openxmlformats.org/markup-compatibility/2006">
-        <mc:Choice xmlns:p14="http://schemas.microsoft.com/office/powerpoint/2010/main" Requires="p14">
+      <mc:AlternateContent xmlns:mc="http://schemas.openxmlformats.org/markup-compatibility/2006" xmlns:p14="http://schemas.microsoft.com/office/powerpoint/2010/main">
+        <mc:Choice Requires="p14">
           <p:contentPart p14:bwMode="auto" r:id="rId57">
             <p14:nvContentPartPr>
               <p14:cNvPr id="2092" name="Ink 2091">
@@ -12571,7 +14203,7 @@
             </p14:xfrm>
           </p:contentPart>
         </mc:Choice>
-        <mc:Fallback>
+        <mc:Fallback xmlns="">
           <p:pic>
             <p:nvPicPr>
               <p:cNvPr id="2092" name="Ink 2091">
@@ -12602,8 +14234,8 @@
           </p:pic>
         </mc:Fallback>
       </mc:AlternateContent>
-      <mc:AlternateContent xmlns:mc="http://schemas.openxmlformats.org/markup-compatibility/2006">
-        <mc:Choice xmlns:p14="http://schemas.microsoft.com/office/powerpoint/2010/main" Requires="p14">
+      <mc:AlternateContent xmlns:mc="http://schemas.openxmlformats.org/markup-compatibility/2006" xmlns:p14="http://schemas.microsoft.com/office/powerpoint/2010/main">
+        <mc:Choice Requires="p14">
           <p:contentPart p14:bwMode="auto" r:id="rId59">
             <p14:nvContentPartPr>
               <p14:cNvPr id="2090" name="Ink 2089">
@@ -12622,7 +14254,7 @@
             </p14:xfrm>
           </p:contentPart>
         </mc:Choice>
-        <mc:Fallback>
+        <mc:Fallback xmlns="">
           <p:pic>
             <p:nvPicPr>
               <p:cNvPr id="2090" name="Ink 2089">
@@ -12653,8 +14285,8 @@
           </p:pic>
         </mc:Fallback>
       </mc:AlternateContent>
-      <mc:AlternateContent xmlns:mc="http://schemas.openxmlformats.org/markup-compatibility/2006">
-        <mc:Choice xmlns:p14="http://schemas.microsoft.com/office/powerpoint/2010/main" Requires="p14">
+      <mc:AlternateContent xmlns:mc="http://schemas.openxmlformats.org/markup-compatibility/2006" xmlns:p14="http://schemas.microsoft.com/office/powerpoint/2010/main">
+        <mc:Choice Requires="p14">
           <p:contentPart p14:bwMode="auto" r:id="rId61">
             <p14:nvContentPartPr>
               <p14:cNvPr id="2094" name="Ink 2093">
@@ -12673,7 +14305,7 @@
             </p14:xfrm>
           </p:contentPart>
         </mc:Choice>
-        <mc:Fallback>
+        <mc:Fallback xmlns="">
           <p:pic>
             <p:nvPicPr>
               <p:cNvPr id="2094" name="Ink 2093">
@@ -12704,8 +14336,8 @@
           </p:pic>
         </mc:Fallback>
       </mc:AlternateContent>
-      <mc:AlternateContent xmlns:mc="http://schemas.openxmlformats.org/markup-compatibility/2006">
-        <mc:Choice xmlns:p14="http://schemas.microsoft.com/office/powerpoint/2010/main" Requires="p14">
+      <mc:AlternateContent xmlns:mc="http://schemas.openxmlformats.org/markup-compatibility/2006" xmlns:p14="http://schemas.microsoft.com/office/powerpoint/2010/main">
+        <mc:Choice Requires="p14">
           <p:contentPart p14:bwMode="auto" r:id="rId62">
             <p14:nvContentPartPr>
               <p14:cNvPr id="2095" name="Ink 2094">
@@ -12724,7 +14356,7 @@
             </p14:xfrm>
           </p:contentPart>
         </mc:Choice>
-        <mc:Fallback>
+        <mc:Fallback xmlns="">
           <p:pic>
             <p:nvPicPr>
               <p:cNvPr id="2095" name="Ink 2094">
@@ -12755,8 +14387,8 @@
           </p:pic>
         </mc:Fallback>
       </mc:AlternateContent>
-      <mc:AlternateContent xmlns:mc="http://schemas.openxmlformats.org/markup-compatibility/2006">
-        <mc:Choice xmlns:p14="http://schemas.microsoft.com/office/powerpoint/2010/main" Requires="p14">
+      <mc:AlternateContent xmlns:mc="http://schemas.openxmlformats.org/markup-compatibility/2006" xmlns:p14="http://schemas.microsoft.com/office/powerpoint/2010/main">
+        <mc:Choice Requires="p14">
           <p:contentPart p14:bwMode="auto" r:id="rId63">
             <p14:nvContentPartPr>
               <p14:cNvPr id="2096" name="Ink 2095">
@@ -12775,7 +14407,7 @@
             </p14:xfrm>
           </p:contentPart>
         </mc:Choice>
-        <mc:Fallback>
+        <mc:Fallback xmlns="">
           <p:pic>
             <p:nvPicPr>
               <p:cNvPr id="2096" name="Ink 2095">
@@ -12806,8 +14438,8 @@
           </p:pic>
         </mc:Fallback>
       </mc:AlternateContent>
-      <mc:AlternateContent xmlns:mc="http://schemas.openxmlformats.org/markup-compatibility/2006">
-        <mc:Choice xmlns:p14="http://schemas.microsoft.com/office/powerpoint/2010/main" Requires="p14">
+      <mc:AlternateContent xmlns:mc="http://schemas.openxmlformats.org/markup-compatibility/2006" xmlns:p14="http://schemas.microsoft.com/office/powerpoint/2010/main">
+        <mc:Choice Requires="p14">
           <p:contentPart p14:bwMode="auto" r:id="rId64">
             <p14:nvContentPartPr>
               <p14:cNvPr id="2097" name="Ink 2096">
@@ -12826,7 +14458,7 @@
             </p14:xfrm>
           </p:contentPart>
         </mc:Choice>
-        <mc:Fallback>
+        <mc:Fallback xmlns="">
           <p:pic>
             <p:nvPicPr>
               <p:cNvPr id="2097" name="Ink 2096">
@@ -12857,8 +14489,8 @@
           </p:pic>
         </mc:Fallback>
       </mc:AlternateContent>
-      <mc:AlternateContent xmlns:mc="http://schemas.openxmlformats.org/markup-compatibility/2006">
-        <mc:Choice xmlns:p14="http://schemas.microsoft.com/office/powerpoint/2010/main" Requires="p14">
+      <mc:AlternateContent xmlns:mc="http://schemas.openxmlformats.org/markup-compatibility/2006" xmlns:p14="http://schemas.microsoft.com/office/powerpoint/2010/main">
+        <mc:Choice Requires="p14">
           <p:contentPart p14:bwMode="auto" r:id="rId65">
             <p14:nvContentPartPr>
               <p14:cNvPr id="2106" name="Ink 2105">
@@ -12877,7 +14509,7 @@
             </p14:xfrm>
           </p:contentPart>
         </mc:Choice>
-        <mc:Fallback>
+        <mc:Fallback xmlns="">
           <p:pic>
             <p:nvPicPr>
               <p:cNvPr id="2106" name="Ink 2105">
@@ -12908,8 +14540,8 @@
           </p:pic>
         </mc:Fallback>
       </mc:AlternateContent>
-      <mc:AlternateContent xmlns:mc="http://schemas.openxmlformats.org/markup-compatibility/2006">
-        <mc:Choice xmlns:p14="http://schemas.microsoft.com/office/powerpoint/2010/main" Requires="p14">
+      <mc:AlternateContent xmlns:mc="http://schemas.openxmlformats.org/markup-compatibility/2006" xmlns:p14="http://schemas.microsoft.com/office/powerpoint/2010/main">
+        <mc:Choice Requires="p14">
           <p:contentPart p14:bwMode="auto" r:id="rId66">
             <p14:nvContentPartPr>
               <p14:cNvPr id="2107" name="Ink 2106">
@@ -12928,7 +14560,7 @@
             </p14:xfrm>
           </p:contentPart>
         </mc:Choice>
-        <mc:Fallback>
+        <mc:Fallback xmlns="">
           <p:pic>
             <p:nvPicPr>
               <p:cNvPr id="2107" name="Ink 2106">
@@ -12959,8 +14591,8 @@
           </p:pic>
         </mc:Fallback>
       </mc:AlternateContent>
-      <mc:AlternateContent xmlns:mc="http://schemas.openxmlformats.org/markup-compatibility/2006">
-        <mc:Choice xmlns:p14="http://schemas.microsoft.com/office/powerpoint/2010/main" Requires="p14">
+      <mc:AlternateContent xmlns:mc="http://schemas.openxmlformats.org/markup-compatibility/2006" xmlns:p14="http://schemas.microsoft.com/office/powerpoint/2010/main">
+        <mc:Choice Requires="p14">
           <p:contentPart p14:bwMode="auto" r:id="rId67">
             <p14:nvContentPartPr>
               <p14:cNvPr id="2108" name="Ink 2107">
@@ -12979,7 +14611,7 @@
             </p14:xfrm>
           </p:contentPart>
         </mc:Choice>
-        <mc:Fallback>
+        <mc:Fallback xmlns="">
           <p:pic>
             <p:nvPicPr>
               <p:cNvPr id="2108" name="Ink 2107">
@@ -13010,8 +14642,8 @@
           </p:pic>
         </mc:Fallback>
       </mc:AlternateContent>
-      <mc:AlternateContent xmlns:mc="http://schemas.openxmlformats.org/markup-compatibility/2006">
-        <mc:Choice xmlns:p14="http://schemas.microsoft.com/office/powerpoint/2010/main" Requires="p14">
+      <mc:AlternateContent xmlns:mc="http://schemas.openxmlformats.org/markup-compatibility/2006" xmlns:p14="http://schemas.microsoft.com/office/powerpoint/2010/main">
+        <mc:Choice Requires="p14">
           <p:contentPart p14:bwMode="auto" r:id="rId68">
             <p14:nvContentPartPr>
               <p14:cNvPr id="2109" name="Ink 2108">
@@ -13030,7 +14662,7 @@
             </p14:xfrm>
           </p:contentPart>
         </mc:Choice>
-        <mc:Fallback>
+        <mc:Fallback xmlns="">
           <p:pic>
             <p:nvPicPr>
               <p:cNvPr id="2109" name="Ink 2108">
@@ -13061,8 +14693,8 @@
           </p:pic>
         </mc:Fallback>
       </mc:AlternateContent>
-      <mc:AlternateContent xmlns:mc="http://schemas.openxmlformats.org/markup-compatibility/2006">
-        <mc:Choice xmlns:p14="http://schemas.microsoft.com/office/powerpoint/2010/main" Requires="p14">
+      <mc:AlternateContent xmlns:mc="http://schemas.openxmlformats.org/markup-compatibility/2006" xmlns:p14="http://schemas.microsoft.com/office/powerpoint/2010/main">
+        <mc:Choice Requires="p14">
           <p:contentPart p14:bwMode="auto" r:id="rId69">
             <p14:nvContentPartPr>
               <p14:cNvPr id="2110" name="Ink 2109">
@@ -13081,7 +14713,7 @@
             </p14:xfrm>
           </p:contentPart>
         </mc:Choice>
-        <mc:Fallback>
+        <mc:Fallback xmlns="">
           <p:pic>
             <p:nvPicPr>
               <p:cNvPr id="2110" name="Ink 2109">
@@ -13112,8 +14744,8 @@
           </p:pic>
         </mc:Fallback>
       </mc:AlternateContent>
-      <mc:AlternateContent xmlns:mc="http://schemas.openxmlformats.org/markup-compatibility/2006">
-        <mc:Choice xmlns:p14="http://schemas.microsoft.com/office/powerpoint/2010/main" Requires="p14">
+      <mc:AlternateContent xmlns:mc="http://schemas.openxmlformats.org/markup-compatibility/2006" xmlns:p14="http://schemas.microsoft.com/office/powerpoint/2010/main">
+        <mc:Choice Requires="p14">
           <p:contentPart p14:bwMode="auto" r:id="rId70">
             <p14:nvContentPartPr>
               <p14:cNvPr id="2111" name="Ink 2110">
@@ -13132,7 +14764,7 @@
             </p14:xfrm>
           </p:contentPart>
         </mc:Choice>
-        <mc:Fallback>
+        <mc:Fallback xmlns="">
           <p:pic>
             <p:nvPicPr>
               <p:cNvPr id="2111" name="Ink 2110">
@@ -13163,8 +14795,8 @@
           </p:pic>
         </mc:Fallback>
       </mc:AlternateContent>
-      <mc:AlternateContent xmlns:mc="http://schemas.openxmlformats.org/markup-compatibility/2006">
-        <mc:Choice xmlns:p14="http://schemas.microsoft.com/office/powerpoint/2010/main" Requires="p14">
+      <mc:AlternateContent xmlns:mc="http://schemas.openxmlformats.org/markup-compatibility/2006" xmlns:p14="http://schemas.microsoft.com/office/powerpoint/2010/main">
+        <mc:Choice Requires="p14">
           <p:contentPart p14:bwMode="auto" r:id="rId71">
             <p14:nvContentPartPr>
               <p14:cNvPr id="2112" name="Ink 2111">
@@ -13183,7 +14815,7 @@
             </p14:xfrm>
           </p:contentPart>
         </mc:Choice>
-        <mc:Fallback>
+        <mc:Fallback xmlns="">
           <p:pic>
             <p:nvPicPr>
               <p:cNvPr id="2112" name="Ink 2111">
@@ -13214,8 +14846,8 @@
           </p:pic>
         </mc:Fallback>
       </mc:AlternateContent>
-      <mc:AlternateContent xmlns:mc="http://schemas.openxmlformats.org/markup-compatibility/2006">
-        <mc:Choice xmlns:p14="http://schemas.microsoft.com/office/powerpoint/2010/main" Requires="p14">
+      <mc:AlternateContent xmlns:mc="http://schemas.openxmlformats.org/markup-compatibility/2006" xmlns:p14="http://schemas.microsoft.com/office/powerpoint/2010/main">
+        <mc:Choice Requires="p14">
           <p:contentPart p14:bwMode="auto" r:id="rId72">
             <p14:nvContentPartPr>
               <p14:cNvPr id="2113" name="Ink 2112">
@@ -13234,7 +14866,7 @@
             </p14:xfrm>
           </p:contentPart>
         </mc:Choice>
-        <mc:Fallback>
+        <mc:Fallback xmlns="">
           <p:pic>
             <p:nvPicPr>
               <p:cNvPr id="2113" name="Ink 2112">
@@ -13304,8 +14936,8 @@
           </a:p>
         </p:txBody>
       </p:sp>
-      <mc:AlternateContent xmlns:mc="http://schemas.openxmlformats.org/markup-compatibility/2006">
-        <mc:Choice xmlns:p14="http://schemas.microsoft.com/office/powerpoint/2010/main" Requires="p14">
+      <mc:AlternateContent xmlns:mc="http://schemas.openxmlformats.org/markup-compatibility/2006" xmlns:p14="http://schemas.microsoft.com/office/powerpoint/2010/main">
+        <mc:Choice Requires="p14">
           <p:contentPart p14:bwMode="auto" r:id="rId73">
             <p14:nvContentPartPr>
               <p14:cNvPr id="2117" name="Ink 2116">
@@ -13324,7 +14956,7 @@
             </p14:xfrm>
           </p:contentPart>
         </mc:Choice>
-        <mc:Fallback>
+        <mc:Fallback xmlns="">
           <p:pic>
             <p:nvPicPr>
               <p:cNvPr id="2117" name="Ink 2116">
@@ -13375,8 +15007,8 @@
             <a:chExt cx="74160" cy="88560"/>
           </a:xfrm>
         </p:grpSpPr>
-        <mc:AlternateContent xmlns:mc="http://schemas.openxmlformats.org/markup-compatibility/2006">
-          <mc:Choice xmlns:p14="http://schemas.microsoft.com/office/powerpoint/2010/main" Requires="p14">
+        <mc:AlternateContent xmlns:mc="http://schemas.openxmlformats.org/markup-compatibility/2006" xmlns:p14="http://schemas.microsoft.com/office/powerpoint/2010/main">
+          <mc:Choice Requires="p14">
             <p:contentPart p14:bwMode="auto" r:id="rId75">
               <p14:nvContentPartPr>
                 <p14:cNvPr id="2118" name="Ink 2117">
@@ -13395,7 +15027,7 @@
               </p14:xfrm>
             </p:contentPart>
           </mc:Choice>
-          <mc:Fallback>
+          <mc:Fallback xmlns="">
             <p:pic>
               <p:nvPicPr>
                 <p:cNvPr id="2118" name="Ink 2117">
@@ -13426,8 +15058,8 @@
             </p:pic>
           </mc:Fallback>
         </mc:AlternateContent>
-        <mc:AlternateContent xmlns:mc="http://schemas.openxmlformats.org/markup-compatibility/2006">
-          <mc:Choice xmlns:p14="http://schemas.microsoft.com/office/powerpoint/2010/main" Requires="p14">
+        <mc:AlternateContent xmlns:mc="http://schemas.openxmlformats.org/markup-compatibility/2006" xmlns:p14="http://schemas.microsoft.com/office/powerpoint/2010/main">
+          <mc:Choice Requires="p14">
             <p:contentPart p14:bwMode="auto" r:id="rId77">
               <p14:nvContentPartPr>
                 <p14:cNvPr id="2119" name="Ink 2118">
@@ -13446,7 +15078,7 @@
               </p14:xfrm>
             </p:contentPart>
           </mc:Choice>
-          <mc:Fallback>
+          <mc:Fallback xmlns="">
             <p:pic>
               <p:nvPicPr>
                 <p:cNvPr id="2119" name="Ink 2118">
@@ -13477,8 +15109,8 @@
             </p:pic>
           </mc:Fallback>
         </mc:AlternateContent>
-        <mc:AlternateContent xmlns:mc="http://schemas.openxmlformats.org/markup-compatibility/2006">
-          <mc:Choice xmlns:p14="http://schemas.microsoft.com/office/powerpoint/2010/main" Requires="p14">
+        <mc:AlternateContent xmlns:mc="http://schemas.openxmlformats.org/markup-compatibility/2006" xmlns:p14="http://schemas.microsoft.com/office/powerpoint/2010/main">
+          <mc:Choice Requires="p14">
             <p:contentPart p14:bwMode="auto" r:id="rId79">
               <p14:nvContentPartPr>
                 <p14:cNvPr id="2120" name="Ink 2119">
@@ -13497,7 +15129,7 @@
               </p14:xfrm>
             </p:contentPart>
           </mc:Choice>
-          <mc:Fallback>
+          <mc:Fallback xmlns="">
             <p:pic>
               <p:nvPicPr>
                 <p:cNvPr id="2120" name="Ink 2119">
@@ -13529,8 +15161,8 @@
           </mc:Fallback>
         </mc:AlternateContent>
       </p:grpSp>
-      <mc:AlternateContent xmlns:mc="http://schemas.openxmlformats.org/markup-compatibility/2006">
-        <mc:Choice xmlns:p14="http://schemas.microsoft.com/office/powerpoint/2010/main" Requires="p14">
+      <mc:AlternateContent xmlns:mc="http://schemas.openxmlformats.org/markup-compatibility/2006" xmlns:p14="http://schemas.microsoft.com/office/powerpoint/2010/main">
+        <mc:Choice Requires="p14">
           <p:contentPart p14:bwMode="auto" r:id="rId81">
             <p14:nvContentPartPr>
               <p14:cNvPr id="2124" name="Ink 2123">
@@ -13549,7 +15181,7 @@
             </p14:xfrm>
           </p:contentPart>
         </mc:Choice>
-        <mc:Fallback>
+        <mc:Fallback xmlns="">
           <p:pic>
             <p:nvPicPr>
               <p:cNvPr id="2124" name="Ink 2123">
@@ -13580,8 +15212,8 @@
           </p:pic>
         </mc:Fallback>
       </mc:AlternateContent>
-      <mc:AlternateContent xmlns:mc="http://schemas.openxmlformats.org/markup-compatibility/2006">
-        <mc:Choice xmlns:p14="http://schemas.microsoft.com/office/powerpoint/2010/main" Requires="p14">
+      <mc:AlternateContent xmlns:mc="http://schemas.openxmlformats.org/markup-compatibility/2006" xmlns:p14="http://schemas.microsoft.com/office/powerpoint/2010/main">
+        <mc:Choice Requires="p14">
           <p:contentPart p14:bwMode="auto" r:id="rId83">
             <p14:nvContentPartPr>
               <p14:cNvPr id="2125" name="Ink 2124">
@@ -13600,7 +15232,7 @@
             </p14:xfrm>
           </p:contentPart>
         </mc:Choice>
-        <mc:Fallback>
+        <mc:Fallback xmlns="">
           <p:pic>
             <p:nvPicPr>
               <p:cNvPr id="2125" name="Ink 2124">
@@ -13631,8 +15263,8 @@
           </p:pic>
         </mc:Fallback>
       </mc:AlternateContent>
-      <mc:AlternateContent xmlns:mc="http://schemas.openxmlformats.org/markup-compatibility/2006">
-        <mc:Choice xmlns:p14="http://schemas.microsoft.com/office/powerpoint/2010/main" Requires="p14">
+      <mc:AlternateContent xmlns:mc="http://schemas.openxmlformats.org/markup-compatibility/2006" xmlns:p14="http://schemas.microsoft.com/office/powerpoint/2010/main">
+        <mc:Choice Requires="p14">
           <p:contentPart p14:bwMode="auto" r:id="rId85">
             <p14:nvContentPartPr>
               <p14:cNvPr id="2127" name="Ink 2126">
@@ -13651,7 +15283,7 @@
             </p14:xfrm>
           </p:contentPart>
         </mc:Choice>
-        <mc:Fallback>
+        <mc:Fallback xmlns="">
           <p:pic>
             <p:nvPicPr>
               <p:cNvPr id="2127" name="Ink 2126">
@@ -13682,8 +15314,8 @@
           </p:pic>
         </mc:Fallback>
       </mc:AlternateContent>
-      <mc:AlternateContent xmlns:mc="http://schemas.openxmlformats.org/markup-compatibility/2006">
-        <mc:Choice xmlns:p14="http://schemas.microsoft.com/office/powerpoint/2010/main" Requires="p14">
+      <mc:AlternateContent xmlns:mc="http://schemas.openxmlformats.org/markup-compatibility/2006" xmlns:p14="http://schemas.microsoft.com/office/powerpoint/2010/main">
+        <mc:Choice Requires="p14">
           <p:contentPart p14:bwMode="auto" r:id="rId87">
             <p14:nvContentPartPr>
               <p14:cNvPr id="2128" name="Ink 2127">
@@ -13702,7 +15334,7 @@
             </p14:xfrm>
           </p:contentPart>
         </mc:Choice>
-        <mc:Fallback>
+        <mc:Fallback xmlns="">
           <p:pic>
             <p:nvPicPr>
               <p:cNvPr id="2128" name="Ink 2127">
@@ -14203,6 +15835,128 @@
   <p:clrMapOvr>
     <a:masterClrMapping/>
   </p:clrMapOvr>
+  <p:timing>
+    <p:tnLst>
+      <p:par>
+        <p:cTn id="1" dur="indefinite" restart="never" nodeType="tmRoot">
+          <p:childTnLst>
+            <p:seq concurrent="1" nextAc="seek">
+              <p:cTn id="2" dur="indefinite" nodeType="mainSeq">
+                <p:childTnLst>
+                  <p:par>
+                    <p:cTn id="3" fill="hold">
+                      <p:stCondLst>
+                        <p:cond delay="indefinite"/>
+                      </p:stCondLst>
+                      <p:childTnLst>
+                        <p:par>
+                          <p:cTn id="4" fill="hold">
+                            <p:stCondLst>
+                              <p:cond delay="0"/>
+                            </p:stCondLst>
+                            <p:childTnLst>
+                              <p:par>
+                                <p:cTn id="5" presetID="10" presetClass="entr" presetSubtype="0" fill="hold" grpId="0" nodeType="clickEffect">
+                                  <p:stCondLst>
+                                    <p:cond delay="0"/>
+                                  </p:stCondLst>
+                                  <p:childTnLst>
+                                    <p:set>
+                                      <p:cBhvr>
+                                        <p:cTn id="6" dur="1" fill="hold">
+                                          <p:stCondLst>
+                                            <p:cond delay="0"/>
+                                          </p:stCondLst>
+                                        </p:cTn>
+                                        <p:tgtEl>
+                                          <p:spTgt spid="12"/>
+                                        </p:tgtEl>
+                                        <p:attrNameLst>
+                                          <p:attrName>style.visibility</p:attrName>
+                                        </p:attrNameLst>
+                                      </p:cBhvr>
+                                      <p:to>
+                                        <p:strVal val="visible"/>
+                                      </p:to>
+                                    </p:set>
+                                    <p:animEffect transition="in" filter="fade">
+                                      <p:cBhvr>
+                                        <p:cTn id="7" dur="500"/>
+                                        <p:tgtEl>
+                                          <p:spTgt spid="12"/>
+                                        </p:tgtEl>
+                                      </p:cBhvr>
+                                    </p:animEffect>
+                                  </p:childTnLst>
+                                </p:cTn>
+                              </p:par>
+                              <p:par>
+                                <p:cTn id="8" presetID="10" presetClass="entr" presetSubtype="0" fill="hold" grpId="0" nodeType="withEffect">
+                                  <p:stCondLst>
+                                    <p:cond delay="0"/>
+                                  </p:stCondLst>
+                                  <p:childTnLst>
+                                    <p:set>
+                                      <p:cBhvr>
+                                        <p:cTn id="9" dur="1" fill="hold">
+                                          <p:stCondLst>
+                                            <p:cond delay="0"/>
+                                          </p:stCondLst>
+                                        </p:cTn>
+                                        <p:tgtEl>
+                                          <p:spTgt spid="3"/>
+                                        </p:tgtEl>
+                                        <p:attrNameLst>
+                                          <p:attrName>style.visibility</p:attrName>
+                                        </p:attrNameLst>
+                                      </p:cBhvr>
+                                      <p:to>
+                                        <p:strVal val="visible"/>
+                                      </p:to>
+                                    </p:set>
+                                    <p:animEffect transition="in" filter="fade">
+                                      <p:cBhvr>
+                                        <p:cTn id="10" dur="500"/>
+                                        <p:tgtEl>
+                                          <p:spTgt spid="3"/>
+                                        </p:tgtEl>
+                                      </p:cBhvr>
+                                    </p:animEffect>
+                                  </p:childTnLst>
+                                </p:cTn>
+                              </p:par>
+                            </p:childTnLst>
+                          </p:cTn>
+                        </p:par>
+                      </p:childTnLst>
+                    </p:cTn>
+                  </p:par>
+                </p:childTnLst>
+              </p:cTn>
+              <p:prevCondLst>
+                <p:cond evt="onPrev" delay="0">
+                  <p:tgtEl>
+                    <p:sldTgt/>
+                  </p:tgtEl>
+                </p:cond>
+              </p:prevCondLst>
+              <p:nextCondLst>
+                <p:cond evt="onNext" delay="0">
+                  <p:tgtEl>
+                    <p:sldTgt/>
+                  </p:tgtEl>
+                </p:cond>
+              </p:nextCondLst>
+            </p:seq>
+          </p:childTnLst>
+        </p:cTn>
+      </p:par>
+    </p:tnLst>
+    <p:bldLst>
+      <p:bldP spid="12" grpId="0"/>
+      <p:bldP spid="3" grpId="0"/>
+    </p:bldLst>
+  </p:timing>
 </p:sld>
 </file>
 

</xml_diff>

<commit_message>
Adding github links in the pptx file.
</commit_message>
<xml_diff>
--- a/Mohammadi.pptx
+++ b/Mohammadi.pptx
@@ -5,21 +5,22 @@
     <p:sldMasterId id="2147483648" r:id="rId1"/>
   </p:sldMasterIdLst>
   <p:notesMasterIdLst>
-    <p:notesMasterId r:id="rId14"/>
+    <p:notesMasterId r:id="rId15"/>
   </p:notesMasterIdLst>
   <p:sldIdLst>
     <p:sldId id="256" r:id="rId2"/>
     <p:sldId id="261" r:id="rId3"/>
-    <p:sldId id="262" r:id="rId4"/>
-    <p:sldId id="257" r:id="rId5"/>
-    <p:sldId id="260" r:id="rId6"/>
-    <p:sldId id="263" r:id="rId7"/>
-    <p:sldId id="264" r:id="rId8"/>
-    <p:sldId id="265" r:id="rId9"/>
-    <p:sldId id="266" r:id="rId10"/>
-    <p:sldId id="268" r:id="rId11"/>
-    <p:sldId id="267" r:id="rId12"/>
-    <p:sldId id="269" r:id="rId13"/>
+    <p:sldId id="270" r:id="rId4"/>
+    <p:sldId id="262" r:id="rId5"/>
+    <p:sldId id="257" r:id="rId6"/>
+    <p:sldId id="260" r:id="rId7"/>
+    <p:sldId id="263" r:id="rId8"/>
+    <p:sldId id="264" r:id="rId9"/>
+    <p:sldId id="265" r:id="rId10"/>
+    <p:sldId id="266" r:id="rId11"/>
+    <p:sldId id="268" r:id="rId12"/>
+    <p:sldId id="267" r:id="rId13"/>
+    <p:sldId id="269" r:id="rId14"/>
   </p:sldIdLst>
   <p:sldSz cx="9144000" cy="5143500" type="screen16x9"/>
   <p:notesSz cx="6858000" cy="9144000"/>
@@ -2063,7 +2064,7 @@
           <a:p>
             <a:fld id="{87350B06-B074-48FC-8CFD-53D2CD8FB95F}" type="slidenum">
               <a:rPr lang="en-US" smtClean="0"/>
-              <a:t>5</a:t>
+              <a:t>6</a:t>
             </a:fld>
             <a:endParaRPr lang="en-US"/>
           </a:p>
@@ -2171,7 +2172,7 @@
           <a:p>
             <a:fld id="{87350B06-B074-48FC-8CFD-53D2CD8FB95F}" type="slidenum">
               <a:rPr lang="en-US" smtClean="0"/>
-              <a:t>6</a:t>
+              <a:t>7</a:t>
             </a:fld>
             <a:endParaRPr lang="en-US"/>
           </a:p>
@@ -2279,7 +2280,7 @@
           <a:p>
             <a:fld id="{87350B06-B074-48FC-8CFD-53D2CD8FB95F}" type="slidenum">
               <a:rPr lang="en-US" smtClean="0"/>
-              <a:t>7</a:t>
+              <a:t>8</a:t>
             </a:fld>
             <a:endParaRPr lang="en-US"/>
           </a:p>
@@ -2387,7 +2388,7 @@
           <a:p>
             <a:fld id="{87350B06-B074-48FC-8CFD-53D2CD8FB95F}" type="slidenum">
               <a:rPr lang="en-US" smtClean="0"/>
-              <a:t>8</a:t>
+              <a:t>9</a:t>
             </a:fld>
             <a:endParaRPr lang="en-US"/>
           </a:p>
@@ -2495,7 +2496,7 @@
           <a:p>
             <a:fld id="{87350B06-B074-48FC-8CFD-53D2CD8FB95F}" type="slidenum">
               <a:rPr lang="en-US" smtClean="0"/>
-              <a:t>9</a:t>
+              <a:t>10</a:t>
             </a:fld>
             <a:endParaRPr lang="en-US"/>
           </a:p>
@@ -2603,7 +2604,7 @@
           <a:p>
             <a:fld id="{87350B06-B074-48FC-8CFD-53D2CD8FB95F}" type="slidenum">
               <a:rPr lang="en-US" smtClean="0"/>
-              <a:t>10</a:t>
+              <a:t>11</a:t>
             </a:fld>
             <a:endParaRPr lang="en-US"/>
           </a:p>
@@ -2711,7 +2712,7 @@
           <a:p>
             <a:fld id="{87350B06-B074-48FC-8CFD-53D2CD8FB95F}" type="slidenum">
               <a:rPr lang="en-US" smtClean="0"/>
-              <a:t>11</a:t>
+              <a:t>12</a:t>
             </a:fld>
             <a:endParaRPr lang="en-US"/>
           </a:p>
@@ -2819,7 +2820,7 @@
           <a:p>
             <a:fld id="{87350B06-B074-48FC-8CFD-53D2CD8FB95F}" type="slidenum">
               <a:rPr lang="en-US" smtClean="0"/>
-              <a:t>12</a:t>
+              <a:t>13</a:t>
             </a:fld>
             <a:endParaRPr lang="en-US"/>
           </a:p>
@@ -6522,6 +6523,510 @@
 </file>
 
 <file path=ppt/slides/slide10.xml><?xml version="1.0" encoding="utf-8"?>
+<p:sld xmlns:a="http://schemas.openxmlformats.org/drawingml/2006/main" xmlns:r="http://schemas.openxmlformats.org/officeDocument/2006/relationships" xmlns:p="http://schemas.openxmlformats.org/presentationml/2006/main">
+  <p:cSld>
+    <p:spTree>
+      <p:nvGrpSpPr>
+        <p:cNvPr id="1" name="">
+          <a:extLst>
+            <a:ext uri="{FF2B5EF4-FFF2-40B4-BE49-F238E27FC236}">
+              <a16:creationId xmlns:a16="http://schemas.microsoft.com/office/drawing/2014/main" id="{D8756E67-E494-7A8E-2F71-C0F6E1314311}"/>
+            </a:ext>
+          </a:extLst>
+        </p:cNvPr>
+        <p:cNvGrpSpPr/>
+        <p:nvPr/>
+      </p:nvGrpSpPr>
+      <p:grpSpPr>
+        <a:xfrm>
+          <a:off x="0" y="0"/>
+          <a:ext cx="0" cy="0"/>
+          <a:chOff x="0" y="0"/>
+          <a:chExt cx="0" cy="0"/>
+        </a:xfrm>
+      </p:grpSpPr>
+      <p:sp>
+        <p:nvSpPr>
+          <p:cNvPr id="4" name="Title 1">
+            <a:extLst>
+              <a:ext uri="{FF2B5EF4-FFF2-40B4-BE49-F238E27FC236}">
+                <a16:creationId xmlns:a16="http://schemas.microsoft.com/office/drawing/2014/main" id="{9FA8DE6B-CA65-BA1F-4D7C-5C00A073C898}"/>
+              </a:ext>
+            </a:extLst>
+          </p:cNvPr>
+          <p:cNvSpPr>
+            <a:spLocks noGrp="1"/>
+          </p:cNvSpPr>
+          <p:nvPr/>
+        </p:nvSpPr>
+        <p:spPr>
+          <a:xfrm>
+            <a:off x="229509" y="0"/>
+            <a:ext cx="8246070" cy="763526"/>
+          </a:xfrm>
+          <a:prstGeom prst="rect">
+            <a:avLst/>
+          </a:prstGeom>
+        </p:spPr>
+        <p:txBody>
+          <a:bodyPr vert="horz" lIns="91440" tIns="45720" rIns="91440" bIns="45720" rtlCol="0" anchor="ctr">
+            <a:normAutofit/>
+          </a:bodyPr>
+          <a:lstStyle>
+            <a:lvl1pPr algn="l" defTabSz="914400" rtl="0" eaLnBrk="1" latinLnBrk="0" hangingPunct="1">
+              <a:spcBef>
+                <a:spcPct val="0"/>
+              </a:spcBef>
+              <a:buNone/>
+              <a:defRPr sz="3600" kern="1200" baseline="0">
+                <a:solidFill>
+                  <a:srgbClr val="9EFF29"/>
+                </a:solidFill>
+                <a:effectLst>
+                  <a:outerShdw blurRad="50800" dist="38100" dir="2700000" algn="tl" rotWithShape="0">
+                    <a:prstClr val="black">
+                      <a:alpha val="40000"/>
+                    </a:prstClr>
+                  </a:outerShdw>
+                </a:effectLst>
+                <a:latin typeface="+mj-lt"/>
+                <a:ea typeface="+mj-ea"/>
+                <a:cs typeface="+mj-cs"/>
+              </a:defRPr>
+            </a:lvl1pPr>
+          </a:lstStyle>
+          <a:p>
+            <a:r>
+              <a:rPr lang="en-US" dirty="0"/>
+              <a:t>Question #3</a:t>
+            </a:r>
+          </a:p>
+        </p:txBody>
+      </p:sp>
+      <p:sp>
+        <p:nvSpPr>
+          <p:cNvPr id="12" name="TextBox 11">
+            <a:extLst>
+              <a:ext uri="{FF2B5EF4-FFF2-40B4-BE49-F238E27FC236}">
+                <a16:creationId xmlns:a16="http://schemas.microsoft.com/office/drawing/2014/main" id="{369C876D-4B0F-F47E-9B20-623EED21EE97}"/>
+              </a:ext>
+            </a:extLst>
+          </p:cNvPr>
+          <p:cNvSpPr txBox="1"/>
+          <p:nvPr/>
+        </p:nvSpPr>
+        <p:spPr>
+          <a:xfrm>
+            <a:off x="327102" y="2709431"/>
+            <a:ext cx="2378927" cy="369332"/>
+          </a:xfrm>
+          <a:prstGeom prst="rect">
+            <a:avLst/>
+          </a:prstGeom>
+          <a:noFill/>
+        </p:spPr>
+        <p:txBody>
+          <a:bodyPr wrap="square" rtlCol="0">
+            <a:spAutoFit/>
+          </a:bodyPr>
+          <a:lstStyle/>
+          <a:p>
+            <a:r>
+              <a:rPr lang="en-US" u="sng" dirty="0">
+                <a:solidFill>
+                  <a:srgbClr val="9EFF29"/>
+                </a:solidFill>
+              </a:rPr>
+              <a:t>Results</a:t>
+            </a:r>
+          </a:p>
+        </p:txBody>
+      </p:sp>
+      <p:sp>
+        <p:nvSpPr>
+          <p:cNvPr id="13" name="TextBox 12">
+            <a:extLst>
+              <a:ext uri="{FF2B5EF4-FFF2-40B4-BE49-F238E27FC236}">
+                <a16:creationId xmlns:a16="http://schemas.microsoft.com/office/drawing/2014/main" id="{66511BE1-2C1C-1034-A13E-C950237E8BCC}"/>
+              </a:ext>
+            </a:extLst>
+          </p:cNvPr>
+          <p:cNvSpPr txBox="1"/>
+          <p:nvPr/>
+        </p:nvSpPr>
+        <p:spPr>
+          <a:xfrm>
+            <a:off x="319669" y="693515"/>
+            <a:ext cx="3865756" cy="338554"/>
+          </a:xfrm>
+          <a:prstGeom prst="rect">
+            <a:avLst/>
+          </a:prstGeom>
+          <a:noFill/>
+        </p:spPr>
+        <p:txBody>
+          <a:bodyPr wrap="square" rtlCol="0">
+            <a:spAutoFit/>
+          </a:bodyPr>
+          <a:lstStyle/>
+          <a:p>
+            <a:r>
+              <a:rPr lang="en-US" sz="1600" dirty="0">
+                <a:solidFill>
+                  <a:schemeClr val="bg1"/>
+                </a:solidFill>
+              </a:rPr>
+              <a:t>The player with the highest number of wins.</a:t>
+            </a:r>
+          </a:p>
+        </p:txBody>
+      </p:sp>
+      <p:sp>
+        <p:nvSpPr>
+          <p:cNvPr id="2" name="TextBox 1">
+            <a:extLst>
+              <a:ext uri="{FF2B5EF4-FFF2-40B4-BE49-F238E27FC236}">
+                <a16:creationId xmlns:a16="http://schemas.microsoft.com/office/drawing/2014/main" id="{89D211C8-3055-153C-9B57-E04F6F67F4AD}"/>
+              </a:ext>
+            </a:extLst>
+          </p:cNvPr>
+          <p:cNvSpPr txBox="1"/>
+          <p:nvPr/>
+        </p:nvSpPr>
+        <p:spPr>
+          <a:xfrm>
+            <a:off x="327102" y="1581247"/>
+            <a:ext cx="8697952" cy="830997"/>
+          </a:xfrm>
+          <a:prstGeom prst="rect">
+            <a:avLst/>
+          </a:prstGeom>
+          <a:noFill/>
+        </p:spPr>
+        <p:txBody>
+          <a:bodyPr wrap="square" rtlCol="0">
+            <a:spAutoFit/>
+          </a:bodyPr>
+          <a:lstStyle/>
+          <a:p>
+            <a:pPr algn="just"/>
+            <a:r>
+              <a:rPr lang="en-US" sz="1600" dirty="0">
+                <a:solidFill>
+                  <a:schemeClr val="bg1"/>
+                </a:solidFill>
+              </a:rPr>
+              <a:t>I loaded data with </a:t>
+            </a:r>
+            <a:r>
+              <a:rPr lang="en-US" sz="1600" dirty="0" err="1">
+                <a:solidFill>
+                  <a:schemeClr val="bg1"/>
+                </a:solidFill>
+                <a:latin typeface="Consolas" panose="020B0609020204030204" pitchFamily="49" charset="0"/>
+                <a:cs typeface="Courier New" panose="02070309020205020404" pitchFamily="49" charset="0"/>
+              </a:rPr>
+              <a:t>dask</a:t>
+            </a:r>
+            <a:r>
+              <a:rPr lang="en-US" sz="1600" dirty="0">
+                <a:solidFill>
+                  <a:schemeClr val="bg1"/>
+                </a:solidFill>
+              </a:rPr>
+              <a:t> and saved them in </a:t>
+            </a:r>
+            <a:r>
+              <a:rPr lang="en-US" sz="1600" dirty="0">
+                <a:solidFill>
+                  <a:schemeClr val="bg1"/>
+                </a:solidFill>
+                <a:latin typeface="Consolas" panose="020B0609020204030204" pitchFamily="49" charset="0"/>
+                <a:cs typeface="Courier New" panose="02070309020205020404" pitchFamily="49" charset="0"/>
+              </a:rPr>
+              <a:t>csv</a:t>
+            </a:r>
+            <a:r>
+              <a:rPr lang="en-US" sz="1600" dirty="0">
+                <a:solidFill>
+                  <a:schemeClr val="bg1"/>
+                </a:solidFill>
+              </a:rPr>
+              <a:t> files. </a:t>
+            </a:r>
+            <a:r>
+              <a:rPr lang="en-US" sz="1600" dirty="0" err="1">
+                <a:solidFill>
+                  <a:schemeClr val="bg1"/>
+                </a:solidFill>
+              </a:rPr>
+              <a:t>Preprocessings</a:t>
+            </a:r>
+            <a:r>
+              <a:rPr lang="en-US" sz="1600" dirty="0">
+                <a:solidFill>
+                  <a:schemeClr val="bg1"/>
+                </a:solidFill>
+              </a:rPr>
+              <a:t> like dropping duplicates, dropping missing values were applied to avoid overcounting. At the end grouping the concatenated table of winners, and sorting them were carried out .</a:t>
+            </a:r>
+          </a:p>
+        </p:txBody>
+      </p:sp>
+      <p:sp>
+        <p:nvSpPr>
+          <p:cNvPr id="3" name="TextBox 2">
+            <a:extLst>
+              <a:ext uri="{FF2B5EF4-FFF2-40B4-BE49-F238E27FC236}">
+                <a16:creationId xmlns:a16="http://schemas.microsoft.com/office/drawing/2014/main" id="{811379C5-29FF-16EF-7868-BE40842A6D0F}"/>
+              </a:ext>
+            </a:extLst>
+          </p:cNvPr>
+          <p:cNvSpPr txBox="1"/>
+          <p:nvPr/>
+        </p:nvSpPr>
+        <p:spPr>
+          <a:xfrm>
+            <a:off x="319668" y="3168686"/>
+            <a:ext cx="8697952" cy="584775"/>
+          </a:xfrm>
+          <a:prstGeom prst="rect">
+            <a:avLst/>
+          </a:prstGeom>
+          <a:noFill/>
+        </p:spPr>
+        <p:txBody>
+          <a:bodyPr wrap="square" rtlCol="0">
+            <a:spAutoFit/>
+          </a:bodyPr>
+          <a:lstStyle/>
+          <a:p>
+            <a:pPr algn="just"/>
+            <a:r>
+              <a:rPr lang="en-US" sz="1600" dirty="0">
+                <a:solidFill>
+                  <a:schemeClr val="bg1"/>
+                </a:solidFill>
+                <a:latin typeface="Courier New" panose="02070309020205020404" pitchFamily="49" charset="0"/>
+                <a:cs typeface="Courier New" panose="02070309020205020404" pitchFamily="49" charset="0"/>
+              </a:rPr>
+              <a:t>Dmitry Popkov </a:t>
+            </a:r>
+            <a:r>
+              <a:rPr lang="en-US" sz="1600" dirty="0">
+                <a:solidFill>
+                  <a:schemeClr val="bg1"/>
+                </a:solidFill>
+              </a:rPr>
+              <a:t>has the highest number of wins, with </a:t>
+            </a:r>
+            <a:r>
+              <a:rPr lang="en-US" sz="1600" dirty="0">
+                <a:solidFill>
+                  <a:schemeClr val="bg1"/>
+                </a:solidFill>
+                <a:latin typeface="Courier New" panose="02070309020205020404" pitchFamily="49" charset="0"/>
+                <a:cs typeface="Courier New" panose="02070309020205020404" pitchFamily="49" charset="0"/>
+              </a:rPr>
+              <a:t>29</a:t>
+            </a:r>
+            <a:r>
+              <a:rPr lang="en-US" sz="1600" dirty="0">
+                <a:solidFill>
+                  <a:schemeClr val="bg1"/>
+                </a:solidFill>
+              </a:rPr>
+              <a:t> wins in two months.</a:t>
+            </a:r>
+          </a:p>
+          <a:p>
+            <a:pPr algn="just"/>
+            <a:r>
+              <a:rPr lang="en-US" sz="1600" dirty="0">
+                <a:solidFill>
+                  <a:schemeClr val="bg1"/>
+                </a:solidFill>
+              </a:rPr>
+              <a:t>You can look at the table to find other top winners.</a:t>
+            </a:r>
+          </a:p>
+        </p:txBody>
+      </p:sp>
+      <p:sp>
+        <p:nvSpPr>
+          <p:cNvPr id="5" name="TextBox 4">
+            <a:extLst>
+              <a:ext uri="{FF2B5EF4-FFF2-40B4-BE49-F238E27FC236}">
+                <a16:creationId xmlns:a16="http://schemas.microsoft.com/office/drawing/2014/main" id="{08AEA5D1-481F-8D23-AA03-24AA8332AAED}"/>
+              </a:ext>
+            </a:extLst>
+          </p:cNvPr>
+          <p:cNvSpPr txBox="1"/>
+          <p:nvPr/>
+        </p:nvSpPr>
+        <p:spPr>
+          <a:xfrm>
+            <a:off x="319668" y="1121992"/>
+            <a:ext cx="2378927" cy="369332"/>
+          </a:xfrm>
+          <a:prstGeom prst="rect">
+            <a:avLst/>
+          </a:prstGeom>
+          <a:noFill/>
+        </p:spPr>
+        <p:txBody>
+          <a:bodyPr wrap="square" rtlCol="0">
+            <a:spAutoFit/>
+          </a:bodyPr>
+          <a:lstStyle/>
+          <a:p>
+            <a:r>
+              <a:rPr lang="en-US" u="sng" dirty="0">
+                <a:solidFill>
+                  <a:srgbClr val="9EFF29"/>
+                </a:solidFill>
+              </a:rPr>
+              <a:t>Coding and strategy</a:t>
+            </a:r>
+          </a:p>
+        </p:txBody>
+      </p:sp>
+    </p:spTree>
+    <p:extLst>
+      <p:ext uri="{BB962C8B-B14F-4D97-AF65-F5344CB8AC3E}">
+        <p14:creationId xmlns:p14="http://schemas.microsoft.com/office/powerpoint/2010/main" val="1543846504"/>
+      </p:ext>
+    </p:extLst>
+  </p:cSld>
+  <p:clrMapOvr>
+    <a:masterClrMapping/>
+  </p:clrMapOvr>
+  <p:timing>
+    <p:tnLst>
+      <p:par>
+        <p:cTn id="1" dur="indefinite" restart="never" nodeType="tmRoot">
+          <p:childTnLst>
+            <p:seq concurrent="1" nextAc="seek">
+              <p:cTn id="2" dur="indefinite" nodeType="mainSeq">
+                <p:childTnLst>
+                  <p:par>
+                    <p:cTn id="3" fill="hold">
+                      <p:stCondLst>
+                        <p:cond delay="indefinite"/>
+                      </p:stCondLst>
+                      <p:childTnLst>
+                        <p:par>
+                          <p:cTn id="4" fill="hold">
+                            <p:stCondLst>
+                              <p:cond delay="0"/>
+                            </p:stCondLst>
+                            <p:childTnLst>
+                              <p:par>
+                                <p:cTn id="5" presetID="10" presetClass="entr" presetSubtype="0" fill="hold" grpId="0" nodeType="clickEffect">
+                                  <p:stCondLst>
+                                    <p:cond delay="0"/>
+                                  </p:stCondLst>
+                                  <p:childTnLst>
+                                    <p:set>
+                                      <p:cBhvr>
+                                        <p:cTn id="6" dur="1" fill="hold">
+                                          <p:stCondLst>
+                                            <p:cond delay="0"/>
+                                          </p:stCondLst>
+                                        </p:cTn>
+                                        <p:tgtEl>
+                                          <p:spTgt spid="12"/>
+                                        </p:tgtEl>
+                                        <p:attrNameLst>
+                                          <p:attrName>style.visibility</p:attrName>
+                                        </p:attrNameLst>
+                                      </p:cBhvr>
+                                      <p:to>
+                                        <p:strVal val="visible"/>
+                                      </p:to>
+                                    </p:set>
+                                    <p:animEffect transition="in" filter="fade">
+                                      <p:cBhvr>
+                                        <p:cTn id="7" dur="500"/>
+                                        <p:tgtEl>
+                                          <p:spTgt spid="12"/>
+                                        </p:tgtEl>
+                                      </p:cBhvr>
+                                    </p:animEffect>
+                                  </p:childTnLst>
+                                </p:cTn>
+                              </p:par>
+                              <p:par>
+                                <p:cTn id="8" presetID="10" presetClass="entr" presetSubtype="0" fill="hold" grpId="0" nodeType="withEffect">
+                                  <p:stCondLst>
+                                    <p:cond delay="0"/>
+                                  </p:stCondLst>
+                                  <p:childTnLst>
+                                    <p:set>
+                                      <p:cBhvr>
+                                        <p:cTn id="9" dur="1" fill="hold">
+                                          <p:stCondLst>
+                                            <p:cond delay="0"/>
+                                          </p:stCondLst>
+                                        </p:cTn>
+                                        <p:tgtEl>
+                                          <p:spTgt spid="3"/>
+                                        </p:tgtEl>
+                                        <p:attrNameLst>
+                                          <p:attrName>style.visibility</p:attrName>
+                                        </p:attrNameLst>
+                                      </p:cBhvr>
+                                      <p:to>
+                                        <p:strVal val="visible"/>
+                                      </p:to>
+                                    </p:set>
+                                    <p:animEffect transition="in" filter="fade">
+                                      <p:cBhvr>
+                                        <p:cTn id="10" dur="500"/>
+                                        <p:tgtEl>
+                                          <p:spTgt spid="3"/>
+                                        </p:tgtEl>
+                                      </p:cBhvr>
+                                    </p:animEffect>
+                                  </p:childTnLst>
+                                </p:cTn>
+                              </p:par>
+                            </p:childTnLst>
+                          </p:cTn>
+                        </p:par>
+                      </p:childTnLst>
+                    </p:cTn>
+                  </p:par>
+                </p:childTnLst>
+              </p:cTn>
+              <p:prevCondLst>
+                <p:cond evt="onPrev" delay="0">
+                  <p:tgtEl>
+                    <p:sldTgt/>
+                  </p:tgtEl>
+                </p:cond>
+              </p:prevCondLst>
+              <p:nextCondLst>
+                <p:cond evt="onNext" delay="0">
+                  <p:tgtEl>
+                    <p:sldTgt/>
+                  </p:tgtEl>
+                </p:cond>
+              </p:nextCondLst>
+            </p:seq>
+          </p:childTnLst>
+        </p:cTn>
+      </p:par>
+    </p:tnLst>
+    <p:bldLst>
+      <p:bldP spid="12" grpId="0"/>
+      <p:bldP spid="3" grpId="0"/>
+    </p:bldLst>
+  </p:timing>
+</p:sld>
+</file>
+
+<file path=ppt/slides/slide11.xml><?xml version="1.0" encoding="utf-8"?>
 <p:sld xmlns:a="http://schemas.openxmlformats.org/drawingml/2006/main" xmlns:r="http://schemas.openxmlformats.org/officeDocument/2006/relationships" xmlns:p="http://schemas.openxmlformats.org/presentationml/2006/main">
   <p:cSld>
     <p:spTree>
@@ -7387,7 +7892,7 @@
 </p:sld>
 </file>
 
-<file path=ppt/slides/slide11.xml><?xml version="1.0" encoding="utf-8"?>
+<file path=ppt/slides/slide12.xml><?xml version="1.0" encoding="utf-8"?>
 <p:sld xmlns:a="http://schemas.openxmlformats.org/drawingml/2006/main" xmlns:r="http://schemas.openxmlformats.org/officeDocument/2006/relationships" xmlns:p="http://schemas.openxmlformats.org/presentationml/2006/main">
   <p:cSld>
     <p:spTree>
@@ -8151,7 +8656,7 @@
 </p:sld>
 </file>
 
-<file path=ppt/slides/slide12.xml><?xml version="1.0" encoding="utf-8"?>
+<file path=ppt/slides/slide13.xml><?xml version="1.0" encoding="utf-8"?>
 <p:sld xmlns:a="http://schemas.openxmlformats.org/drawingml/2006/main" xmlns:r="http://schemas.openxmlformats.org/officeDocument/2006/relationships" xmlns:p="http://schemas.openxmlformats.org/presentationml/2006/main">
   <p:cSld>
     <p:spTree>
@@ -9509,6 +10014,367 @@
   <p:cSld>
     <p:spTree>
       <p:nvGrpSpPr>
+        <p:cNvPr id="1" name=""/>
+        <p:cNvGrpSpPr/>
+        <p:nvPr/>
+      </p:nvGrpSpPr>
+      <p:grpSpPr>
+        <a:xfrm>
+          <a:off x="0" y="0"/>
+          <a:ext cx="0" cy="0"/>
+          <a:chOff x="0" y="0"/>
+          <a:chExt cx="0" cy="0"/>
+        </a:xfrm>
+      </p:grpSpPr>
+      <p:sp>
+        <p:nvSpPr>
+          <p:cNvPr id="2" name="Title 3">
+            <a:extLst>
+              <a:ext uri="{FF2B5EF4-FFF2-40B4-BE49-F238E27FC236}">
+                <a16:creationId xmlns:a16="http://schemas.microsoft.com/office/drawing/2014/main" id="{4723AA6A-0CB5-3716-98C4-60B6DD41798B}"/>
+              </a:ext>
+            </a:extLst>
+          </p:cNvPr>
+          <p:cNvSpPr txBox="1">
+            <a:spLocks/>
+          </p:cNvSpPr>
+          <p:nvPr/>
+        </p:nvSpPr>
+        <p:spPr>
+          <a:xfrm>
+            <a:off x="525317" y="256899"/>
+            <a:ext cx="8093365" cy="763525"/>
+          </a:xfrm>
+          <a:prstGeom prst="rect">
+            <a:avLst/>
+          </a:prstGeom>
+        </p:spPr>
+        <p:txBody>
+          <a:bodyPr>
+            <a:normAutofit/>
+          </a:bodyPr>
+          <a:lstStyle>
+            <a:lvl1pPr algn="ctr" defTabSz="914400" rtl="0" eaLnBrk="1" latinLnBrk="0" hangingPunct="1">
+              <a:spcBef>
+                <a:spcPct val="0"/>
+              </a:spcBef>
+              <a:buNone/>
+              <a:defRPr sz="4400" kern="1200">
+                <a:solidFill>
+                  <a:schemeClr val="tx1"/>
+                </a:solidFill>
+                <a:latin typeface="+mj-lt"/>
+                <a:ea typeface="+mj-ea"/>
+                <a:cs typeface="+mj-cs"/>
+              </a:defRPr>
+            </a:lvl1pPr>
+          </a:lstStyle>
+          <a:p>
+            <a:pPr algn="l"/>
+            <a:r>
+              <a:rPr lang="en-US" dirty="0">
+                <a:solidFill>
+                  <a:srgbClr val="5EEC3C"/>
+                </a:solidFill>
+              </a:rPr>
+              <a:t>GitHub</a:t>
+            </a:r>
+          </a:p>
+        </p:txBody>
+      </p:sp>
+      <p:sp>
+        <p:nvSpPr>
+          <p:cNvPr id="3" name="Text Placeholder 2">
+            <a:extLst>
+              <a:ext uri="{FF2B5EF4-FFF2-40B4-BE49-F238E27FC236}">
+                <a16:creationId xmlns:a16="http://schemas.microsoft.com/office/drawing/2014/main" id="{4B549ACE-30C3-DCF9-E4AE-A80D54070B85}"/>
+              </a:ext>
+            </a:extLst>
+          </p:cNvPr>
+          <p:cNvSpPr txBox="1">
+            <a:spLocks noChangeArrowheads="1"/>
+          </p:cNvSpPr>
+          <p:nvPr/>
+        </p:nvSpPr>
+        <p:spPr bwMode="auto">
+          <a:xfrm>
+            <a:off x="380768" y="1602254"/>
+            <a:ext cx="8382462" cy="969496"/>
+          </a:xfrm>
+          <a:prstGeom prst="rect">
+            <a:avLst/>
+          </a:prstGeom>
+          <a:noFill/>
+          <a:ln>
+            <a:noFill/>
+          </a:ln>
+          <a:effectLst/>
+          <a:extLst>
+            <a:ext uri="{909E8E84-426E-40DD-AFC4-6F175D3DCCD1}">
+              <a14:hiddenFill xmlns:a14="http://schemas.microsoft.com/office/drawing/2010/main">
+                <a:solidFill>
+                  <a:schemeClr val="accent1"/>
+                </a:solidFill>
+              </a14:hiddenFill>
+            </a:ext>
+            <a:ext uri="{91240B29-F687-4F45-9708-019B960494DF}">
+              <a14:hiddenLine xmlns:a14="http://schemas.microsoft.com/office/drawing/2010/main" w="9525">
+                <a:solidFill>
+                  <a:schemeClr val="tx1"/>
+                </a:solidFill>
+                <a:miter lim="800000"/>
+                <a:headEnd/>
+                <a:tailEnd/>
+              </a14:hiddenLine>
+            </a:ext>
+            <a:ext uri="{AF507438-7753-43E0-B8FC-AC1667EBCBE1}">
+              <a14:hiddenEffects xmlns:a14="http://schemas.microsoft.com/office/drawing/2010/main">
+                <a:effectLst>
+                  <a:outerShdw dist="35921" dir="2700000" algn="ctr" rotWithShape="0">
+                    <a:schemeClr val="bg2"/>
+                  </a:outerShdw>
+                </a:effectLst>
+              </a14:hiddenEffects>
+            </a:ext>
+          </a:extLst>
+        </p:spPr>
+        <p:txBody>
+          <a:bodyPr vert="horz" wrap="square" lIns="91440" tIns="45720" rIns="91440" bIns="45720" numCol="1" anchor="ctr" anchorCtr="0" compatLnSpc="1">
+            <a:prstTxWarp prst="textNoShape">
+              <a:avLst/>
+            </a:prstTxWarp>
+            <a:spAutoFit/>
+          </a:bodyPr>
+          <a:lstStyle>
+            <a:lvl1pPr marL="342900" indent="-342900" algn="l" defTabSz="914400" rtl="0" eaLnBrk="1" latinLnBrk="0" hangingPunct="1">
+              <a:spcBef>
+                <a:spcPct val="20000"/>
+              </a:spcBef>
+              <a:buFont typeface="Arial" pitchFamily="34" charset="0"/>
+              <a:buChar char="•"/>
+              <a:defRPr sz="3200" kern="1200">
+                <a:solidFill>
+                  <a:schemeClr val="tx1"/>
+                </a:solidFill>
+                <a:latin typeface="+mn-lt"/>
+                <a:ea typeface="+mn-ea"/>
+                <a:cs typeface="+mn-cs"/>
+              </a:defRPr>
+            </a:lvl1pPr>
+            <a:lvl2pPr marL="742950" indent="-285750" algn="l" defTabSz="914400" rtl="0" eaLnBrk="1" latinLnBrk="0" hangingPunct="1">
+              <a:spcBef>
+                <a:spcPct val="20000"/>
+              </a:spcBef>
+              <a:buFont typeface="Arial" pitchFamily="34" charset="0"/>
+              <a:buChar char="–"/>
+              <a:defRPr sz="2800" kern="1200">
+                <a:solidFill>
+                  <a:schemeClr val="tx1"/>
+                </a:solidFill>
+                <a:latin typeface="+mn-lt"/>
+                <a:ea typeface="+mn-ea"/>
+                <a:cs typeface="+mn-cs"/>
+              </a:defRPr>
+            </a:lvl2pPr>
+            <a:lvl3pPr marL="1143000" indent="-228600" algn="l" defTabSz="914400" rtl="0" eaLnBrk="1" latinLnBrk="0" hangingPunct="1">
+              <a:spcBef>
+                <a:spcPct val="20000"/>
+              </a:spcBef>
+              <a:buFont typeface="Arial" pitchFamily="34" charset="0"/>
+              <a:buChar char="•"/>
+              <a:defRPr sz="2400" kern="1200">
+                <a:solidFill>
+                  <a:schemeClr val="tx1"/>
+                </a:solidFill>
+                <a:latin typeface="+mn-lt"/>
+                <a:ea typeface="+mn-ea"/>
+                <a:cs typeface="+mn-cs"/>
+              </a:defRPr>
+            </a:lvl3pPr>
+            <a:lvl4pPr marL="1600200" indent="-228600" algn="l" defTabSz="914400" rtl="0" eaLnBrk="1" latinLnBrk="0" hangingPunct="1">
+              <a:spcBef>
+                <a:spcPct val="20000"/>
+              </a:spcBef>
+              <a:buFont typeface="Arial" pitchFamily="34" charset="0"/>
+              <a:buChar char="–"/>
+              <a:defRPr sz="2000" kern="1200">
+                <a:solidFill>
+                  <a:schemeClr val="tx1"/>
+                </a:solidFill>
+                <a:latin typeface="+mn-lt"/>
+                <a:ea typeface="+mn-ea"/>
+                <a:cs typeface="+mn-cs"/>
+              </a:defRPr>
+            </a:lvl4pPr>
+            <a:lvl5pPr marL="2057400" indent="-228600" algn="l" defTabSz="914400" rtl="0" eaLnBrk="1" latinLnBrk="0" hangingPunct="1">
+              <a:spcBef>
+                <a:spcPct val="20000"/>
+              </a:spcBef>
+              <a:buFont typeface="Arial" pitchFamily="34" charset="0"/>
+              <a:buChar char="»"/>
+              <a:defRPr sz="2000" kern="1200">
+                <a:solidFill>
+                  <a:schemeClr val="tx1"/>
+                </a:solidFill>
+                <a:latin typeface="+mn-lt"/>
+                <a:ea typeface="+mn-ea"/>
+                <a:cs typeface="+mn-cs"/>
+              </a:defRPr>
+            </a:lvl5pPr>
+            <a:lvl6pPr marL="2514600" indent="-228600" algn="l" defTabSz="914400" rtl="0" eaLnBrk="1" latinLnBrk="0" hangingPunct="1">
+              <a:spcBef>
+                <a:spcPct val="20000"/>
+              </a:spcBef>
+              <a:buFont typeface="Arial" pitchFamily="34" charset="0"/>
+              <a:buChar char="•"/>
+              <a:defRPr sz="2000" kern="1200">
+                <a:solidFill>
+                  <a:schemeClr val="tx1"/>
+                </a:solidFill>
+                <a:latin typeface="+mn-lt"/>
+                <a:ea typeface="+mn-ea"/>
+                <a:cs typeface="+mn-cs"/>
+              </a:defRPr>
+            </a:lvl6pPr>
+            <a:lvl7pPr marL="2971800" indent="-228600" algn="l" defTabSz="914400" rtl="0" eaLnBrk="1" latinLnBrk="0" hangingPunct="1">
+              <a:spcBef>
+                <a:spcPct val="20000"/>
+              </a:spcBef>
+              <a:buFont typeface="Arial" pitchFamily="34" charset="0"/>
+              <a:buChar char="•"/>
+              <a:defRPr sz="2000" kern="1200">
+                <a:solidFill>
+                  <a:schemeClr val="tx1"/>
+                </a:solidFill>
+                <a:latin typeface="+mn-lt"/>
+                <a:ea typeface="+mn-ea"/>
+                <a:cs typeface="+mn-cs"/>
+              </a:defRPr>
+            </a:lvl7pPr>
+            <a:lvl8pPr marL="3429000" indent="-228600" algn="l" defTabSz="914400" rtl="0" eaLnBrk="1" latinLnBrk="0" hangingPunct="1">
+              <a:spcBef>
+                <a:spcPct val="20000"/>
+              </a:spcBef>
+              <a:buFont typeface="Arial" pitchFamily="34" charset="0"/>
+              <a:buChar char="•"/>
+              <a:defRPr sz="2000" kern="1200">
+                <a:solidFill>
+                  <a:schemeClr val="tx1"/>
+                </a:solidFill>
+                <a:latin typeface="+mn-lt"/>
+                <a:ea typeface="+mn-ea"/>
+                <a:cs typeface="+mn-cs"/>
+              </a:defRPr>
+            </a:lvl8pPr>
+            <a:lvl9pPr marL="3886200" indent="-228600" algn="l" defTabSz="914400" rtl="0" eaLnBrk="1" latinLnBrk="0" hangingPunct="1">
+              <a:spcBef>
+                <a:spcPct val="20000"/>
+              </a:spcBef>
+              <a:buFont typeface="Arial" pitchFamily="34" charset="0"/>
+              <a:buChar char="•"/>
+              <a:defRPr sz="2000" kern="1200">
+                <a:solidFill>
+                  <a:schemeClr val="tx1"/>
+                </a:solidFill>
+                <a:latin typeface="+mn-lt"/>
+                <a:ea typeface="+mn-ea"/>
+                <a:cs typeface="+mn-cs"/>
+              </a:defRPr>
+            </a:lvl9pPr>
+          </a:lstStyle>
+          <a:p>
+            <a:pPr marL="0" indent="0" algn="just" eaLnBrk="0" fontAlgn="base" hangingPunct="0">
+              <a:spcBef>
+                <a:spcPct val="0"/>
+              </a:spcBef>
+              <a:spcAft>
+                <a:spcPct val="0"/>
+              </a:spcAft>
+              <a:buFontTx/>
+              <a:buNone/>
+            </a:pPr>
+            <a:r>
+              <a:rPr lang="en-US" altLang="en-US" sz="1900" dirty="0">
+                <a:solidFill>
+                  <a:schemeClr val="bg1"/>
+                </a:solidFill>
+                <a:latin typeface="+mj-lt"/>
+              </a:rPr>
+              <a:t>We also collaborated with git, and here’s the GitHub repository of this project:</a:t>
+            </a:r>
+          </a:p>
+          <a:p>
+            <a:pPr marL="0" indent="0" algn="just" eaLnBrk="0" fontAlgn="base" hangingPunct="0">
+              <a:spcBef>
+                <a:spcPct val="0"/>
+              </a:spcBef>
+              <a:spcAft>
+                <a:spcPct val="0"/>
+              </a:spcAft>
+              <a:buFontTx/>
+              <a:buNone/>
+            </a:pPr>
+            <a:endParaRPr lang="en-US" altLang="en-US" sz="1900" dirty="0">
+              <a:solidFill>
+                <a:schemeClr val="bg1"/>
+              </a:solidFill>
+              <a:latin typeface="+mj-lt"/>
+            </a:endParaRPr>
+          </a:p>
+          <a:p>
+            <a:pPr marL="0" indent="0" algn="just" eaLnBrk="0" fontAlgn="base" hangingPunct="0">
+              <a:spcBef>
+                <a:spcPct val="0"/>
+              </a:spcBef>
+              <a:spcAft>
+                <a:spcPct val="0"/>
+              </a:spcAft>
+              <a:buFontTx/>
+              <a:buNone/>
+            </a:pPr>
+            <a:r>
+              <a:rPr lang="en-US" altLang="en-US" sz="1900" dirty="0">
+                <a:solidFill>
+                  <a:schemeClr val="bg1"/>
+                </a:solidFill>
+                <a:latin typeface="+mj-lt"/>
+                <a:hlinkClick r:id="rId2">
+                  <a:extLst>
+                    <a:ext uri="{A12FA001-AC4F-418D-AE19-62706E023703}">
+                      <ahyp:hlinkClr xmlns:ahyp="http://schemas.microsoft.com/office/drawing/2018/hyperlinkcolor" val="tx"/>
+                    </a:ext>
+                  </a:extLst>
+                </a:hlinkClick>
+              </a:rPr>
+              <a:t>https://github.com/HosseinMohammadi00427/Analysis-Project</a:t>
+            </a:r>
+            <a:endParaRPr lang="en-US" altLang="en-US" sz="1900" dirty="0">
+              <a:solidFill>
+                <a:schemeClr val="bg1"/>
+              </a:solidFill>
+              <a:latin typeface="+mj-lt"/>
+            </a:endParaRPr>
+          </a:p>
+        </p:txBody>
+      </p:sp>
+    </p:spTree>
+    <p:extLst>
+      <p:ext uri="{BB962C8B-B14F-4D97-AF65-F5344CB8AC3E}">
+        <p14:creationId xmlns:p14="http://schemas.microsoft.com/office/powerpoint/2010/main" val="3213415113"/>
+      </p:ext>
+    </p:extLst>
+  </p:cSld>
+  <p:clrMapOvr>
+    <a:masterClrMapping/>
+  </p:clrMapOvr>
+</p:sld>
+</file>
+
+<file path=ppt/slides/slide4.xml><?xml version="1.0" encoding="utf-8"?>
+<p:sld xmlns:a="http://schemas.openxmlformats.org/drawingml/2006/main" xmlns:r="http://schemas.openxmlformats.org/officeDocument/2006/relationships" xmlns:p="http://schemas.openxmlformats.org/presentationml/2006/main">
+  <p:cSld>
+    <p:spTree>
+      <p:nvGrpSpPr>
         <p:cNvPr id="1" name="">
           <a:extLst>
             <a:ext uri="{FF2B5EF4-FFF2-40B4-BE49-F238E27FC236}">
@@ -9616,7 +10482,7 @@
 </p:sld>
 </file>
 
-<file path=ppt/slides/slide4.xml><?xml version="1.0" encoding="utf-8"?>
+<file path=ppt/slides/slide5.xml><?xml version="1.0" encoding="utf-8"?>
 <p:sld xmlns:a="http://schemas.openxmlformats.org/drawingml/2006/main" xmlns:r="http://schemas.openxmlformats.org/officeDocument/2006/relationships" xmlns:p="http://schemas.openxmlformats.org/presentationml/2006/main">
   <p:cSld>
     <p:spTree>
@@ -9652,7 +10518,7 @@
           <a:p>
             <a:r>
               <a:rPr lang="en-US" dirty="0"/>
-              <a:t>Questions</a:t>
+              <a:t>My Questions</a:t>
             </a:r>
           </a:p>
         </p:txBody>
@@ -9753,7 +10619,7 @@
 </p:sld>
 </file>
 
-<file path=ppt/slides/slide5.xml><?xml version="1.0" encoding="utf-8"?>
+<file path=ppt/slides/slide6.xml><?xml version="1.0" encoding="utf-8"?>
 <p:sld xmlns:a="http://schemas.openxmlformats.org/drawingml/2006/main" xmlns:r="http://schemas.openxmlformats.org/officeDocument/2006/relationships" xmlns:p="http://schemas.openxmlformats.org/presentationml/2006/main">
   <p:cSld>
     <p:spTree>
@@ -10591,7 +11457,7 @@
 </p:sld>
 </file>
 
-<file path=ppt/slides/slide6.xml><?xml version="1.0" encoding="utf-8"?>
+<file path=ppt/slides/slide7.xml><?xml version="1.0" encoding="utf-8"?>
 <p:sld xmlns:a="http://schemas.openxmlformats.org/drawingml/2006/main" xmlns:r="http://schemas.openxmlformats.org/officeDocument/2006/relationships" xmlns:p="http://schemas.openxmlformats.org/presentationml/2006/main">
   <p:cSld>
     <p:spTree>
@@ -11395,7 +12261,7 @@
 </p:sld>
 </file>
 
-<file path=ppt/slides/slide7.xml><?xml version="1.0" encoding="utf-8"?>
+<file path=ppt/slides/slide8.xml><?xml version="1.0" encoding="utf-8"?>
 <p:sld xmlns:a="http://schemas.openxmlformats.org/drawingml/2006/main" xmlns:r="http://schemas.openxmlformats.org/officeDocument/2006/relationships" xmlns:p="http://schemas.openxmlformats.org/presentationml/2006/main">
   <p:cSld>
     <p:spTree>
@@ -12196,7 +13062,7 @@
 </p:sld>
 </file>
 
-<file path=ppt/slides/slide8.xml><?xml version="1.0" encoding="utf-8"?>
+<file path=ppt/slides/slide9.xml><?xml version="1.0" encoding="utf-8"?>
 <p:sld xmlns:a="http://schemas.openxmlformats.org/drawingml/2006/main" xmlns:r="http://schemas.openxmlformats.org/officeDocument/2006/relationships" xmlns:p="http://schemas.openxmlformats.org/presentationml/2006/main">
   <p:cSld>
     <p:spTree>
@@ -15456,510 +16322,6 @@
 </p:sld>
 </file>
 
-<file path=ppt/slides/slide9.xml><?xml version="1.0" encoding="utf-8"?>
-<p:sld xmlns:a="http://schemas.openxmlformats.org/drawingml/2006/main" xmlns:r="http://schemas.openxmlformats.org/officeDocument/2006/relationships" xmlns:p="http://schemas.openxmlformats.org/presentationml/2006/main">
-  <p:cSld>
-    <p:spTree>
-      <p:nvGrpSpPr>
-        <p:cNvPr id="1" name="">
-          <a:extLst>
-            <a:ext uri="{FF2B5EF4-FFF2-40B4-BE49-F238E27FC236}">
-              <a16:creationId xmlns:a16="http://schemas.microsoft.com/office/drawing/2014/main" id="{D8756E67-E494-7A8E-2F71-C0F6E1314311}"/>
-            </a:ext>
-          </a:extLst>
-        </p:cNvPr>
-        <p:cNvGrpSpPr/>
-        <p:nvPr/>
-      </p:nvGrpSpPr>
-      <p:grpSpPr>
-        <a:xfrm>
-          <a:off x="0" y="0"/>
-          <a:ext cx="0" cy="0"/>
-          <a:chOff x="0" y="0"/>
-          <a:chExt cx="0" cy="0"/>
-        </a:xfrm>
-      </p:grpSpPr>
-      <p:sp>
-        <p:nvSpPr>
-          <p:cNvPr id="4" name="Title 1">
-            <a:extLst>
-              <a:ext uri="{FF2B5EF4-FFF2-40B4-BE49-F238E27FC236}">
-                <a16:creationId xmlns:a16="http://schemas.microsoft.com/office/drawing/2014/main" id="{9FA8DE6B-CA65-BA1F-4D7C-5C00A073C898}"/>
-              </a:ext>
-            </a:extLst>
-          </p:cNvPr>
-          <p:cNvSpPr>
-            <a:spLocks noGrp="1"/>
-          </p:cNvSpPr>
-          <p:nvPr/>
-        </p:nvSpPr>
-        <p:spPr>
-          <a:xfrm>
-            <a:off x="229509" y="0"/>
-            <a:ext cx="8246070" cy="763526"/>
-          </a:xfrm>
-          <a:prstGeom prst="rect">
-            <a:avLst/>
-          </a:prstGeom>
-        </p:spPr>
-        <p:txBody>
-          <a:bodyPr vert="horz" lIns="91440" tIns="45720" rIns="91440" bIns="45720" rtlCol="0" anchor="ctr">
-            <a:normAutofit/>
-          </a:bodyPr>
-          <a:lstStyle>
-            <a:lvl1pPr algn="l" defTabSz="914400" rtl="0" eaLnBrk="1" latinLnBrk="0" hangingPunct="1">
-              <a:spcBef>
-                <a:spcPct val="0"/>
-              </a:spcBef>
-              <a:buNone/>
-              <a:defRPr sz="3600" kern="1200" baseline="0">
-                <a:solidFill>
-                  <a:srgbClr val="9EFF29"/>
-                </a:solidFill>
-                <a:effectLst>
-                  <a:outerShdw blurRad="50800" dist="38100" dir="2700000" algn="tl" rotWithShape="0">
-                    <a:prstClr val="black">
-                      <a:alpha val="40000"/>
-                    </a:prstClr>
-                  </a:outerShdw>
-                </a:effectLst>
-                <a:latin typeface="+mj-lt"/>
-                <a:ea typeface="+mj-ea"/>
-                <a:cs typeface="+mj-cs"/>
-              </a:defRPr>
-            </a:lvl1pPr>
-          </a:lstStyle>
-          <a:p>
-            <a:r>
-              <a:rPr lang="en-US" dirty="0"/>
-              <a:t>Question #3</a:t>
-            </a:r>
-          </a:p>
-        </p:txBody>
-      </p:sp>
-      <p:sp>
-        <p:nvSpPr>
-          <p:cNvPr id="12" name="TextBox 11">
-            <a:extLst>
-              <a:ext uri="{FF2B5EF4-FFF2-40B4-BE49-F238E27FC236}">
-                <a16:creationId xmlns:a16="http://schemas.microsoft.com/office/drawing/2014/main" id="{369C876D-4B0F-F47E-9B20-623EED21EE97}"/>
-              </a:ext>
-            </a:extLst>
-          </p:cNvPr>
-          <p:cNvSpPr txBox="1"/>
-          <p:nvPr/>
-        </p:nvSpPr>
-        <p:spPr>
-          <a:xfrm>
-            <a:off x="327102" y="2709431"/>
-            <a:ext cx="2378927" cy="369332"/>
-          </a:xfrm>
-          <a:prstGeom prst="rect">
-            <a:avLst/>
-          </a:prstGeom>
-          <a:noFill/>
-        </p:spPr>
-        <p:txBody>
-          <a:bodyPr wrap="square" rtlCol="0">
-            <a:spAutoFit/>
-          </a:bodyPr>
-          <a:lstStyle/>
-          <a:p>
-            <a:r>
-              <a:rPr lang="en-US" u="sng" dirty="0">
-                <a:solidFill>
-                  <a:srgbClr val="9EFF29"/>
-                </a:solidFill>
-              </a:rPr>
-              <a:t>Results</a:t>
-            </a:r>
-          </a:p>
-        </p:txBody>
-      </p:sp>
-      <p:sp>
-        <p:nvSpPr>
-          <p:cNvPr id="13" name="TextBox 12">
-            <a:extLst>
-              <a:ext uri="{FF2B5EF4-FFF2-40B4-BE49-F238E27FC236}">
-                <a16:creationId xmlns:a16="http://schemas.microsoft.com/office/drawing/2014/main" id="{66511BE1-2C1C-1034-A13E-C950237E8BCC}"/>
-              </a:ext>
-            </a:extLst>
-          </p:cNvPr>
-          <p:cNvSpPr txBox="1"/>
-          <p:nvPr/>
-        </p:nvSpPr>
-        <p:spPr>
-          <a:xfrm>
-            <a:off x="319669" y="693515"/>
-            <a:ext cx="3865756" cy="338554"/>
-          </a:xfrm>
-          <a:prstGeom prst="rect">
-            <a:avLst/>
-          </a:prstGeom>
-          <a:noFill/>
-        </p:spPr>
-        <p:txBody>
-          <a:bodyPr wrap="square" rtlCol="0">
-            <a:spAutoFit/>
-          </a:bodyPr>
-          <a:lstStyle/>
-          <a:p>
-            <a:r>
-              <a:rPr lang="en-US" sz="1600" dirty="0">
-                <a:solidFill>
-                  <a:schemeClr val="bg1"/>
-                </a:solidFill>
-              </a:rPr>
-              <a:t>The player with the highest number of wins.</a:t>
-            </a:r>
-          </a:p>
-        </p:txBody>
-      </p:sp>
-      <p:sp>
-        <p:nvSpPr>
-          <p:cNvPr id="2" name="TextBox 1">
-            <a:extLst>
-              <a:ext uri="{FF2B5EF4-FFF2-40B4-BE49-F238E27FC236}">
-                <a16:creationId xmlns:a16="http://schemas.microsoft.com/office/drawing/2014/main" id="{89D211C8-3055-153C-9B57-E04F6F67F4AD}"/>
-              </a:ext>
-            </a:extLst>
-          </p:cNvPr>
-          <p:cNvSpPr txBox="1"/>
-          <p:nvPr/>
-        </p:nvSpPr>
-        <p:spPr>
-          <a:xfrm>
-            <a:off x="327102" y="1581247"/>
-            <a:ext cx="8697952" cy="830997"/>
-          </a:xfrm>
-          <a:prstGeom prst="rect">
-            <a:avLst/>
-          </a:prstGeom>
-          <a:noFill/>
-        </p:spPr>
-        <p:txBody>
-          <a:bodyPr wrap="square" rtlCol="0">
-            <a:spAutoFit/>
-          </a:bodyPr>
-          <a:lstStyle/>
-          <a:p>
-            <a:pPr algn="just"/>
-            <a:r>
-              <a:rPr lang="en-US" sz="1600" dirty="0">
-                <a:solidFill>
-                  <a:schemeClr val="bg1"/>
-                </a:solidFill>
-              </a:rPr>
-              <a:t>I loaded data with </a:t>
-            </a:r>
-            <a:r>
-              <a:rPr lang="en-US" sz="1600" dirty="0" err="1">
-                <a:solidFill>
-                  <a:schemeClr val="bg1"/>
-                </a:solidFill>
-                <a:latin typeface="Consolas" panose="020B0609020204030204" pitchFamily="49" charset="0"/>
-                <a:cs typeface="Courier New" panose="02070309020205020404" pitchFamily="49" charset="0"/>
-              </a:rPr>
-              <a:t>dask</a:t>
-            </a:r>
-            <a:r>
-              <a:rPr lang="en-US" sz="1600" dirty="0">
-                <a:solidFill>
-                  <a:schemeClr val="bg1"/>
-                </a:solidFill>
-              </a:rPr>
-              <a:t> and saved them in </a:t>
-            </a:r>
-            <a:r>
-              <a:rPr lang="en-US" sz="1600" dirty="0">
-                <a:solidFill>
-                  <a:schemeClr val="bg1"/>
-                </a:solidFill>
-                <a:latin typeface="Consolas" panose="020B0609020204030204" pitchFamily="49" charset="0"/>
-                <a:cs typeface="Courier New" panose="02070309020205020404" pitchFamily="49" charset="0"/>
-              </a:rPr>
-              <a:t>csv</a:t>
-            </a:r>
-            <a:r>
-              <a:rPr lang="en-US" sz="1600" dirty="0">
-                <a:solidFill>
-                  <a:schemeClr val="bg1"/>
-                </a:solidFill>
-              </a:rPr>
-              <a:t> files. </a:t>
-            </a:r>
-            <a:r>
-              <a:rPr lang="en-US" sz="1600" dirty="0" err="1">
-                <a:solidFill>
-                  <a:schemeClr val="bg1"/>
-                </a:solidFill>
-              </a:rPr>
-              <a:t>Preprocessings</a:t>
-            </a:r>
-            <a:r>
-              <a:rPr lang="en-US" sz="1600" dirty="0">
-                <a:solidFill>
-                  <a:schemeClr val="bg1"/>
-                </a:solidFill>
-              </a:rPr>
-              <a:t> like dropping duplicates, dropping missing values were applied to avoid overcounting. At the end grouping the concatenated table of winners, and sorting them were carried out .</a:t>
-            </a:r>
-          </a:p>
-        </p:txBody>
-      </p:sp>
-      <p:sp>
-        <p:nvSpPr>
-          <p:cNvPr id="3" name="TextBox 2">
-            <a:extLst>
-              <a:ext uri="{FF2B5EF4-FFF2-40B4-BE49-F238E27FC236}">
-                <a16:creationId xmlns:a16="http://schemas.microsoft.com/office/drawing/2014/main" id="{811379C5-29FF-16EF-7868-BE40842A6D0F}"/>
-              </a:ext>
-            </a:extLst>
-          </p:cNvPr>
-          <p:cNvSpPr txBox="1"/>
-          <p:nvPr/>
-        </p:nvSpPr>
-        <p:spPr>
-          <a:xfrm>
-            <a:off x="319668" y="3168686"/>
-            <a:ext cx="8697952" cy="584775"/>
-          </a:xfrm>
-          <a:prstGeom prst="rect">
-            <a:avLst/>
-          </a:prstGeom>
-          <a:noFill/>
-        </p:spPr>
-        <p:txBody>
-          <a:bodyPr wrap="square" rtlCol="0">
-            <a:spAutoFit/>
-          </a:bodyPr>
-          <a:lstStyle/>
-          <a:p>
-            <a:pPr algn="just"/>
-            <a:r>
-              <a:rPr lang="en-US" sz="1600" dirty="0">
-                <a:solidFill>
-                  <a:schemeClr val="bg1"/>
-                </a:solidFill>
-                <a:latin typeface="Courier New" panose="02070309020205020404" pitchFamily="49" charset="0"/>
-                <a:cs typeface="Courier New" panose="02070309020205020404" pitchFamily="49" charset="0"/>
-              </a:rPr>
-              <a:t>Dmitry Popkov </a:t>
-            </a:r>
-            <a:r>
-              <a:rPr lang="en-US" sz="1600" dirty="0">
-                <a:solidFill>
-                  <a:schemeClr val="bg1"/>
-                </a:solidFill>
-              </a:rPr>
-              <a:t>has the highest number of wins, with </a:t>
-            </a:r>
-            <a:r>
-              <a:rPr lang="en-US" sz="1600" dirty="0">
-                <a:solidFill>
-                  <a:schemeClr val="bg1"/>
-                </a:solidFill>
-                <a:latin typeface="Courier New" panose="02070309020205020404" pitchFamily="49" charset="0"/>
-                <a:cs typeface="Courier New" panose="02070309020205020404" pitchFamily="49" charset="0"/>
-              </a:rPr>
-              <a:t>29</a:t>
-            </a:r>
-            <a:r>
-              <a:rPr lang="en-US" sz="1600" dirty="0">
-                <a:solidFill>
-                  <a:schemeClr val="bg1"/>
-                </a:solidFill>
-              </a:rPr>
-              <a:t> wins in two months.</a:t>
-            </a:r>
-          </a:p>
-          <a:p>
-            <a:pPr algn="just"/>
-            <a:r>
-              <a:rPr lang="en-US" sz="1600" dirty="0">
-                <a:solidFill>
-                  <a:schemeClr val="bg1"/>
-                </a:solidFill>
-              </a:rPr>
-              <a:t>You can look at the table to find other top winners.</a:t>
-            </a:r>
-          </a:p>
-        </p:txBody>
-      </p:sp>
-      <p:sp>
-        <p:nvSpPr>
-          <p:cNvPr id="5" name="TextBox 4">
-            <a:extLst>
-              <a:ext uri="{FF2B5EF4-FFF2-40B4-BE49-F238E27FC236}">
-                <a16:creationId xmlns:a16="http://schemas.microsoft.com/office/drawing/2014/main" id="{08AEA5D1-481F-8D23-AA03-24AA8332AAED}"/>
-              </a:ext>
-            </a:extLst>
-          </p:cNvPr>
-          <p:cNvSpPr txBox="1"/>
-          <p:nvPr/>
-        </p:nvSpPr>
-        <p:spPr>
-          <a:xfrm>
-            <a:off x="319668" y="1121992"/>
-            <a:ext cx="2378927" cy="369332"/>
-          </a:xfrm>
-          <a:prstGeom prst="rect">
-            <a:avLst/>
-          </a:prstGeom>
-          <a:noFill/>
-        </p:spPr>
-        <p:txBody>
-          <a:bodyPr wrap="square" rtlCol="0">
-            <a:spAutoFit/>
-          </a:bodyPr>
-          <a:lstStyle/>
-          <a:p>
-            <a:r>
-              <a:rPr lang="en-US" u="sng" dirty="0">
-                <a:solidFill>
-                  <a:srgbClr val="9EFF29"/>
-                </a:solidFill>
-              </a:rPr>
-              <a:t>Coding and strategy</a:t>
-            </a:r>
-          </a:p>
-        </p:txBody>
-      </p:sp>
-    </p:spTree>
-    <p:extLst>
-      <p:ext uri="{BB962C8B-B14F-4D97-AF65-F5344CB8AC3E}">
-        <p14:creationId xmlns:p14="http://schemas.microsoft.com/office/powerpoint/2010/main" val="1543846504"/>
-      </p:ext>
-    </p:extLst>
-  </p:cSld>
-  <p:clrMapOvr>
-    <a:masterClrMapping/>
-  </p:clrMapOvr>
-  <p:timing>
-    <p:tnLst>
-      <p:par>
-        <p:cTn id="1" dur="indefinite" restart="never" nodeType="tmRoot">
-          <p:childTnLst>
-            <p:seq concurrent="1" nextAc="seek">
-              <p:cTn id="2" dur="indefinite" nodeType="mainSeq">
-                <p:childTnLst>
-                  <p:par>
-                    <p:cTn id="3" fill="hold">
-                      <p:stCondLst>
-                        <p:cond delay="indefinite"/>
-                      </p:stCondLst>
-                      <p:childTnLst>
-                        <p:par>
-                          <p:cTn id="4" fill="hold">
-                            <p:stCondLst>
-                              <p:cond delay="0"/>
-                            </p:stCondLst>
-                            <p:childTnLst>
-                              <p:par>
-                                <p:cTn id="5" presetID="10" presetClass="entr" presetSubtype="0" fill="hold" grpId="0" nodeType="clickEffect">
-                                  <p:stCondLst>
-                                    <p:cond delay="0"/>
-                                  </p:stCondLst>
-                                  <p:childTnLst>
-                                    <p:set>
-                                      <p:cBhvr>
-                                        <p:cTn id="6" dur="1" fill="hold">
-                                          <p:stCondLst>
-                                            <p:cond delay="0"/>
-                                          </p:stCondLst>
-                                        </p:cTn>
-                                        <p:tgtEl>
-                                          <p:spTgt spid="12"/>
-                                        </p:tgtEl>
-                                        <p:attrNameLst>
-                                          <p:attrName>style.visibility</p:attrName>
-                                        </p:attrNameLst>
-                                      </p:cBhvr>
-                                      <p:to>
-                                        <p:strVal val="visible"/>
-                                      </p:to>
-                                    </p:set>
-                                    <p:animEffect transition="in" filter="fade">
-                                      <p:cBhvr>
-                                        <p:cTn id="7" dur="500"/>
-                                        <p:tgtEl>
-                                          <p:spTgt spid="12"/>
-                                        </p:tgtEl>
-                                      </p:cBhvr>
-                                    </p:animEffect>
-                                  </p:childTnLst>
-                                </p:cTn>
-                              </p:par>
-                              <p:par>
-                                <p:cTn id="8" presetID="10" presetClass="entr" presetSubtype="0" fill="hold" grpId="0" nodeType="withEffect">
-                                  <p:stCondLst>
-                                    <p:cond delay="0"/>
-                                  </p:stCondLst>
-                                  <p:childTnLst>
-                                    <p:set>
-                                      <p:cBhvr>
-                                        <p:cTn id="9" dur="1" fill="hold">
-                                          <p:stCondLst>
-                                            <p:cond delay="0"/>
-                                          </p:stCondLst>
-                                        </p:cTn>
-                                        <p:tgtEl>
-                                          <p:spTgt spid="3"/>
-                                        </p:tgtEl>
-                                        <p:attrNameLst>
-                                          <p:attrName>style.visibility</p:attrName>
-                                        </p:attrNameLst>
-                                      </p:cBhvr>
-                                      <p:to>
-                                        <p:strVal val="visible"/>
-                                      </p:to>
-                                    </p:set>
-                                    <p:animEffect transition="in" filter="fade">
-                                      <p:cBhvr>
-                                        <p:cTn id="10" dur="500"/>
-                                        <p:tgtEl>
-                                          <p:spTgt spid="3"/>
-                                        </p:tgtEl>
-                                      </p:cBhvr>
-                                    </p:animEffect>
-                                  </p:childTnLst>
-                                </p:cTn>
-                              </p:par>
-                            </p:childTnLst>
-                          </p:cTn>
-                        </p:par>
-                      </p:childTnLst>
-                    </p:cTn>
-                  </p:par>
-                </p:childTnLst>
-              </p:cTn>
-              <p:prevCondLst>
-                <p:cond evt="onPrev" delay="0">
-                  <p:tgtEl>
-                    <p:sldTgt/>
-                  </p:tgtEl>
-                </p:cond>
-              </p:prevCondLst>
-              <p:nextCondLst>
-                <p:cond evt="onNext" delay="0">
-                  <p:tgtEl>
-                    <p:sldTgt/>
-                  </p:tgtEl>
-                </p:cond>
-              </p:nextCondLst>
-            </p:seq>
-          </p:childTnLst>
-        </p:cTn>
-      </p:par>
-    </p:tnLst>
-    <p:bldLst>
-      <p:bldP spid="12" grpId="0"/>
-      <p:bldP spid="3" grpId="0"/>
-    </p:bldLst>
-  </p:timing>
-</p:sld>
-</file>
-
 <file path=ppt/theme/theme1.xml><?xml version="1.0" encoding="utf-8"?>
 <a:theme xmlns:a="http://schemas.openxmlformats.org/drawingml/2006/main" name="Office Theme">
   <a:themeElements>

</xml_diff>

<commit_message>
Enhanceing and summarizing my presentation.
</commit_message>
<xml_diff>
--- a/Mohammadi.pptx
+++ b/Mohammadi.pptx
@@ -1648,7 +1648,7 @@
           <a:p>
             <a:fld id="{C8D18E60-4300-4729-A0D7-6AB984C3922D}" type="datetimeFigureOut">
               <a:rPr lang="en-US" smtClean="0"/>
-              <a:t>7/18/2025</a:t>
+              <a:t>7/20/2025</a:t>
             </a:fld>
             <a:endParaRPr lang="en-US"/>
           </a:p>
@@ -3058,7 +3058,7 @@
             <a:fld id="{53074F12-AA26-4AC8-9962-C36BB8F32554}" type="datetimeFigureOut">
               <a:rPr lang="en-US" smtClean="0"/>
               <a:pPr/>
-              <a:t>7/18/2025</a:t>
+              <a:t>7/20/2025</a:t>
             </a:fld>
             <a:endParaRPr lang="en-US"/>
           </a:p>
@@ -3312,7 +3312,7 @@
             <a:fld id="{53074F12-AA26-4AC8-9962-C36BB8F32554}" type="datetimeFigureOut">
               <a:rPr lang="en-US" smtClean="0"/>
               <a:pPr/>
-              <a:t>7/18/2025</a:t>
+              <a:t>7/20/2025</a:t>
             </a:fld>
             <a:endParaRPr lang="en-US"/>
           </a:p>
@@ -3482,7 +3482,7 @@
             <a:fld id="{53074F12-AA26-4AC8-9962-C36BB8F32554}" type="datetimeFigureOut">
               <a:rPr lang="en-US" smtClean="0"/>
               <a:pPr/>
-              <a:t>7/18/2025</a:t>
+              <a:t>7/20/2025</a:t>
             </a:fld>
             <a:endParaRPr lang="en-US"/>
           </a:p>
@@ -3662,7 +3662,7 @@
             <a:fld id="{53074F12-AA26-4AC8-9962-C36BB8F32554}" type="datetimeFigureOut">
               <a:rPr lang="en-US" smtClean="0"/>
               <a:pPr/>
-              <a:t>7/18/2025</a:t>
+              <a:t>7/20/2025</a:t>
             </a:fld>
             <a:endParaRPr lang="en-US"/>
           </a:p>
@@ -3944,7 +3944,7 @@
             <a:fld id="{53074F12-AA26-4AC8-9962-C36BB8F32554}" type="datetimeFigureOut">
               <a:rPr lang="en-US" smtClean="0"/>
               <a:pPr/>
-              <a:t>7/18/2025</a:t>
+              <a:t>7/20/2025</a:t>
             </a:fld>
             <a:endParaRPr lang="en-US"/>
           </a:p>
@@ -4191,7 +4191,7 @@
             <a:fld id="{53074F12-AA26-4AC8-9962-C36BB8F32554}" type="datetimeFigureOut">
               <a:rPr lang="en-US" smtClean="0"/>
               <a:pPr/>
-              <a:t>7/18/2025</a:t>
+              <a:t>7/20/2025</a:t>
             </a:fld>
             <a:endParaRPr lang="en-US"/>
           </a:p>
@@ -4438,7 +4438,7 @@
             <a:fld id="{53074F12-AA26-4AC8-9962-C36BB8F32554}" type="datetimeFigureOut">
               <a:rPr lang="en-US" smtClean="0"/>
               <a:pPr/>
-              <a:t>7/18/2025</a:t>
+              <a:t>7/20/2025</a:t>
             </a:fld>
             <a:endParaRPr lang="en-US"/>
           </a:p>
@@ -4725,7 +4725,7 @@
             <a:fld id="{53074F12-AA26-4AC8-9962-C36BB8F32554}" type="datetimeFigureOut">
               <a:rPr lang="en-US" smtClean="0"/>
               <a:pPr/>
-              <a:t>7/18/2025</a:t>
+              <a:t>7/20/2025</a:t>
             </a:fld>
             <a:endParaRPr lang="en-US"/>
           </a:p>
@@ -5212,7 +5212,7 @@
             <a:fld id="{53074F12-AA26-4AC8-9962-C36BB8F32554}" type="datetimeFigureOut">
               <a:rPr lang="en-US" smtClean="0"/>
               <a:pPr/>
-              <a:t>7/18/2025</a:t>
+              <a:t>7/20/2025</a:t>
             </a:fld>
             <a:endParaRPr lang="en-US"/>
           </a:p>
@@ -5331,7 +5331,7 @@
             <a:fld id="{53074F12-AA26-4AC8-9962-C36BB8F32554}" type="datetimeFigureOut">
               <a:rPr lang="en-US" smtClean="0"/>
               <a:pPr/>
-              <a:t>7/18/2025</a:t>
+              <a:t>7/20/2025</a:t>
             </a:fld>
             <a:endParaRPr lang="en-US"/>
           </a:p>
@@ -5428,7 +5428,7 @@
             <a:fld id="{53074F12-AA26-4AC8-9962-C36BB8F32554}" type="datetimeFigureOut">
               <a:rPr lang="en-US" smtClean="0"/>
               <a:pPr/>
-              <a:t>7/18/2025</a:t>
+              <a:t>7/20/2025</a:t>
             </a:fld>
             <a:endParaRPr lang="en-US"/>
           </a:p>
@@ -5705,7 +5705,7 @@
             <a:fld id="{53074F12-AA26-4AC8-9962-C36BB8F32554}" type="datetimeFigureOut">
               <a:rPr lang="en-US" smtClean="0"/>
               <a:pPr/>
-              <a:t>7/18/2025</a:t>
+              <a:t>7/20/2025</a:t>
             </a:fld>
             <a:endParaRPr lang="en-US"/>
           </a:p>
@@ -5927,7 +5927,7 @@
             <a:fld id="{53074F12-AA26-4AC8-9962-C36BB8F32554}" type="datetimeFigureOut">
               <a:rPr lang="en-US" smtClean="0"/>
               <a:pPr/>
-              <a:t>7/18/2025</a:t>
+              <a:t>7/20/2025</a:t>
             </a:fld>
             <a:endParaRPr lang="en-US"/>
           </a:p>
@@ -6713,59 +6713,78 @@
             <a:r>
               <a:rPr lang="en-US" sz="1600" dirty="0">
                 <a:solidFill>
-                  <a:schemeClr val="bg1"/>
-                </a:solidFill>
-              </a:rPr>
-              <a:t>I loaded data with </a:t>
-            </a:r>
-            <a:r>
-              <a:rPr lang="en-US" sz="1600" dirty="0" err="1">
-                <a:solidFill>
-                  <a:schemeClr val="bg1"/>
+                  <a:schemeClr val="tx1">
+                    <a:lumMod val="65000"/>
+                    <a:lumOff val="35000"/>
+                  </a:schemeClr>
+                </a:solidFill>
+              </a:rPr>
+              <a:t>I loaded data</a:t>
+            </a:r>
+            <a:r>
+              <a:rPr lang="fa-IR" sz="1600" dirty="0">
+                <a:solidFill>
+                  <a:schemeClr val="tx1">
+                    <a:lumMod val="65000"/>
+                    <a:lumOff val="35000"/>
+                  </a:schemeClr>
+                </a:solidFill>
+              </a:rPr>
+              <a:t> </a:t>
+            </a:r>
+            <a:r>
+              <a:rPr lang="en-US" sz="1600" dirty="0">
+                <a:solidFill>
+                  <a:schemeClr val="tx1">
+                    <a:lumMod val="65000"/>
+                    <a:lumOff val="35000"/>
+                  </a:schemeClr>
+                </a:solidFill>
+              </a:rPr>
+              <a:t>and saved them in </a:t>
+            </a:r>
+            <a:r>
+              <a:rPr lang="en-US" sz="1600" dirty="0">
+                <a:solidFill>
+                  <a:schemeClr val="tx1">
+                    <a:lumMod val="65000"/>
+                    <a:lumOff val="35000"/>
+                  </a:schemeClr>
                 </a:solidFill>
                 <a:latin typeface="Consolas" panose="020B0609020204030204" pitchFamily="49" charset="0"/>
                 <a:cs typeface="Courier New" panose="02070309020205020404" pitchFamily="49" charset="0"/>
               </a:rPr>
-              <a:t>dask</a:t>
+              <a:t>csv</a:t>
             </a:r>
             <a:r>
               <a:rPr lang="en-US" sz="1600" dirty="0">
                 <a:solidFill>
-                  <a:schemeClr val="bg1"/>
-                </a:solidFill>
-              </a:rPr>
-              <a:t> and saved them in </a:t>
+                  <a:schemeClr val="tx1">
+                    <a:lumMod val="65000"/>
+                    <a:lumOff val="35000"/>
+                  </a:schemeClr>
+                </a:solidFill>
+              </a:rPr>
+              <a:t> files. Pre-</a:t>
+            </a:r>
+            <a:r>
+              <a:rPr lang="en-US" sz="1600" dirty="0" err="1">
+                <a:solidFill>
+                  <a:schemeClr val="tx1">
+                    <a:lumMod val="65000"/>
+                    <a:lumOff val="35000"/>
+                  </a:schemeClr>
+                </a:solidFill>
+              </a:rPr>
+              <a:t>processings</a:t>
             </a:r>
             <a:r>
               <a:rPr lang="en-US" sz="1600" dirty="0">
                 <a:solidFill>
-                  <a:schemeClr val="bg1"/>
-                </a:solidFill>
-                <a:latin typeface="Consolas" panose="020B0609020204030204" pitchFamily="49" charset="0"/>
-                <a:cs typeface="Courier New" panose="02070309020205020404" pitchFamily="49" charset="0"/>
-              </a:rPr>
-              <a:t>csv</a:t>
-            </a:r>
-            <a:r>
-              <a:rPr lang="en-US" sz="1600" dirty="0">
-                <a:solidFill>
-                  <a:schemeClr val="bg1"/>
-                </a:solidFill>
-              </a:rPr>
-              <a:t> files. </a:t>
-            </a:r>
-            <a:r>
-              <a:rPr lang="en-US" sz="1600" dirty="0" err="1">
-                <a:solidFill>
-                  <a:schemeClr val="bg1"/>
-                </a:solidFill>
-              </a:rPr>
-              <a:t>Preprocessings</a:t>
-            </a:r>
-            <a:r>
-              <a:rPr lang="en-US" sz="1600" dirty="0">
-                <a:solidFill>
-                  <a:schemeClr val="bg1"/>
+                  <a:schemeClr val="tx1">
+                    <a:lumMod val="65000"/>
+                    <a:lumOff val="35000"/>
+                  </a:schemeClr>
                 </a:solidFill>
               </a:rPr>
               <a:t> like dropping duplicates, dropping missing values were applied to avoid overcounting. At the end grouping the concatenated table of winners, and sorting them were carried out .</a:t>
@@ -7373,12 +7392,26 @@
                   <a:schemeClr val="bg1"/>
                 </a:solidFill>
               </a:rPr>
-              <a:t>so I can’t extract their duration, hence I drop them. I dop duplicates of </a:t>
+              <a:t>so I can’t extract their duration, hence I drop them</a:t>
             </a:r>
             <a:r>
               <a:rPr lang="en-US" sz="1600" dirty="0">
                 <a:solidFill>
-                  <a:schemeClr val="bg1"/>
+                  <a:schemeClr val="tx1">
+                    <a:lumMod val="65000"/>
+                    <a:lumOff val="35000"/>
+                  </a:schemeClr>
+                </a:solidFill>
+              </a:rPr>
+              <a:t>. I drop duplicates of </a:t>
+            </a:r>
+            <a:r>
+              <a:rPr lang="en-US" sz="1600" dirty="0">
+                <a:solidFill>
+                  <a:schemeClr val="tx1">
+                    <a:lumMod val="65000"/>
+                    <a:lumOff val="35000"/>
+                  </a:schemeClr>
                 </a:solidFill>
                 <a:latin typeface="Courier New" panose="02070309020205020404" pitchFamily="49" charset="0"/>
                 <a:cs typeface="Courier New" panose="02070309020205020404" pitchFamily="49" charset="0"/>
@@ -7388,7 +7421,10 @@
             <a:r>
               <a:rPr lang="en-US" sz="1600" dirty="0" err="1">
                 <a:solidFill>
-                  <a:schemeClr val="bg1"/>
+                  <a:schemeClr val="tx1">
+                    <a:lumMod val="65000"/>
+                    <a:lumOff val="35000"/>
+                  </a:schemeClr>
                 </a:solidFill>
                 <a:latin typeface="Courier New" panose="02070309020205020404" pitchFamily="49" charset="0"/>
                 <a:cs typeface="Courier New" panose="02070309020205020404" pitchFamily="49" charset="0"/>
@@ -7398,7 +7434,10 @@
             <a:r>
               <a:rPr lang="en-US" sz="1600" dirty="0">
                 <a:solidFill>
-                  <a:schemeClr val="bg1"/>
+                  <a:schemeClr val="tx1">
+                    <a:lumMod val="65000"/>
+                    <a:lumOff val="35000"/>
+                  </a:schemeClr>
                 </a:solidFill>
                 <a:latin typeface="Courier New" panose="02070309020205020404" pitchFamily="49" charset="0"/>
                 <a:cs typeface="Courier New" panose="02070309020205020404" pitchFamily="49" charset="0"/>
@@ -7408,7 +7447,10 @@
             <a:r>
               <a:rPr lang="en-US" sz="1600" dirty="0">
                 <a:solidFill>
-                  <a:schemeClr val="bg1"/>
+                  <a:schemeClr val="tx1">
+                    <a:lumMod val="65000"/>
+                    <a:lumOff val="35000"/>
+                  </a:schemeClr>
                 </a:solidFill>
               </a:rPr>
               <a:t>and then add the periods to find total duration of a match.</a:t>
@@ -7440,7 +7482,18 @@
                   <a:schemeClr val="bg1"/>
                 </a:solidFill>
               </a:rPr>
-              <a:t>and found outliers. Based on Gaussian distribution, I decided to cut 1% top durations (which last more than 6 hours!).</a:t>
+              <a:t>and found outliers and dropped them </a:t>
+            </a:r>
+            <a:r>
+              <a:rPr lang="en-US" sz="1600" dirty="0">
+                <a:solidFill>
+                  <a:schemeClr val="tx1">
+                    <a:lumMod val="65000"/>
+                    <a:lumOff val="35000"/>
+                  </a:schemeClr>
+                </a:solidFill>
+              </a:rPr>
+              <a:t>based on Gaussian distribution, I decided to cut 1% top durations (which last more than 6 hours!).</a:t>
             </a:r>
           </a:p>
         </p:txBody>
@@ -8964,12 +9017,26 @@
                   <a:schemeClr val="bg1"/>
                 </a:solidFill>
               </a:rPr>
-              <a:t>. We need the </a:t>
+              <a:t>. </a:t>
             </a:r>
             <a:r>
               <a:rPr lang="en-US" sz="1600" dirty="0">
                 <a:solidFill>
-                  <a:schemeClr val="bg1"/>
+                  <a:schemeClr val="tx1">
+                    <a:lumMod val="65000"/>
+                    <a:lumOff val="35000"/>
+                  </a:schemeClr>
+                </a:solidFill>
+              </a:rPr>
+              <a:t>We need the </a:t>
+            </a:r>
+            <a:r>
+              <a:rPr lang="en-US" sz="1600" dirty="0">
+                <a:solidFill>
+                  <a:schemeClr val="tx1">
+                    <a:lumMod val="65000"/>
+                    <a:lumOff val="35000"/>
+                  </a:schemeClr>
                 </a:solidFill>
                 <a:latin typeface="Consolas" panose="020B0609020204030204" pitchFamily="49" charset="0"/>
               </a:rPr>
@@ -8978,7 +9045,10 @@
             <a:r>
               <a:rPr lang="en-US" sz="1600" dirty="0" err="1">
                 <a:solidFill>
-                  <a:schemeClr val="bg1"/>
+                  <a:schemeClr val="tx1">
+                    <a:lumMod val="65000"/>
+                    <a:lumOff val="35000"/>
+                  </a:schemeClr>
                 </a:solidFill>
                 <a:latin typeface="Consolas" panose="020B0609020204030204" pitchFamily="49" charset="0"/>
               </a:rPr>
@@ -8987,7 +9057,10 @@
             <a:r>
               <a:rPr lang="en-US" sz="1600" dirty="0">
                 <a:solidFill>
-                  <a:schemeClr val="bg1"/>
+                  <a:schemeClr val="tx1">
+                    <a:lumMod val="65000"/>
+                    <a:lumOff val="35000"/>
+                  </a:schemeClr>
                 </a:solidFill>
                 <a:latin typeface="Consolas" panose="020B0609020204030204" pitchFamily="49" charset="0"/>
               </a:rPr>
@@ -8996,7 +9069,10 @@
             <a:r>
               <a:rPr lang="en-US" sz="1600" dirty="0" err="1">
                 <a:solidFill>
-                  <a:schemeClr val="bg1"/>
+                  <a:schemeClr val="tx1">
+                    <a:lumMod val="65000"/>
+                    <a:lumOff val="35000"/>
+                  </a:schemeClr>
                 </a:solidFill>
                 <a:latin typeface="Consolas" panose="020B0609020204030204" pitchFamily="49" charset="0"/>
               </a:rPr>
@@ -9005,7 +9081,10 @@
             <a:r>
               <a:rPr lang="en-US" sz="1600" dirty="0">
                 <a:solidFill>
-                  <a:schemeClr val="bg1"/>
+                  <a:schemeClr val="tx1">
+                    <a:lumMod val="65000"/>
+                    <a:lumOff val="35000"/>
+                  </a:schemeClr>
                 </a:solidFill>
                 <a:latin typeface="Consolas" panose="020B0609020204030204" pitchFamily="49" charset="0"/>
               </a:rPr>
@@ -9014,7 +9093,10 @@
             <a:r>
               <a:rPr lang="en-US" sz="1600" dirty="0" err="1">
                 <a:solidFill>
-                  <a:schemeClr val="bg1"/>
+                  <a:schemeClr val="tx1">
+                    <a:lumMod val="65000"/>
+                    <a:lumOff val="35000"/>
+                  </a:schemeClr>
                 </a:solidFill>
                 <a:latin typeface="Consolas" panose="020B0609020204030204" pitchFamily="49" charset="0"/>
               </a:rPr>
@@ -9023,7 +9105,10 @@
             <a:r>
               <a:rPr lang="en-US" sz="1600" dirty="0">
                 <a:solidFill>
-                  <a:schemeClr val="bg1"/>
+                  <a:schemeClr val="tx1">
+                    <a:lumMod val="65000"/>
+                    <a:lumOff val="35000"/>
+                  </a:schemeClr>
                 </a:solidFill>
                 <a:latin typeface="Consolas" panose="020B0609020204030204" pitchFamily="49" charset="0"/>
               </a:rPr>
@@ -9032,7 +9117,10 @@
             <a:r>
               <a:rPr lang="en-US" sz="1600" dirty="0" err="1">
                 <a:solidFill>
-                  <a:schemeClr val="bg1"/>
+                  <a:schemeClr val="tx1">
+                    <a:lumMod val="65000"/>
+                    <a:lumOff val="35000"/>
+                  </a:schemeClr>
                 </a:solidFill>
                 <a:latin typeface="Consolas" panose="020B0609020204030204" pitchFamily="49" charset="0"/>
               </a:rPr>
@@ -9041,7 +9129,10 @@
             <a:r>
               <a:rPr lang="en-US" sz="1600" dirty="0">
                 <a:solidFill>
-                  <a:schemeClr val="bg1"/>
+                  <a:schemeClr val="tx1">
+                    <a:lumMod val="65000"/>
+                    <a:lumOff val="35000"/>
+                  </a:schemeClr>
                 </a:solidFill>
                 <a:latin typeface="Consolas" panose="020B0609020204030204" pitchFamily="49" charset="0"/>
               </a:rPr>
@@ -9050,7 +9141,10 @@
             <a:r>
               <a:rPr lang="en-US" sz="1600" dirty="0">
                 <a:solidFill>
-                  <a:schemeClr val="bg1"/>
+                  <a:schemeClr val="tx1">
+                    <a:lumMod val="65000"/>
+                    <a:lumOff val="35000"/>
+                  </a:schemeClr>
                 </a:solidFill>
               </a:rPr>
               <a:t>columns.</a:t>
@@ -9199,7 +9293,10 @@
             <a:r>
               <a:rPr lang="en-US" sz="1600" dirty="0">
                 <a:solidFill>
-                  <a:schemeClr val="bg1"/>
+                  <a:schemeClr val="tx1">
+                    <a:lumMod val="65000"/>
+                    <a:lumOff val="35000"/>
+                  </a:schemeClr>
                 </a:solidFill>
               </a:rPr>
               <a:t>After adding `</a:t>
@@ -9207,7 +9304,10 @@
             <a:r>
               <a:rPr lang="en-US" sz="1600" dirty="0" err="1">
                 <a:solidFill>
-                  <a:schemeClr val="bg1"/>
+                  <a:schemeClr val="tx1">
+                    <a:lumMod val="65000"/>
+                    <a:lumOff val="35000"/>
+                  </a:schemeClr>
                 </a:solidFill>
                 <a:latin typeface="Consolas" panose="020B0609020204030204" pitchFamily="49" charset="0"/>
               </a:rPr>
@@ -9216,7 +9316,10 @@
             <a:r>
               <a:rPr lang="en-US" sz="1600" dirty="0">
                 <a:solidFill>
-                  <a:schemeClr val="bg1"/>
+                  <a:schemeClr val="tx1">
+                    <a:lumMod val="65000"/>
+                    <a:lumOff val="35000"/>
+                  </a:schemeClr>
                 </a:solidFill>
                 <a:latin typeface="Consolas" panose="020B0609020204030204" pitchFamily="49" charset="0"/>
               </a:rPr>
@@ -9225,7 +9328,10 @@
             <a:r>
               <a:rPr lang="en-US" sz="1600" dirty="0">
                 <a:solidFill>
-                  <a:schemeClr val="bg1"/>
+                  <a:schemeClr val="tx1">
+                    <a:lumMod val="65000"/>
+                    <a:lumOff val="35000"/>
+                  </a:schemeClr>
                 </a:solidFill>
               </a:rPr>
               <a:t> for each player, I group the table by </a:t>
@@ -9233,7 +9339,10 @@
             <a:r>
               <a:rPr lang="en-US" sz="1600" dirty="0">
                 <a:solidFill>
-                  <a:schemeClr val="bg1"/>
+                  <a:schemeClr val="tx1">
+                    <a:lumMod val="65000"/>
+                    <a:lumOff val="35000"/>
+                  </a:schemeClr>
                 </a:solidFill>
                 <a:latin typeface="Consolas" panose="020B0609020204030204" pitchFamily="49" charset="0"/>
               </a:rPr>
@@ -9242,7 +9351,10 @@
             <a:r>
               <a:rPr lang="en-US" sz="1600" dirty="0">
                 <a:solidFill>
-                  <a:schemeClr val="bg1"/>
+                  <a:schemeClr val="tx1">
+                    <a:lumMod val="65000"/>
+                    <a:lumOff val="35000"/>
+                  </a:schemeClr>
                 </a:solidFill>
               </a:rPr>
               <a:t>and take </a:t>
@@ -9250,7 +9362,10 @@
             <a:r>
               <a:rPr lang="en-US" sz="1600" dirty="0">
                 <a:solidFill>
-                  <a:schemeClr val="bg1"/>
+                  <a:schemeClr val="tx1">
+                    <a:lumMod val="65000"/>
+                    <a:lumOff val="35000"/>
+                  </a:schemeClr>
                 </a:solidFill>
                 <a:latin typeface="Courier New" panose="02070309020205020404" pitchFamily="49" charset="0"/>
                 <a:cs typeface="Courier New" panose="02070309020205020404" pitchFamily="49" charset="0"/>
@@ -9260,14 +9375,20 @@
             <a:r>
               <a:rPr lang="en-US" sz="1600" dirty="0">
                 <a:solidFill>
-                  <a:schemeClr val="bg1"/>
+                  <a:schemeClr val="tx1">
+                    <a:lumMod val="65000"/>
+                    <a:lumOff val="35000"/>
+                  </a:schemeClr>
                 </a:solidFill>
               </a:rPr>
               <a:t>of score of players on that country.</a:t>
             </a:r>
             <a:endParaRPr lang="en-US" sz="1600" dirty="0">
               <a:solidFill>
-                <a:schemeClr val="bg1"/>
+                <a:schemeClr val="tx1">
+                  <a:lumMod val="65000"/>
+                  <a:lumOff val="35000"/>
+                </a:schemeClr>
               </a:solidFill>
               <a:latin typeface="Consolas" panose="020B0609020204030204" pitchFamily="49" charset="0"/>
             </a:endParaRPr>
@@ -10996,24 +11117,7 @@
                   <a:schemeClr val="bg1"/>
                 </a:solidFill>
               </a:rPr>
-              <a:t>I load all the relevant tables and columns via </a:t>
-            </a:r>
-            <a:r>
-              <a:rPr lang="en-US" sz="1600" dirty="0" err="1">
-                <a:solidFill>
-                  <a:schemeClr val="bg1"/>
-                </a:solidFill>
-                <a:latin typeface="Consolas" panose="020B0609020204030204" pitchFamily="49" charset="0"/>
-              </a:rPr>
-              <a:t>dask</a:t>
-            </a:r>
-            <a:r>
-              <a:rPr lang="en-US" sz="1600" dirty="0">
-                <a:solidFill>
-                  <a:schemeClr val="bg1"/>
-                </a:solidFill>
-              </a:rPr>
-              <a:t>, and save them in a </a:t>
+              <a:t>I load all the relevant tables and columns, and save them in a </a:t>
             </a:r>
             <a:r>
               <a:rPr lang="en-US" sz="1600" dirty="0">
@@ -11854,46 +11958,45 @@
             <a:r>
               <a:rPr lang="en-US" sz="1600" dirty="0">
                 <a:solidFill>
-                  <a:schemeClr val="bg1"/>
-                </a:solidFill>
-              </a:rPr>
-              <a:t>I loaded data with </a:t>
-            </a:r>
-            <a:r>
-              <a:rPr lang="en-US" sz="1600" dirty="0" err="1">
-                <a:solidFill>
-                  <a:schemeClr val="bg1"/>
+                  <a:schemeClr val="tx1">
+                    <a:lumMod val="65000"/>
+                    <a:lumOff val="35000"/>
+                  </a:schemeClr>
+                </a:solidFill>
+              </a:rPr>
+              <a:t>I loaded data and saved them in </a:t>
+            </a:r>
+            <a:r>
+              <a:rPr lang="en-US" sz="1600" dirty="0">
+                <a:solidFill>
+                  <a:schemeClr val="tx1">
+                    <a:lumMod val="65000"/>
+                    <a:lumOff val="35000"/>
+                  </a:schemeClr>
                 </a:solidFill>
                 <a:latin typeface="Consolas" panose="020B0609020204030204" pitchFamily="49" charset="0"/>
                 <a:cs typeface="Courier New" panose="02070309020205020404" pitchFamily="49" charset="0"/>
               </a:rPr>
-              <a:t>dask</a:t>
+              <a:t>csv</a:t>
             </a:r>
             <a:r>
               <a:rPr lang="en-US" sz="1600" dirty="0">
                 <a:solidFill>
+                  <a:schemeClr val="tx1">
+                    <a:lumMod val="65000"/>
+                    <a:lumOff val="35000"/>
+                  </a:schemeClr>
+                </a:solidFill>
+              </a:rPr>
+              <a:t> files. </a:t>
+            </a:r>
+            <a:r>
+              <a:rPr lang="en-US" sz="1600" dirty="0">
+                <a:solidFill>
                   <a:schemeClr val="bg1"/>
                 </a:solidFill>
               </a:rPr>
-              <a:t> and saved them in </a:t>
-            </a:r>
-            <a:r>
-              <a:rPr lang="en-US" sz="1600" dirty="0">
-                <a:solidFill>
-                  <a:schemeClr val="bg1"/>
-                </a:solidFill>
-                <a:latin typeface="Consolas" panose="020B0609020204030204" pitchFamily="49" charset="0"/>
-                <a:cs typeface="Courier New" panose="02070309020205020404" pitchFamily="49" charset="0"/>
-              </a:rPr>
-              <a:t>csv</a:t>
-            </a:r>
-            <a:r>
-              <a:rPr lang="en-US" sz="1600" dirty="0">
-                <a:solidFill>
-                  <a:schemeClr val="bg1"/>
-                </a:solidFill>
-              </a:rPr>
-              <a:t> files. Note that  I deleted the repetitive players before averaging, and also dropped missing heights. Then, I found the mean of the heights.</a:t>
+              <a:t>Note that  I deleted the repetitive players before averaging, and also dropped missing heights. Then, I found the mean of the heights.</a:t>
             </a:r>
           </a:p>
         </p:txBody>
@@ -12435,7 +12538,7 @@
         <p:spPr>
           <a:xfrm>
             <a:off x="327102" y="1572731"/>
-            <a:ext cx="8697952" cy="3293209"/>
+            <a:ext cx="8697952" cy="2800767"/>
           </a:xfrm>
           <a:prstGeom prst="rect">
             <a:avLst/>
@@ -12616,122 +12719,6 @@
           </a:p>
           <a:p>
             <a:pPr algn="just"/>
-            <a:r>
-              <a:rPr lang="en-US" sz="1600" dirty="0">
-                <a:solidFill>
-                  <a:schemeClr val="bg1"/>
-                </a:solidFill>
-              </a:rPr>
-              <a:t>Also, </a:t>
-            </a:r>
-            <a:r>
-              <a:rPr lang="en-US" sz="1600" dirty="0">
-                <a:solidFill>
-                  <a:schemeClr val="bg1"/>
-                </a:solidFill>
-                <a:latin typeface="Consolas" panose="020B0609020204030204" pitchFamily="49" charset="0"/>
-              </a:rPr>
-              <a:t>`</a:t>
-            </a:r>
-            <a:r>
-              <a:rPr lang="en-US" sz="1600" dirty="0" err="1">
-                <a:solidFill>
-                  <a:schemeClr val="bg1"/>
-                </a:solidFill>
-                <a:latin typeface="Consolas" panose="020B0609020204030204" pitchFamily="49" charset="0"/>
-              </a:rPr>
-              <a:t>player_id</a:t>
-            </a:r>
-            <a:r>
-              <a:rPr lang="en-US" sz="1600" dirty="0">
-                <a:solidFill>
-                  <a:schemeClr val="bg1"/>
-                </a:solidFill>
-                <a:latin typeface="Consolas" panose="020B0609020204030204" pitchFamily="49" charset="0"/>
-              </a:rPr>
-              <a:t>` </a:t>
-            </a:r>
-            <a:r>
-              <a:rPr lang="en-US" sz="1600" dirty="0">
-                <a:solidFill>
-                  <a:schemeClr val="bg1"/>
-                </a:solidFill>
-              </a:rPr>
-              <a:t>and </a:t>
-            </a:r>
-            <a:r>
-              <a:rPr lang="en-US" sz="1600" dirty="0">
-                <a:solidFill>
-                  <a:schemeClr val="bg1"/>
-                </a:solidFill>
-                <a:latin typeface="Consolas" panose="020B0609020204030204" pitchFamily="49" charset="0"/>
-              </a:rPr>
-              <a:t>`</a:t>
-            </a:r>
-            <a:r>
-              <a:rPr lang="en-US" sz="1600" dirty="0" err="1">
-                <a:solidFill>
-                  <a:schemeClr val="bg1"/>
-                </a:solidFill>
-                <a:latin typeface="Consolas" panose="020B0609020204030204" pitchFamily="49" charset="0"/>
-              </a:rPr>
-              <a:t>match_id</a:t>
-            </a:r>
-            <a:r>
-              <a:rPr lang="en-US" sz="1600" dirty="0">
-                <a:solidFill>
-                  <a:schemeClr val="bg1"/>
-                </a:solidFill>
-                <a:latin typeface="Consolas" panose="020B0609020204030204" pitchFamily="49" charset="0"/>
-              </a:rPr>
-              <a:t>`</a:t>
-            </a:r>
-            <a:r>
-              <a:rPr lang="en-US" sz="1600" dirty="0">
-                <a:solidFill>
-                  <a:schemeClr val="bg1"/>
-                </a:solidFill>
-              </a:rPr>
-              <a:t>, and </a:t>
-            </a:r>
-            <a:r>
-              <a:rPr lang="en-US" sz="1600" dirty="0">
-                <a:solidFill>
-                  <a:schemeClr val="bg1"/>
-                </a:solidFill>
-                <a:latin typeface="Consolas" panose="020B0609020204030204" pitchFamily="49" charset="0"/>
-              </a:rPr>
-              <a:t>`</a:t>
-            </a:r>
-            <a:r>
-              <a:rPr lang="en-US" sz="1600" dirty="0" err="1">
-                <a:solidFill>
-                  <a:schemeClr val="bg1"/>
-                </a:solidFill>
-                <a:latin typeface="Consolas" panose="020B0609020204030204" pitchFamily="49" charset="0"/>
-              </a:rPr>
-              <a:t>full_name</a:t>
-            </a:r>
-            <a:r>
-              <a:rPr lang="en-US" sz="1600" dirty="0">
-                <a:solidFill>
-                  <a:schemeClr val="bg1"/>
-                </a:solidFill>
-                <a:latin typeface="Consolas" panose="020B0609020204030204" pitchFamily="49" charset="0"/>
-              </a:rPr>
-              <a:t>` </a:t>
-            </a:r>
-            <a:r>
-              <a:rPr lang="en-US" sz="1600" dirty="0">
-                <a:solidFill>
-                  <a:schemeClr val="bg1"/>
-                </a:solidFill>
-              </a:rPr>
-              <a:t>are the columns that are involved from the other two tables.</a:t>
-            </a:r>
-          </a:p>
-          <a:p>
-            <a:pPr algn="just"/>
             <a:endParaRPr lang="en-US" sz="1600" dirty="0">
               <a:solidFill>
                 <a:schemeClr val="bg1"/>
@@ -12743,7 +12730,10 @@
             <a:r>
               <a:rPr lang="en-US" sz="1600" dirty="0">
                 <a:solidFill>
-                  <a:schemeClr val="bg1"/>
+                  <a:schemeClr val="tx1">
+                    <a:lumMod val="65000"/>
+                    <a:lumOff val="35000"/>
+                  </a:schemeClr>
                 </a:solidFill>
               </a:rPr>
               <a:t>I first drop duplicates of </a:t>
@@ -12751,7 +12741,10 @@
             <a:r>
               <a:rPr lang="en-US" sz="1600" dirty="0">
                 <a:solidFill>
-                  <a:schemeClr val="bg1"/>
+                  <a:schemeClr val="tx1">
+                    <a:lumMod val="65000"/>
+                    <a:lumOff val="35000"/>
+                  </a:schemeClr>
                 </a:solidFill>
                 <a:latin typeface="Courier New" panose="02070309020205020404" pitchFamily="49" charset="0"/>
                 <a:cs typeface="Courier New" panose="02070309020205020404" pitchFamily="49" charset="0"/>
@@ -12761,7 +12754,10 @@
             <a:r>
               <a:rPr lang="en-US" sz="1600" dirty="0">
                 <a:solidFill>
-                  <a:schemeClr val="bg1"/>
+                  <a:schemeClr val="tx1">
+                    <a:lumMod val="65000"/>
+                    <a:lumOff val="35000"/>
+                  </a:schemeClr>
                 </a:solidFill>
               </a:rPr>
               <a:t> table (necessary for avoiding overcounting), then filter them according to their </a:t>
@@ -12769,7 +12765,10 @@
             <a:r>
               <a:rPr lang="en-US" sz="1600" dirty="0">
                 <a:solidFill>
-                  <a:schemeClr val="bg1"/>
+                  <a:schemeClr val="tx1">
+                    <a:lumMod val="65000"/>
+                    <a:lumOff val="35000"/>
+                  </a:schemeClr>
                 </a:solidFill>
                 <a:latin typeface="Consolas" panose="020B0609020204030204" pitchFamily="49" charset="0"/>
               </a:rPr>
@@ -12778,7 +12777,10 @@
             <a:r>
               <a:rPr lang="en-US" sz="1600" dirty="0" err="1">
                 <a:solidFill>
-                  <a:schemeClr val="bg1"/>
+                  <a:schemeClr val="tx1">
+                    <a:lumMod val="65000"/>
+                    <a:lumOff val="35000"/>
+                  </a:schemeClr>
                 </a:solidFill>
                 <a:latin typeface="Consolas" panose="020B0609020204030204" pitchFamily="49" charset="0"/>
               </a:rPr>
@@ -12787,7 +12789,10 @@
             <a:r>
               <a:rPr lang="en-US" sz="1600" dirty="0" err="1">
                 <a:solidFill>
-                  <a:schemeClr val="bg1"/>
+                  <a:schemeClr val="tx1">
+                    <a:lumMod val="65000"/>
+                    <a:lumOff val="35000"/>
+                  </a:schemeClr>
                 </a:solidFill>
               </a:rPr>
               <a:t>Finally</a:t>
@@ -12795,7 +12800,10 @@
             <a:r>
               <a:rPr lang="en-US" sz="1600" dirty="0">
                 <a:solidFill>
-                  <a:schemeClr val="bg1"/>
+                  <a:schemeClr val="tx1">
+                    <a:lumMod val="65000"/>
+                    <a:lumOff val="35000"/>
+                  </a:schemeClr>
                 </a:solidFill>
               </a:rPr>
               <a:t>, join those records with 1 as winner with </a:t>
@@ -12803,7 +12811,10 @@
             <a:r>
               <a:rPr lang="en-US" sz="1600" dirty="0" err="1">
                 <a:solidFill>
-                  <a:schemeClr val="bg1"/>
+                  <a:schemeClr val="tx1">
+                    <a:lumMod val="65000"/>
+                    <a:lumOff val="35000"/>
+                  </a:schemeClr>
                 </a:solidFill>
                 <a:latin typeface="Courier New" panose="02070309020205020404" pitchFamily="49" charset="0"/>
                 <a:cs typeface="Courier New" panose="02070309020205020404" pitchFamily="49" charset="0"/>
@@ -12813,7 +12824,10 @@
             <a:r>
               <a:rPr lang="en-US" sz="1600" dirty="0">
                 <a:solidFill>
-                  <a:schemeClr val="bg1"/>
+                  <a:schemeClr val="tx1">
+                    <a:lumMod val="65000"/>
+                    <a:lumOff val="35000"/>
+                  </a:schemeClr>
                 </a:solidFill>
               </a:rPr>
               <a:t>, and those with 2 will be joined by </a:t>
@@ -12821,7 +12835,10 @@
             <a:r>
               <a:rPr lang="en-US" sz="1600" dirty="0" err="1">
                 <a:solidFill>
-                  <a:schemeClr val="bg1"/>
+                  <a:schemeClr val="tx1">
+                    <a:lumMod val="65000"/>
+                    <a:lumOff val="35000"/>
+                  </a:schemeClr>
                 </a:solidFill>
                 <a:latin typeface="Courier New" panose="02070309020205020404" pitchFamily="49" charset="0"/>
                 <a:cs typeface="Courier New" panose="02070309020205020404" pitchFamily="49" charset="0"/>
@@ -12831,7 +12848,10 @@
             <a:r>
               <a:rPr lang="en-US" sz="1600" dirty="0">
                 <a:solidFill>
-                  <a:schemeClr val="bg1"/>
+                  <a:schemeClr val="tx1">
+                    <a:lumMod val="65000"/>
+                    <a:lumOff val="35000"/>
+                  </a:schemeClr>
                 </a:solidFill>
               </a:rPr>
               <a:t>. Finally concatenating the results.</a:t>
@@ -12841,7 +12861,10 @@
             <a:pPr algn="just"/>
             <a:endParaRPr lang="en-US" sz="1600" dirty="0">
               <a:solidFill>
-                <a:schemeClr val="bg1"/>
+                <a:schemeClr val="tx1">
+                  <a:lumMod val="65000"/>
+                  <a:lumOff val="35000"/>
+                </a:schemeClr>
               </a:solidFill>
             </a:endParaRPr>
           </a:p>
@@ -12850,7 +12873,10 @@
             <a:r>
               <a:rPr lang="en-US" sz="1600" dirty="0">
                 <a:solidFill>
-                  <a:schemeClr val="bg1"/>
+                  <a:schemeClr val="tx1">
+                    <a:lumMod val="65000"/>
+                    <a:lumOff val="35000"/>
+                  </a:schemeClr>
                 </a:solidFill>
               </a:rPr>
               <a:t>Finally, group by </a:t>
@@ -12858,7 +12884,10 @@
             <a:r>
               <a:rPr lang="en-US" sz="1600" dirty="0">
                 <a:solidFill>
-                  <a:schemeClr val="bg1"/>
+                  <a:schemeClr val="tx1">
+                    <a:lumMod val="65000"/>
+                    <a:lumOff val="35000"/>
+                  </a:schemeClr>
                 </a:solidFill>
                 <a:latin typeface="Consolas" panose="020B0609020204030204" pitchFamily="49" charset="0"/>
               </a:rPr>
@@ -12867,7 +12896,10 @@
             <a:r>
               <a:rPr lang="en-US" sz="1600" dirty="0" err="1">
                 <a:solidFill>
-                  <a:schemeClr val="bg1"/>
+                  <a:schemeClr val="tx1">
+                    <a:lumMod val="65000"/>
+                    <a:lumOff val="35000"/>
+                  </a:schemeClr>
                 </a:solidFill>
                 <a:latin typeface="Consolas" panose="020B0609020204030204" pitchFamily="49" charset="0"/>
               </a:rPr>
@@ -12876,7 +12908,10 @@
             <a:r>
               <a:rPr lang="en-US" sz="1600" dirty="0">
                 <a:solidFill>
-                  <a:schemeClr val="bg1"/>
+                  <a:schemeClr val="tx1">
+                    <a:lumMod val="65000"/>
+                    <a:lumOff val="35000"/>
+                  </a:schemeClr>
                 </a:solidFill>
                 <a:latin typeface="Consolas" panose="020B0609020204030204" pitchFamily="49" charset="0"/>
               </a:rPr>
@@ -12885,7 +12920,10 @@
             <a:r>
               <a:rPr lang="en-US" sz="1600" dirty="0">
                 <a:solidFill>
-                  <a:schemeClr val="bg1"/>
+                  <a:schemeClr val="tx1">
+                    <a:lumMod val="65000"/>
+                    <a:lumOff val="35000"/>
+                  </a:schemeClr>
                 </a:solidFill>
               </a:rPr>
               <a:t>and counting the number of </a:t>
@@ -12893,7 +12931,10 @@
             <a:r>
               <a:rPr lang="en-US" sz="1600" dirty="0">
                 <a:solidFill>
-                  <a:schemeClr val="bg1"/>
+                  <a:schemeClr val="tx1">
+                    <a:lumMod val="65000"/>
+                    <a:lumOff val="35000"/>
+                  </a:schemeClr>
                 </a:solidFill>
                 <a:latin typeface="Consolas" panose="020B0609020204030204" pitchFamily="49" charset="0"/>
               </a:rPr>
@@ -12902,7 +12943,10 @@
             <a:r>
               <a:rPr lang="en-US" sz="1600" dirty="0" err="1">
                 <a:solidFill>
-                  <a:schemeClr val="bg1"/>
+                  <a:schemeClr val="tx1">
+                    <a:lumMod val="65000"/>
+                    <a:lumOff val="35000"/>
+                  </a:schemeClr>
                 </a:solidFill>
                 <a:latin typeface="Consolas" panose="020B0609020204030204" pitchFamily="49" charset="0"/>
               </a:rPr>
@@ -12911,7 +12955,10 @@
             <a:r>
               <a:rPr lang="en-US" sz="1600" dirty="0" err="1">
                 <a:solidFill>
-                  <a:schemeClr val="bg1"/>
+                  <a:schemeClr val="tx1">
+                    <a:lumMod val="65000"/>
+                    <a:lumOff val="35000"/>
+                  </a:schemeClr>
                 </a:solidFill>
               </a:rPr>
               <a:t>s</a:t>
@@ -12919,7 +12966,10 @@
             <a:r>
               <a:rPr lang="en-US" sz="1600" dirty="0">
                 <a:solidFill>
-                  <a:schemeClr val="bg1"/>
+                  <a:schemeClr val="tx1">
+                    <a:lumMod val="65000"/>
+                    <a:lumOff val="35000"/>
+                  </a:schemeClr>
                 </a:solidFill>
               </a:rPr>
               <a:t>, combined by a sorting, will give the answer.</a:t>

</xml_diff>